<commit_message>
added slides for the presentation
</commit_message>
<xml_diff>
--- a/docs/Presentation.pptx
+++ b/docs/Presentation.pptx
@@ -10,10 +10,15 @@
     <p:sldId id="258" r:id="rId4"/>
     <p:sldId id="259" r:id="rId5"/>
     <p:sldId id="261" r:id="rId6"/>
-    <p:sldId id="262" r:id="rId7"/>
-    <p:sldId id="263" r:id="rId8"/>
-    <p:sldId id="264" r:id="rId9"/>
-    <p:sldId id="265" r:id="rId10"/>
+    <p:sldId id="266" r:id="rId7"/>
+    <p:sldId id="268" r:id="rId8"/>
+    <p:sldId id="267" r:id="rId9"/>
+    <p:sldId id="269" r:id="rId10"/>
+    <p:sldId id="270" r:id="rId11"/>
+    <p:sldId id="271" r:id="rId12"/>
+    <p:sldId id="262" r:id="rId13"/>
+    <p:sldId id="263" r:id="rId14"/>
+    <p:sldId id="264" r:id="rId15"/>
   </p:sldIdLst>
   <p:sldSz cx="12192000" cy="6858000"/>
   <p:notesSz cx="6858000" cy="9144000"/>
@@ -112,6 +117,11 @@
       </a:defRPr>
     </a:lvl9pPr>
   </p:defaultTextStyle>
+  <p:extLst>
+    <p:ext uri="{EFAFB233-063F-42B5-8137-9DF3F51BA10A}">
+      <p15:sldGuideLst xmlns:p15="http://schemas.microsoft.com/office/powerpoint/2012/main"/>
+    </p:ext>
+  </p:extLst>
 </p:presentation>
 </file>
 
@@ -3572,6 +3582,1176 @@
 </p:sld>
 </file>
 
+<file path=ppt/slides/slide10.xml><?xml version="1.0" encoding="utf-8"?>
+<p:sld xmlns:a="http://schemas.openxmlformats.org/drawingml/2006/main" xmlns:r="http://schemas.openxmlformats.org/officeDocument/2006/relationships" xmlns:p="http://schemas.openxmlformats.org/presentationml/2006/main">
+  <p:cSld>
+    <p:spTree>
+      <p:nvGrpSpPr>
+        <p:cNvPr id="1" name=""/>
+        <p:cNvGrpSpPr/>
+        <p:nvPr/>
+      </p:nvGrpSpPr>
+      <p:grpSpPr>
+        <a:xfrm>
+          <a:off x="0" y="0"/>
+          <a:ext cx="0" cy="0"/>
+          <a:chOff x="0" y="0"/>
+          <a:chExt cx="0" cy="0"/>
+        </a:xfrm>
+      </p:grpSpPr>
+      <p:sp>
+        <p:nvSpPr>
+          <p:cNvPr id="2" name="Titel 1">
+            <a:extLst>
+              <a:ext uri="{FF2B5EF4-FFF2-40B4-BE49-F238E27FC236}">
+                <a16:creationId xmlns:a16="http://schemas.microsoft.com/office/drawing/2014/main" id="{1218EECC-D69B-3BBB-CD69-F2FC31CEEB3F}"/>
+              </a:ext>
+            </a:extLst>
+          </p:cNvPr>
+          <p:cNvSpPr>
+            <a:spLocks noGrp="1"/>
+          </p:cNvSpPr>
+          <p:nvPr>
+            <p:ph type="title"/>
+          </p:nvPr>
+        </p:nvSpPr>
+        <p:spPr>
+          <a:xfrm>
+            <a:off x="804672" y="964692"/>
+            <a:ext cx="3523946" cy="1188720"/>
+          </a:xfrm>
+        </p:spPr>
+        <p:txBody>
+          <a:bodyPr>
+            <a:noAutofit/>
+          </a:bodyPr>
+          <a:lstStyle/>
+          <a:p>
+            <a:r>
+              <a:rPr lang="en-GB" sz="1800" dirty="0"/>
+              <a:t>Implementation – Additional Features</a:t>
+            </a:r>
+            <a:endParaRPr lang="en-GB" sz="1600" dirty="0"/>
+          </a:p>
+        </p:txBody>
+      </p:sp>
+      <p:sp>
+        <p:nvSpPr>
+          <p:cNvPr id="3" name="Inhaltsplatzhalter 2">
+            <a:extLst>
+              <a:ext uri="{FF2B5EF4-FFF2-40B4-BE49-F238E27FC236}">
+                <a16:creationId xmlns:a16="http://schemas.microsoft.com/office/drawing/2014/main" id="{8F6FA557-7EF8-9398-50C6-5CB2F5D4E4BE}"/>
+              </a:ext>
+            </a:extLst>
+          </p:cNvPr>
+          <p:cNvSpPr>
+            <a:spLocks noGrp="1"/>
+          </p:cNvSpPr>
+          <p:nvPr>
+            <p:ph idx="1"/>
+          </p:nvPr>
+        </p:nvSpPr>
+        <p:spPr>
+          <a:xfrm>
+            <a:off x="803244" y="2638044"/>
+            <a:ext cx="3523946" cy="3263206"/>
+          </a:xfrm>
+        </p:spPr>
+        <p:txBody>
+          <a:bodyPr>
+            <a:normAutofit/>
+          </a:bodyPr>
+          <a:lstStyle/>
+          <a:p>
+            <a:r>
+              <a:rPr lang="en-GB" sz="2400" dirty="0"/>
+              <a:t>Swagger</a:t>
+            </a:r>
+            <a:endParaRPr lang="en-GB" sz="2200" dirty="0"/>
+          </a:p>
+          <a:p>
+            <a:pPr lvl="1"/>
+            <a:endParaRPr lang="en-GB" sz="2200" dirty="0"/>
+          </a:p>
+        </p:txBody>
+      </p:sp>
+      <p:pic>
+        <p:nvPicPr>
+          <p:cNvPr id="5" name="Grafik 4">
+            <a:extLst>
+              <a:ext uri="{FF2B5EF4-FFF2-40B4-BE49-F238E27FC236}">
+                <a16:creationId xmlns:a16="http://schemas.microsoft.com/office/drawing/2014/main" id="{313087F5-1618-DB4B-1B3E-BBF44B179A43}"/>
+              </a:ext>
+            </a:extLst>
+          </p:cNvPr>
+          <p:cNvPicPr>
+            <a:picLocks noChangeAspect="1"/>
+          </p:cNvPicPr>
+          <p:nvPr/>
+        </p:nvPicPr>
+        <p:blipFill>
+          <a:blip r:embed="rId2"/>
+          <a:stretch>
+            <a:fillRect/>
+          </a:stretch>
+        </p:blipFill>
+        <p:spPr>
+          <a:xfrm>
+            <a:off x="2565217" y="2472504"/>
+            <a:ext cx="9071510" cy="3420804"/>
+          </a:xfrm>
+          <a:prstGeom prst="rect">
+            <a:avLst/>
+          </a:prstGeom>
+        </p:spPr>
+      </p:pic>
+    </p:spTree>
+    <p:extLst>
+      <p:ext uri="{BB962C8B-B14F-4D97-AF65-F5344CB8AC3E}">
+        <p14:creationId xmlns:p14="http://schemas.microsoft.com/office/powerpoint/2010/main" val="2790685627"/>
+      </p:ext>
+    </p:extLst>
+  </p:cSld>
+  <p:clrMapOvr>
+    <a:masterClrMapping/>
+  </p:clrMapOvr>
+  <mc:AlternateContent xmlns:mc="http://schemas.openxmlformats.org/markup-compatibility/2006">
+    <mc:Choice xmlns:p159="http://schemas.microsoft.com/office/powerpoint/2015/09/main" Requires="p159">
+      <p:transition xmlns:p14="http://schemas.microsoft.com/office/powerpoint/2010/main" spd="slow" p14:dur="2000">
+        <p159:morph option="byObject"/>
+      </p:transition>
+    </mc:Choice>
+    <mc:Fallback>
+      <p:transition spd="slow">
+        <p:fade/>
+      </p:transition>
+    </mc:Fallback>
+  </mc:AlternateContent>
+</p:sld>
+</file>
+
+<file path=ppt/slides/slide11.xml><?xml version="1.0" encoding="utf-8"?>
+<p:sld xmlns:a="http://schemas.openxmlformats.org/drawingml/2006/main" xmlns:r="http://schemas.openxmlformats.org/officeDocument/2006/relationships" xmlns:p="http://schemas.openxmlformats.org/presentationml/2006/main">
+  <p:cSld>
+    <p:spTree>
+      <p:nvGrpSpPr>
+        <p:cNvPr id="1" name=""/>
+        <p:cNvGrpSpPr/>
+        <p:nvPr/>
+      </p:nvGrpSpPr>
+      <p:grpSpPr>
+        <a:xfrm>
+          <a:off x="0" y="0"/>
+          <a:ext cx="0" cy="0"/>
+          <a:chOff x="0" y="0"/>
+          <a:chExt cx="0" cy="0"/>
+        </a:xfrm>
+      </p:grpSpPr>
+      <p:sp>
+        <p:nvSpPr>
+          <p:cNvPr id="2" name="Titel 1">
+            <a:extLst>
+              <a:ext uri="{FF2B5EF4-FFF2-40B4-BE49-F238E27FC236}">
+                <a16:creationId xmlns:a16="http://schemas.microsoft.com/office/drawing/2014/main" id="{1218EECC-D69B-3BBB-CD69-F2FC31CEEB3F}"/>
+              </a:ext>
+            </a:extLst>
+          </p:cNvPr>
+          <p:cNvSpPr>
+            <a:spLocks noGrp="1"/>
+          </p:cNvSpPr>
+          <p:nvPr>
+            <p:ph type="title"/>
+          </p:nvPr>
+        </p:nvSpPr>
+        <p:spPr>
+          <a:xfrm>
+            <a:off x="804672" y="964692"/>
+            <a:ext cx="3523946" cy="1188720"/>
+          </a:xfrm>
+        </p:spPr>
+        <p:txBody>
+          <a:bodyPr>
+            <a:noAutofit/>
+          </a:bodyPr>
+          <a:lstStyle/>
+          <a:p>
+            <a:r>
+              <a:rPr lang="en-GB" sz="1800" dirty="0"/>
+              <a:t>Implementation – Additional Features</a:t>
+            </a:r>
+            <a:endParaRPr lang="en-GB" sz="1600" dirty="0"/>
+          </a:p>
+        </p:txBody>
+      </p:sp>
+      <p:sp>
+        <p:nvSpPr>
+          <p:cNvPr id="3" name="Inhaltsplatzhalter 2">
+            <a:extLst>
+              <a:ext uri="{FF2B5EF4-FFF2-40B4-BE49-F238E27FC236}">
+                <a16:creationId xmlns:a16="http://schemas.microsoft.com/office/drawing/2014/main" id="{8F6FA557-7EF8-9398-50C6-5CB2F5D4E4BE}"/>
+              </a:ext>
+            </a:extLst>
+          </p:cNvPr>
+          <p:cNvSpPr>
+            <a:spLocks noGrp="1"/>
+          </p:cNvSpPr>
+          <p:nvPr>
+            <p:ph idx="1"/>
+          </p:nvPr>
+        </p:nvSpPr>
+        <p:spPr>
+          <a:xfrm>
+            <a:off x="803243" y="2638043"/>
+            <a:ext cx="10297375" cy="3969233"/>
+          </a:xfrm>
+        </p:spPr>
+        <p:txBody>
+          <a:bodyPr>
+            <a:normAutofit/>
+          </a:bodyPr>
+          <a:lstStyle/>
+          <a:p>
+            <a:r>
+              <a:rPr lang="en-GB" sz="2400" dirty="0"/>
+              <a:t>Google-like search API Endpoint “/</a:t>
+            </a:r>
+            <a:r>
+              <a:rPr lang="en-GB" sz="2400" i="1" dirty="0"/>
+              <a:t>search</a:t>
+            </a:r>
+            <a:r>
+              <a:rPr lang="en-GB" sz="2400" dirty="0"/>
+              <a:t>”</a:t>
+            </a:r>
+          </a:p>
+          <a:p>
+            <a:pPr marL="0" indent="0">
+              <a:buNone/>
+            </a:pPr>
+            <a:endParaRPr lang="en-GB" sz="2400" dirty="0"/>
+          </a:p>
+          <a:p>
+            <a:pPr marL="0" indent="0">
+              <a:buNone/>
+            </a:pPr>
+            <a:r>
+              <a:rPr lang="en-US" b="0" dirty="0">
+                <a:solidFill>
+                  <a:srgbClr val="A31515"/>
+                </a:solidFill>
+                <a:effectLst/>
+                <a:latin typeface="Consolas" panose="020B0609020204030204" pitchFamily="49" charset="0"/>
+              </a:rPr>
+              <a:t>SELECT * FROM </a:t>
+            </a:r>
+            <a:r>
+              <a:rPr lang="en-US" b="0" dirty="0" err="1">
+                <a:solidFill>
+                  <a:srgbClr val="A31515"/>
+                </a:solidFill>
+                <a:effectLst/>
+                <a:latin typeface="Consolas" panose="020B0609020204030204" pitchFamily="49" charset="0"/>
+              </a:rPr>
+              <a:t>allgenes</a:t>
+            </a:r>
+            <a:r>
+              <a:rPr lang="en-US" b="0" dirty="0">
+                <a:solidFill>
+                  <a:srgbClr val="A31515"/>
+                </a:solidFill>
+                <a:effectLst/>
+                <a:latin typeface="Consolas" panose="020B0609020204030204" pitchFamily="49" charset="0"/>
+              </a:rPr>
+              <a:t> </a:t>
+            </a:r>
+          </a:p>
+          <a:p>
+            <a:pPr marL="0" indent="0">
+              <a:buNone/>
+            </a:pPr>
+            <a:r>
+              <a:rPr lang="en-US" b="0" dirty="0">
+                <a:solidFill>
+                  <a:srgbClr val="A31515"/>
+                </a:solidFill>
+                <a:effectLst/>
+                <a:latin typeface="Consolas" panose="020B0609020204030204" pitchFamily="49" charset="0"/>
+              </a:rPr>
+              <a:t>	WHERE </a:t>
+            </a:r>
+            <a:r>
+              <a:rPr lang="en-US" b="0" dirty="0" err="1">
+                <a:solidFill>
+                  <a:srgbClr val="A31515"/>
+                </a:solidFill>
+                <a:effectLst/>
+                <a:latin typeface="Consolas" panose="020B0609020204030204" pitchFamily="49" charset="0"/>
+              </a:rPr>
+              <a:t>allgenes.gene_id</a:t>
+            </a:r>
+            <a:r>
+              <a:rPr lang="en-US" b="0" dirty="0">
+                <a:solidFill>
+                  <a:srgbClr val="A31515"/>
+                </a:solidFill>
+                <a:effectLst/>
+                <a:latin typeface="Consolas" panose="020B0609020204030204" pitchFamily="49" charset="0"/>
+              </a:rPr>
+              <a:t> = </a:t>
+            </a:r>
+            <a:r>
+              <a:rPr lang="en-US" b="0" dirty="0">
+                <a:solidFill>
+                  <a:srgbClr val="A31515"/>
+                </a:solidFill>
+                <a:effectLst/>
+                <a:highlight>
+                  <a:srgbClr val="FFFF00"/>
+                </a:highlight>
+                <a:latin typeface="Consolas" panose="020B0609020204030204" pitchFamily="49" charset="0"/>
+              </a:rPr>
+              <a:t>:</a:t>
+            </a:r>
+            <a:r>
+              <a:rPr lang="en-US" b="0" dirty="0" err="1">
+                <a:solidFill>
+                  <a:srgbClr val="A31515"/>
+                </a:solidFill>
+                <a:effectLst/>
+                <a:highlight>
+                  <a:srgbClr val="FFFF00"/>
+                </a:highlight>
+                <a:latin typeface="Consolas" panose="020B0609020204030204" pitchFamily="49" charset="0"/>
+              </a:rPr>
+              <a:t>intSearchQuery</a:t>
+            </a:r>
+            <a:r>
+              <a:rPr lang="en-US" b="0" dirty="0">
+                <a:solidFill>
+                  <a:srgbClr val="A31515"/>
+                </a:solidFill>
+                <a:effectLst/>
+                <a:highlight>
+                  <a:srgbClr val="FFFF00"/>
+                </a:highlight>
+                <a:latin typeface="Consolas" panose="020B0609020204030204" pitchFamily="49" charset="0"/>
+              </a:rPr>
+              <a:t> </a:t>
+            </a:r>
+            <a:endParaRPr lang="en-US" dirty="0">
+              <a:solidFill>
+                <a:srgbClr val="A31515"/>
+              </a:solidFill>
+              <a:highlight>
+                <a:srgbClr val="FFFF00"/>
+              </a:highlight>
+              <a:latin typeface="Consolas" panose="020B0609020204030204" pitchFamily="49" charset="0"/>
+            </a:endParaRPr>
+          </a:p>
+          <a:p>
+            <a:pPr marL="0" indent="0">
+              <a:buNone/>
+            </a:pPr>
+            <a:r>
+              <a:rPr lang="en-US" b="0" dirty="0">
+                <a:solidFill>
+                  <a:srgbClr val="A31515"/>
+                </a:solidFill>
+                <a:effectLst/>
+                <a:latin typeface="Consolas" panose="020B0609020204030204" pitchFamily="49" charset="0"/>
+              </a:rPr>
+              <a:t>	OR </a:t>
+            </a:r>
+            <a:r>
+              <a:rPr lang="en-US" b="0" dirty="0" err="1">
+                <a:solidFill>
+                  <a:srgbClr val="A31515"/>
+                </a:solidFill>
+                <a:effectLst/>
+                <a:latin typeface="Consolas" panose="020B0609020204030204" pitchFamily="49" charset="0"/>
+              </a:rPr>
+              <a:t>allgenes.symbol</a:t>
+            </a:r>
+            <a:r>
+              <a:rPr lang="en-US" b="0" dirty="0">
+                <a:solidFill>
+                  <a:srgbClr val="A31515"/>
+                </a:solidFill>
+                <a:effectLst/>
+                <a:latin typeface="Consolas" panose="020B0609020204030204" pitchFamily="49" charset="0"/>
+              </a:rPr>
+              <a:t> = :</a:t>
+            </a:r>
+            <a:r>
+              <a:rPr lang="en-US" b="0" dirty="0" err="1">
+                <a:solidFill>
+                  <a:srgbClr val="A31515"/>
+                </a:solidFill>
+                <a:effectLst/>
+                <a:latin typeface="Consolas" panose="020B0609020204030204" pitchFamily="49" charset="0"/>
+              </a:rPr>
+              <a:t>searchQuery</a:t>
+            </a:r>
+            <a:r>
+              <a:rPr lang="en-US" b="0" dirty="0">
+                <a:solidFill>
+                  <a:srgbClr val="A31515"/>
+                </a:solidFill>
+                <a:effectLst/>
+                <a:latin typeface="Consolas" panose="020B0609020204030204" pitchFamily="49" charset="0"/>
+              </a:rPr>
+              <a:t> </a:t>
+            </a:r>
+            <a:endParaRPr lang="en-US" dirty="0">
+              <a:solidFill>
+                <a:srgbClr val="A31515"/>
+              </a:solidFill>
+              <a:latin typeface="Consolas" panose="020B0609020204030204" pitchFamily="49" charset="0"/>
+            </a:endParaRPr>
+          </a:p>
+          <a:p>
+            <a:pPr marL="0" indent="0">
+              <a:buNone/>
+            </a:pPr>
+            <a:r>
+              <a:rPr lang="en-US" b="0" dirty="0">
+                <a:solidFill>
+                  <a:srgbClr val="A31515"/>
+                </a:solidFill>
+                <a:effectLst/>
+                <a:latin typeface="Consolas" panose="020B0609020204030204" pitchFamily="49" charset="0"/>
+              </a:rPr>
+              <a:t>	OR </a:t>
+            </a:r>
+            <a:r>
+              <a:rPr lang="en-US" b="0" dirty="0">
+                <a:solidFill>
+                  <a:srgbClr val="A31515"/>
+                </a:solidFill>
+                <a:effectLst/>
+                <a:highlight>
+                  <a:srgbClr val="FFFF00"/>
+                </a:highlight>
+                <a:latin typeface="Consolas" panose="020B0609020204030204" pitchFamily="49" charset="0"/>
+              </a:rPr>
+              <a:t>MATCH(`description`) AGAINST(:</a:t>
+            </a:r>
+            <a:r>
+              <a:rPr lang="en-US" b="0" dirty="0" err="1">
+                <a:solidFill>
+                  <a:srgbClr val="A31515"/>
+                </a:solidFill>
+                <a:effectLst/>
+                <a:highlight>
+                  <a:srgbClr val="FFFF00"/>
+                </a:highlight>
+                <a:latin typeface="Consolas" panose="020B0609020204030204" pitchFamily="49" charset="0"/>
+              </a:rPr>
+              <a:t>searchQuery</a:t>
+            </a:r>
+            <a:r>
+              <a:rPr lang="en-US" b="0" dirty="0">
+                <a:solidFill>
+                  <a:srgbClr val="A31515"/>
+                </a:solidFill>
+                <a:effectLst/>
+                <a:highlight>
+                  <a:srgbClr val="FFFF00"/>
+                </a:highlight>
+                <a:latin typeface="Consolas" panose="020B0609020204030204" pitchFamily="49" charset="0"/>
+              </a:rPr>
+              <a:t> IN BOOLEAN MODE)</a:t>
+            </a:r>
+          </a:p>
+          <a:p>
+            <a:pPr marL="0" indent="0">
+              <a:buNone/>
+            </a:pPr>
+            <a:endParaRPr lang="en-US" dirty="0">
+              <a:solidFill>
+                <a:srgbClr val="A31515"/>
+              </a:solidFill>
+              <a:highlight>
+                <a:srgbClr val="FFFF00"/>
+              </a:highlight>
+              <a:latin typeface="Consolas" panose="020B0609020204030204" pitchFamily="49" charset="0"/>
+            </a:endParaRPr>
+          </a:p>
+          <a:p>
+            <a:r>
+              <a:rPr lang="en-US" sz="2400" dirty="0"/>
+              <a:t>Problem: Performance still not good (~ 10-20sec per query) when used with count query (pagination)</a:t>
+            </a:r>
+          </a:p>
+          <a:p>
+            <a:endParaRPr lang="en-GB" sz="2200" dirty="0"/>
+          </a:p>
+          <a:p>
+            <a:pPr lvl="1"/>
+            <a:endParaRPr lang="en-GB" sz="2200" dirty="0"/>
+          </a:p>
+        </p:txBody>
+      </p:sp>
+      <p:pic>
+        <p:nvPicPr>
+          <p:cNvPr id="6" name="Grafik 5">
+            <a:extLst>
+              <a:ext uri="{FF2B5EF4-FFF2-40B4-BE49-F238E27FC236}">
+                <a16:creationId xmlns:a16="http://schemas.microsoft.com/office/drawing/2014/main" id="{64687685-1861-CB49-97C4-A6D0B79A04D6}"/>
+              </a:ext>
+            </a:extLst>
+          </p:cNvPr>
+          <p:cNvPicPr>
+            <a:picLocks noChangeAspect="1"/>
+          </p:cNvPicPr>
+          <p:nvPr/>
+        </p:nvPicPr>
+        <p:blipFill rotWithShape="1">
+          <a:blip r:embed="rId2"/>
+          <a:srcRect t="43253" r="76201" b="46759"/>
+          <a:stretch/>
+        </p:blipFill>
+        <p:spPr>
+          <a:xfrm>
+            <a:off x="7000566" y="170639"/>
+            <a:ext cx="4017237" cy="635722"/>
+          </a:xfrm>
+          <a:prstGeom prst="rect">
+            <a:avLst/>
+          </a:prstGeom>
+        </p:spPr>
+      </p:pic>
+      <p:pic>
+        <p:nvPicPr>
+          <p:cNvPr id="8" name="Grafik 7">
+            <a:extLst>
+              <a:ext uri="{FF2B5EF4-FFF2-40B4-BE49-F238E27FC236}">
+                <a16:creationId xmlns:a16="http://schemas.microsoft.com/office/drawing/2014/main" id="{1820E6ED-8FBE-C9F0-0E5B-89F2771AABBC}"/>
+              </a:ext>
+            </a:extLst>
+          </p:cNvPr>
+          <p:cNvPicPr>
+            <a:picLocks noChangeAspect="1"/>
+          </p:cNvPicPr>
+          <p:nvPr/>
+        </p:nvPicPr>
+        <p:blipFill>
+          <a:blip r:embed="rId3"/>
+          <a:stretch>
+            <a:fillRect/>
+          </a:stretch>
+        </p:blipFill>
+        <p:spPr>
+          <a:xfrm>
+            <a:off x="7000566" y="806361"/>
+            <a:ext cx="4718549" cy="3015887"/>
+          </a:xfrm>
+          <a:prstGeom prst="rect">
+            <a:avLst/>
+          </a:prstGeom>
+        </p:spPr>
+      </p:pic>
+    </p:spTree>
+    <p:extLst>
+      <p:ext uri="{BB962C8B-B14F-4D97-AF65-F5344CB8AC3E}">
+        <p14:creationId xmlns:p14="http://schemas.microsoft.com/office/powerpoint/2010/main" val="670759649"/>
+      </p:ext>
+    </p:extLst>
+  </p:cSld>
+  <p:clrMapOvr>
+    <a:masterClrMapping/>
+  </p:clrMapOvr>
+  <mc:AlternateContent xmlns:mc="http://schemas.openxmlformats.org/markup-compatibility/2006">
+    <mc:Choice xmlns:p159="http://schemas.microsoft.com/office/powerpoint/2015/09/main" Requires="p159">
+      <p:transition xmlns:p14="http://schemas.microsoft.com/office/powerpoint/2010/main" spd="slow" p14:dur="2000">
+        <p159:morph option="byObject"/>
+      </p:transition>
+    </mc:Choice>
+    <mc:Fallback>
+      <p:transition spd="slow">
+        <p:fade/>
+      </p:transition>
+    </mc:Fallback>
+  </mc:AlternateContent>
+</p:sld>
+</file>
+
+<file path=ppt/slides/slide12.xml><?xml version="1.0" encoding="utf-8"?>
+<p:sld xmlns:a="http://schemas.openxmlformats.org/drawingml/2006/main" xmlns:r="http://schemas.openxmlformats.org/officeDocument/2006/relationships" xmlns:p="http://schemas.openxmlformats.org/presentationml/2006/main">
+  <p:cSld>
+    <p:bg>
+      <p:bgPr>
+        <a:solidFill>
+          <a:schemeClr val="bg1">
+            <a:lumMod val="95000"/>
+          </a:schemeClr>
+        </a:solidFill>
+        <a:effectLst/>
+      </p:bgPr>
+    </p:bg>
+    <p:spTree>
+      <p:nvGrpSpPr>
+        <p:cNvPr id="1" name=""/>
+        <p:cNvGrpSpPr/>
+        <p:nvPr/>
+      </p:nvGrpSpPr>
+      <p:grpSpPr>
+        <a:xfrm>
+          <a:off x="0" y="0"/>
+          <a:ext cx="0" cy="0"/>
+          <a:chOff x="0" y="0"/>
+          <a:chExt cx="0" cy="0"/>
+        </a:xfrm>
+      </p:grpSpPr>
+      <p:sp>
+        <p:nvSpPr>
+          <p:cNvPr id="2" name="Titel 1">
+            <a:extLst>
+              <a:ext uri="{FF2B5EF4-FFF2-40B4-BE49-F238E27FC236}">
+                <a16:creationId xmlns:a16="http://schemas.microsoft.com/office/drawing/2014/main" id="{1218EECC-D69B-3BBB-CD69-F2FC31CEEB3F}"/>
+              </a:ext>
+            </a:extLst>
+          </p:cNvPr>
+          <p:cNvSpPr>
+            <a:spLocks noGrp="1"/>
+          </p:cNvSpPr>
+          <p:nvPr>
+            <p:ph type="title"/>
+          </p:nvPr>
+        </p:nvSpPr>
+        <p:spPr>
+          <a:xfrm>
+            <a:off x="804672" y="964692"/>
+            <a:ext cx="3523946" cy="1188720"/>
+          </a:xfrm>
+        </p:spPr>
+        <p:txBody>
+          <a:bodyPr>
+            <a:normAutofit/>
+          </a:bodyPr>
+          <a:lstStyle/>
+          <a:p>
+            <a:r>
+              <a:rPr lang="en-GB" sz="2200" dirty="0"/>
+              <a:t>Implementation React </a:t>
+            </a:r>
+            <a:r>
+              <a:rPr lang="en-GB" sz="2200" dirty="0" err="1"/>
+              <a:t>aPP</a:t>
+            </a:r>
+            <a:endParaRPr lang="en-GB" sz="2200" dirty="0"/>
+          </a:p>
+        </p:txBody>
+      </p:sp>
+      <p:sp>
+        <p:nvSpPr>
+          <p:cNvPr id="3" name="Inhaltsplatzhalter 2">
+            <a:extLst>
+              <a:ext uri="{FF2B5EF4-FFF2-40B4-BE49-F238E27FC236}">
+                <a16:creationId xmlns:a16="http://schemas.microsoft.com/office/drawing/2014/main" id="{8F6FA557-7EF8-9398-50C6-5CB2F5D4E4BE}"/>
+              </a:ext>
+            </a:extLst>
+          </p:cNvPr>
+          <p:cNvSpPr>
+            <a:spLocks noGrp="1"/>
+          </p:cNvSpPr>
+          <p:nvPr>
+            <p:ph idx="1"/>
+          </p:nvPr>
+        </p:nvSpPr>
+        <p:spPr>
+          <a:xfrm>
+            <a:off x="803244" y="2638044"/>
+            <a:ext cx="3523946" cy="3263206"/>
+          </a:xfrm>
+        </p:spPr>
+        <p:txBody>
+          <a:bodyPr>
+            <a:normAutofit/>
+          </a:bodyPr>
+          <a:lstStyle/>
+          <a:p>
+            <a:r>
+              <a:rPr lang="en-GB" sz="2400" dirty="0"/>
+              <a:t>Gene overview as list view</a:t>
+            </a:r>
+          </a:p>
+          <a:p>
+            <a:r>
+              <a:rPr lang="en-GB" sz="2400" i="1" dirty="0"/>
+              <a:t>Infinite scroll</a:t>
+            </a:r>
+            <a:r>
+              <a:rPr lang="en-GB" sz="2400" dirty="0"/>
+              <a:t> for performance reasons (lazy loading)</a:t>
+            </a:r>
+          </a:p>
+        </p:txBody>
+      </p:sp>
+      <p:sp>
+        <p:nvSpPr>
+          <p:cNvPr id="14" name="Rectangle 13">
+            <a:extLst>
+              <a:ext uri="{FF2B5EF4-FFF2-40B4-BE49-F238E27FC236}">
+                <a16:creationId xmlns:a16="http://schemas.microsoft.com/office/drawing/2014/main" id="{6515FC82-3453-4CBE-8895-4CCFF339529E}"/>
+              </a:ext>
+              <a:ext uri="{C183D7F6-B498-43B3-948B-1728B52AA6E4}">
+                <adec:decorative xmlns:adec="http://schemas.microsoft.com/office/drawing/2017/decorative" val="1"/>
+              </a:ext>
+            </a:extLst>
+          </p:cNvPr>
+          <p:cNvSpPr>
+            <a:spLocks noGrp="1" noRot="1" noChangeAspect="1" noMove="1" noResize="1" noEditPoints="1" noAdjustHandles="1" noChangeArrowheads="1" noChangeShapeType="1" noTextEdit="1"/>
+          </p:cNvSpPr>
+          <p:nvPr>
+            <p:extLst>
+              <p:ext uri="{386F3935-93C4-4BCD-93E2-E3B085C9AB24}">
+                <p16:designElem xmlns:p16="http://schemas.microsoft.com/office/powerpoint/2015/main" val="1"/>
+              </p:ext>
+            </p:extLst>
+          </p:nvPr>
+        </p:nvSpPr>
+        <p:spPr>
+          <a:xfrm>
+            <a:off x="4494182" y="964692"/>
+            <a:ext cx="6885432" cy="4936558"/>
+          </a:xfrm>
+          <a:prstGeom prst="rect">
+            <a:avLst/>
+          </a:prstGeom>
+          <a:noFill/>
+          <a:ln w="31750" cap="sq">
+            <a:solidFill>
+              <a:srgbClr val="FFFFFF"/>
+            </a:solidFill>
+            <a:miter lim="800000"/>
+          </a:ln>
+        </p:spPr>
+        <p:style>
+          <a:lnRef idx="2">
+            <a:schemeClr val="accent1">
+              <a:shade val="50000"/>
+            </a:schemeClr>
+          </a:lnRef>
+          <a:fillRef idx="1">
+            <a:schemeClr val="accent1"/>
+          </a:fillRef>
+          <a:effectRef idx="0">
+            <a:schemeClr val="accent1"/>
+          </a:effectRef>
+          <a:fontRef idx="minor">
+            <a:schemeClr val="lt1"/>
+          </a:fontRef>
+        </p:style>
+        <p:txBody>
+          <a:bodyPr rtlCol="0" anchor="ctr"/>
+          <a:lstStyle/>
+          <a:p>
+            <a:pPr algn="ctr"/>
+            <a:endParaRPr lang="en-US" dirty="0"/>
+          </a:p>
+        </p:txBody>
+      </p:sp>
+      <p:sp>
+        <p:nvSpPr>
+          <p:cNvPr id="16" name="Rectangle 15">
+            <a:extLst>
+              <a:ext uri="{FF2B5EF4-FFF2-40B4-BE49-F238E27FC236}">
+                <a16:creationId xmlns:a16="http://schemas.microsoft.com/office/drawing/2014/main" id="{C5FD847B-65C0-4027-8DFC-70CB424514F8}"/>
+              </a:ext>
+              <a:ext uri="{C183D7F6-B498-43B3-948B-1728B52AA6E4}">
+                <adec:decorative xmlns:adec="http://schemas.microsoft.com/office/drawing/2017/decorative" val="1"/>
+              </a:ext>
+            </a:extLst>
+          </p:cNvPr>
+          <p:cNvSpPr>
+            <a:spLocks noGrp="1" noRot="1" noChangeAspect="1" noMove="1" noResize="1" noEditPoints="1" noAdjustHandles="1" noChangeArrowheads="1" noChangeShapeType="1" noTextEdit="1"/>
+          </p:cNvSpPr>
+          <p:nvPr>
+            <p:extLst>
+              <p:ext uri="{386F3935-93C4-4BCD-93E2-E3B085C9AB24}">
+                <p16:designElem xmlns:p16="http://schemas.microsoft.com/office/powerpoint/2015/main" val="1"/>
+              </p:ext>
+            </p:extLst>
+          </p:nvPr>
+        </p:nvSpPr>
+        <p:spPr>
+          <a:xfrm>
+            <a:off x="4657802" y="1128683"/>
+            <a:ext cx="6558192" cy="4608576"/>
+          </a:xfrm>
+          <a:prstGeom prst="rect">
+            <a:avLst/>
+          </a:prstGeom>
+          <a:solidFill>
+            <a:srgbClr val="FFFFFF"/>
+          </a:solidFill>
+          <a:ln>
+            <a:noFill/>
+          </a:ln>
+        </p:spPr>
+        <p:style>
+          <a:lnRef idx="2">
+            <a:schemeClr val="accent1">
+              <a:shade val="50000"/>
+            </a:schemeClr>
+          </a:lnRef>
+          <a:fillRef idx="1">
+            <a:schemeClr val="accent1"/>
+          </a:fillRef>
+          <a:effectRef idx="0">
+            <a:schemeClr val="accent1"/>
+          </a:effectRef>
+          <a:fontRef idx="minor">
+            <a:schemeClr val="lt1"/>
+          </a:fontRef>
+        </p:style>
+        <p:txBody>
+          <a:bodyPr rtlCol="0" anchor="ctr"/>
+          <a:lstStyle/>
+          <a:p>
+            <a:pPr algn="ctr"/>
+            <a:endParaRPr lang="en-US"/>
+          </a:p>
+        </p:txBody>
+      </p:sp>
+      <p:pic>
+        <p:nvPicPr>
+          <p:cNvPr id="9" name="Grafik 8">
+            <a:extLst>
+              <a:ext uri="{FF2B5EF4-FFF2-40B4-BE49-F238E27FC236}">
+                <a16:creationId xmlns:a16="http://schemas.microsoft.com/office/drawing/2014/main" id="{96E2DE4A-340D-6EFB-506C-67207E64AF24}"/>
+              </a:ext>
+            </a:extLst>
+          </p:cNvPr>
+          <p:cNvPicPr>
+            <a:picLocks noChangeAspect="1"/>
+          </p:cNvPicPr>
+          <p:nvPr/>
+        </p:nvPicPr>
+        <p:blipFill>
+          <a:blip r:embed="rId2"/>
+          <a:stretch>
+            <a:fillRect/>
+          </a:stretch>
+        </p:blipFill>
+        <p:spPr>
+          <a:xfrm>
+            <a:off x="4823366" y="1323553"/>
+            <a:ext cx="6227064" cy="4218836"/>
+          </a:xfrm>
+          <a:prstGeom prst="rect">
+            <a:avLst/>
+          </a:prstGeom>
+        </p:spPr>
+      </p:pic>
+    </p:spTree>
+    <p:extLst>
+      <p:ext uri="{BB962C8B-B14F-4D97-AF65-F5344CB8AC3E}">
+        <p14:creationId xmlns:p14="http://schemas.microsoft.com/office/powerpoint/2010/main" val="3890521628"/>
+      </p:ext>
+    </p:extLst>
+  </p:cSld>
+  <p:clrMapOvr>
+    <a:masterClrMapping/>
+  </p:clrMapOvr>
+</p:sld>
+</file>
+
+<file path=ppt/slides/slide13.xml><?xml version="1.0" encoding="utf-8"?>
+<p:sld xmlns:a="http://schemas.openxmlformats.org/drawingml/2006/main" xmlns:r="http://schemas.openxmlformats.org/officeDocument/2006/relationships" xmlns:p="http://schemas.openxmlformats.org/presentationml/2006/main">
+  <p:cSld>
+    <p:bg>
+      <p:bgPr>
+        <a:solidFill>
+          <a:schemeClr val="bg1">
+            <a:lumMod val="95000"/>
+          </a:schemeClr>
+        </a:solidFill>
+        <a:effectLst/>
+      </p:bgPr>
+    </p:bg>
+    <p:spTree>
+      <p:nvGrpSpPr>
+        <p:cNvPr id="1" name=""/>
+        <p:cNvGrpSpPr/>
+        <p:nvPr/>
+      </p:nvGrpSpPr>
+      <p:grpSpPr>
+        <a:xfrm>
+          <a:off x="0" y="0"/>
+          <a:ext cx="0" cy="0"/>
+          <a:chOff x="0" y="0"/>
+          <a:chExt cx="0" cy="0"/>
+        </a:xfrm>
+      </p:grpSpPr>
+      <p:sp>
+        <p:nvSpPr>
+          <p:cNvPr id="9" name="Rectangle 6">
+            <a:extLst>
+              <a:ext uri="{FF2B5EF4-FFF2-40B4-BE49-F238E27FC236}">
+                <a16:creationId xmlns:a16="http://schemas.microsoft.com/office/drawing/2014/main" id="{6C2A9291-55AD-4DDC-8735-1BA5A1C98CC5}"/>
+              </a:ext>
+              <a:ext uri="{C183D7F6-B498-43B3-948B-1728B52AA6E4}">
+                <adec:decorative xmlns:adec="http://schemas.microsoft.com/office/drawing/2017/decorative" val="1"/>
+              </a:ext>
+            </a:extLst>
+          </p:cNvPr>
+          <p:cNvSpPr>
+            <a:spLocks noGrp="1" noRot="1" noChangeAspect="1" noMove="1" noResize="1" noEditPoints="1" noAdjustHandles="1" noChangeArrowheads="1" noChangeShapeType="1" noTextEdit="1"/>
+          </p:cNvSpPr>
+          <p:nvPr>
+            <p:extLst>
+              <p:ext uri="{386F3935-93C4-4BCD-93E2-E3B085C9AB24}">
+                <p16:designElem xmlns:p16="http://schemas.microsoft.com/office/powerpoint/2015/main" val="1"/>
+              </p:ext>
+            </p:extLst>
+          </p:nvPr>
+        </p:nvSpPr>
+        <p:spPr>
+          <a:xfrm>
+            <a:off x="0" y="0"/>
+            <a:ext cx="6096000" cy="6858000"/>
+          </a:xfrm>
+          <a:prstGeom prst="rect">
+            <a:avLst/>
+          </a:prstGeom>
+          <a:solidFill>
+            <a:schemeClr val="accent2"/>
+          </a:solidFill>
+          <a:ln>
+            <a:noFill/>
+          </a:ln>
+        </p:spPr>
+        <p:style>
+          <a:lnRef idx="2">
+            <a:schemeClr val="accent1">
+              <a:shade val="50000"/>
+            </a:schemeClr>
+          </a:lnRef>
+          <a:fillRef idx="1">
+            <a:schemeClr val="accent1"/>
+          </a:fillRef>
+          <a:effectRef idx="0">
+            <a:schemeClr val="accent1"/>
+          </a:effectRef>
+          <a:fontRef idx="minor">
+            <a:schemeClr val="lt1"/>
+          </a:fontRef>
+        </p:style>
+        <p:txBody>
+          <a:bodyPr rtlCol="0" anchor="ctr"/>
+          <a:lstStyle/>
+          <a:p>
+            <a:pPr algn="ctr"/>
+            <a:endParaRPr lang="en-US"/>
+          </a:p>
+        </p:txBody>
+      </p:sp>
+      <p:sp>
+        <p:nvSpPr>
+          <p:cNvPr id="2" name="Titel 1">
+            <a:extLst>
+              <a:ext uri="{FF2B5EF4-FFF2-40B4-BE49-F238E27FC236}">
+                <a16:creationId xmlns:a16="http://schemas.microsoft.com/office/drawing/2014/main" id="{F135171F-53AA-F3BB-AF7C-7AD01221C2BF}"/>
+              </a:ext>
+            </a:extLst>
+          </p:cNvPr>
+          <p:cNvSpPr>
+            <a:spLocks noGrp="1"/>
+          </p:cNvSpPr>
+          <p:nvPr>
+            <p:ph type="title"/>
+          </p:nvPr>
+        </p:nvSpPr>
+        <p:spPr>
+          <a:xfrm>
+            <a:off x="1752600" y="2542604"/>
+            <a:ext cx="8686800" cy="1772793"/>
+          </a:xfrm>
+          <a:prstGeom prst="rect">
+            <a:avLst/>
+          </a:prstGeom>
+          <a:solidFill>
+            <a:srgbClr val="FFFFFF"/>
+          </a:solidFill>
+          <a:ln>
+            <a:solidFill>
+              <a:srgbClr val="404040"/>
+            </a:solidFill>
+          </a:ln>
+        </p:spPr>
+        <p:txBody>
+          <a:bodyPr vert="horz" wrap="square" lIns="182880" tIns="182880" rIns="182880" bIns="182880" rtlCol="0" anchor="ctr">
+            <a:normAutofit/>
+          </a:bodyPr>
+          <a:lstStyle/>
+          <a:p>
+            <a:r>
+              <a:rPr lang="en-US" sz="4800" kern="1200" cap="all" spc="200" baseline="0">
+                <a:solidFill>
+                  <a:srgbClr val="262626"/>
+                </a:solidFill>
+                <a:latin typeface="+mj-lt"/>
+                <a:ea typeface="+mj-ea"/>
+                <a:cs typeface="+mj-cs"/>
+              </a:rPr>
+              <a:t>Demo</a:t>
+            </a:r>
+          </a:p>
+        </p:txBody>
+      </p:sp>
+    </p:spTree>
+    <p:extLst>
+      <p:ext uri="{BB962C8B-B14F-4D97-AF65-F5344CB8AC3E}">
+        <p14:creationId xmlns:p14="http://schemas.microsoft.com/office/powerpoint/2010/main" val="3912055922"/>
+      </p:ext>
+    </p:extLst>
+  </p:cSld>
+  <p:clrMapOvr>
+    <a:masterClrMapping/>
+  </p:clrMapOvr>
+</p:sld>
+</file>
+
+<file path=ppt/slides/slide14.xml><?xml version="1.0" encoding="utf-8"?>
+<p:sld xmlns:a="http://schemas.openxmlformats.org/drawingml/2006/main" xmlns:r="http://schemas.openxmlformats.org/officeDocument/2006/relationships" xmlns:p="http://schemas.openxmlformats.org/presentationml/2006/main">
+  <p:cSld>
+    <p:spTree>
+      <p:nvGrpSpPr>
+        <p:cNvPr id="1" name=""/>
+        <p:cNvGrpSpPr/>
+        <p:nvPr/>
+      </p:nvGrpSpPr>
+      <p:grpSpPr>
+        <a:xfrm>
+          <a:off x="0" y="0"/>
+          <a:ext cx="0" cy="0"/>
+          <a:chOff x="0" y="0"/>
+          <a:chExt cx="0" cy="0"/>
+        </a:xfrm>
+      </p:grpSpPr>
+      <p:sp>
+        <p:nvSpPr>
+          <p:cNvPr id="2" name="Titel 1">
+            <a:extLst>
+              <a:ext uri="{FF2B5EF4-FFF2-40B4-BE49-F238E27FC236}">
+                <a16:creationId xmlns:a16="http://schemas.microsoft.com/office/drawing/2014/main" id="{E6586A7A-2B44-B8FC-42B7-78F160351763}"/>
+              </a:ext>
+            </a:extLst>
+          </p:cNvPr>
+          <p:cNvSpPr>
+            <a:spLocks noGrp="1"/>
+          </p:cNvSpPr>
+          <p:nvPr>
+            <p:ph type="title"/>
+          </p:nvPr>
+        </p:nvSpPr>
+        <p:spPr/>
+        <p:txBody>
+          <a:bodyPr/>
+          <a:lstStyle/>
+          <a:p>
+            <a:r>
+              <a:rPr lang="en-GB" dirty="0">
+                <a:latin typeface="+mn-lt"/>
+              </a:rPr>
+              <a:t>Why you should choose </a:t>
+            </a:r>
+            <a:r>
+              <a:rPr lang="en-GB" dirty="0" err="1">
+                <a:latin typeface="+mn-lt"/>
+              </a:rPr>
+              <a:t>GENE</a:t>
+            </a:r>
+            <a:r>
+              <a:rPr lang="en-GB" cap="none" dirty="0" err="1">
+                <a:latin typeface="+mn-lt"/>
+              </a:rPr>
+              <a:t>ius</a:t>
+            </a:r>
+            <a:endParaRPr lang="en-GB" dirty="0">
+              <a:latin typeface="+mn-lt"/>
+            </a:endParaRPr>
+          </a:p>
+        </p:txBody>
+      </p:sp>
+      <p:sp>
+        <p:nvSpPr>
+          <p:cNvPr id="3" name="Inhaltsplatzhalter 2">
+            <a:extLst>
+              <a:ext uri="{FF2B5EF4-FFF2-40B4-BE49-F238E27FC236}">
+                <a16:creationId xmlns:a16="http://schemas.microsoft.com/office/drawing/2014/main" id="{A74EE8E4-153F-AECE-1F7A-36FA7F5D3B41}"/>
+              </a:ext>
+            </a:extLst>
+          </p:cNvPr>
+          <p:cNvSpPr>
+            <a:spLocks noGrp="1"/>
+          </p:cNvSpPr>
+          <p:nvPr>
+            <p:ph idx="1"/>
+          </p:nvPr>
+        </p:nvSpPr>
+        <p:spPr/>
+        <p:txBody>
+          <a:bodyPr/>
+          <a:lstStyle/>
+          <a:p>
+            <a:r>
+              <a:rPr lang="en-GB" dirty="0"/>
+              <a:t>Because we are genius - seriously ;)</a:t>
+            </a:r>
+          </a:p>
+          <a:p>
+            <a:r>
+              <a:rPr lang="en-GB" dirty="0"/>
+              <a:t>Outlook</a:t>
+            </a:r>
+          </a:p>
+          <a:p>
+            <a:r>
+              <a:rPr lang="en-GB" dirty="0"/>
+              <a:t>Highlights</a:t>
+            </a:r>
+          </a:p>
+          <a:p>
+            <a:r>
+              <a:rPr lang="en-GB" dirty="0"/>
+              <a:t>Pros and Cons</a:t>
+            </a:r>
+          </a:p>
+          <a:p>
+            <a:r>
+              <a:rPr lang="en-GB" dirty="0"/>
+              <a:t>What went well, what didn’t go </a:t>
+            </a:r>
+            <a:r>
+              <a:rPr lang="en-GB"/>
+              <a:t>as planned</a:t>
+            </a:r>
+            <a:endParaRPr lang="en-GB" dirty="0"/>
+          </a:p>
+          <a:p>
+            <a:r>
+              <a:rPr lang="en-GB" dirty="0"/>
+              <a:t>…  </a:t>
+            </a:r>
+          </a:p>
+        </p:txBody>
+      </p:sp>
+    </p:spTree>
+    <p:extLst>
+      <p:ext uri="{BB962C8B-B14F-4D97-AF65-F5344CB8AC3E}">
+        <p14:creationId xmlns:p14="http://schemas.microsoft.com/office/powerpoint/2010/main" val="2759083719"/>
+      </p:ext>
+    </p:extLst>
+  </p:cSld>
+  <p:clrMapOvr>
+    <a:masterClrMapping/>
+  </p:clrMapOvr>
+</p:sld>
+</file>
+
 <file path=ppt/slides/slide2.xml><?xml version="1.0" encoding="utf-8"?>
 <p:sld xmlns:a="http://schemas.openxmlformats.org/drawingml/2006/main" xmlns:r="http://schemas.openxmlformats.org/officeDocument/2006/relationships" xmlns:p="http://schemas.openxmlformats.org/presentationml/2006/main">
   <p:cSld>
@@ -3642,73 +4822,73 @@
         </p:spPr>
         <p:txBody>
           <a:bodyPr>
-            <a:normAutofit lnSpcReduction="10000"/>
+            <a:normAutofit/>
           </a:bodyPr>
           <a:lstStyle/>
           <a:p>
             <a:r>
-              <a:rPr lang="en-GB" sz="2800" dirty="0"/>
+              <a:rPr lang="en-GB" sz="2400" dirty="0"/>
               <a:t>Data overview</a:t>
             </a:r>
           </a:p>
           <a:p>
             <a:r>
-              <a:rPr lang="en-GB" sz="2800" dirty="0"/>
+              <a:rPr lang="en-GB" sz="2400" dirty="0"/>
               <a:t>System landscape</a:t>
             </a:r>
           </a:p>
           <a:p>
             <a:r>
-              <a:rPr lang="en-GB" sz="2800" dirty="0"/>
+              <a:rPr lang="en-GB" sz="2400" dirty="0"/>
               <a:t>Implementation</a:t>
             </a:r>
           </a:p>
           <a:p>
             <a:pPr lvl="1"/>
             <a:r>
+              <a:rPr lang="en-GB" sz="2000" dirty="0"/>
+              <a:t>Gene Service (API)</a:t>
+            </a:r>
+          </a:p>
+          <a:p>
+            <a:pPr lvl="1"/>
+            <a:r>
+              <a:rPr lang="en-GB" sz="2000" dirty="0"/>
+              <a:t>Gene Webapp (Java </a:t>
+            </a:r>
+            <a:r>
+              <a:rPr lang="en-GB" sz="2000" dirty="0" err="1"/>
+              <a:t>PrimeFaces</a:t>
+            </a:r>
+            <a:r>
+              <a:rPr lang="en-GB" sz="2000" dirty="0"/>
+              <a:t>)</a:t>
+            </a:r>
+          </a:p>
+          <a:p>
+            <a:pPr lvl="1"/>
+            <a:r>
+              <a:rPr lang="en-GB" sz="2000" dirty="0"/>
+              <a:t>Gene </a:t>
+            </a:r>
+            <a:r>
+              <a:rPr lang="en-GB" sz="2000" dirty="0" err="1"/>
+              <a:t>Reactapp</a:t>
+            </a:r>
+            <a:r>
+              <a:rPr lang="en-GB" sz="2000" dirty="0"/>
+              <a:t> (React.JS Webapp)</a:t>
+            </a:r>
+          </a:p>
+          <a:p>
+            <a:r>
               <a:rPr lang="en-GB" sz="2400" dirty="0"/>
-              <a:t>Gene Service (API)</a:t>
-            </a:r>
-          </a:p>
-          <a:p>
-            <a:pPr lvl="1"/>
+              <a:t>Demo</a:t>
+            </a:r>
+          </a:p>
+          <a:p>
             <a:r>
               <a:rPr lang="en-GB" sz="2400" dirty="0"/>
-              <a:t>Gene Webapp (Java </a:t>
-            </a:r>
-            <a:r>
-              <a:rPr lang="en-GB" sz="2400" dirty="0" err="1"/>
-              <a:t>PrimeFaces</a:t>
-            </a:r>
-            <a:r>
-              <a:rPr lang="en-GB" sz="2400" dirty="0"/>
-              <a:t>)</a:t>
-            </a:r>
-          </a:p>
-          <a:p>
-            <a:pPr lvl="1"/>
-            <a:r>
-              <a:rPr lang="en-GB" sz="2400" dirty="0"/>
-              <a:t>Gene </a:t>
-            </a:r>
-            <a:r>
-              <a:rPr lang="en-GB" sz="2400" dirty="0" err="1"/>
-              <a:t>Reactapp</a:t>
-            </a:r>
-            <a:r>
-              <a:rPr lang="en-GB" sz="2400" dirty="0"/>
-              <a:t> (React.JS Webapp)</a:t>
-            </a:r>
-          </a:p>
-          <a:p>
-            <a:r>
-              <a:rPr lang="en-GB" sz="2800" dirty="0"/>
-              <a:t>Demo</a:t>
-            </a:r>
-          </a:p>
-          <a:p>
-            <a:r>
-              <a:rPr lang="en-GB" sz="2800" dirty="0"/>
               <a:t>Outlook</a:t>
             </a:r>
           </a:p>
@@ -3838,7 +5018,15 @@
             </a:r>
             <a:r>
               <a:rPr lang="de-CH" dirty="0"/>
-              <a:t> (~36.5M </a:t>
+              <a:t> (~</a:t>
+            </a:r>
+            <a:r>
+              <a:rPr lang="de-CH" b="1" dirty="0"/>
+              <a:t>36.5M</a:t>
+            </a:r>
+            <a:r>
+              <a:rPr lang="de-CH" dirty="0"/>
+              <a:t> </a:t>
             </a:r>
             <a:r>
               <a:rPr lang="de-CH" dirty="0" err="1"/>
@@ -3846,7 +5034,15 @@
             </a:r>
             <a:r>
               <a:rPr lang="de-CH" dirty="0"/>
-              <a:t>, ~5GB) </a:t>
+              <a:t>, ~</a:t>
+            </a:r>
+            <a:r>
+              <a:rPr lang="de-CH" b="1" dirty="0"/>
+              <a:t>5GB</a:t>
+            </a:r>
+            <a:r>
+              <a:rPr lang="de-CH" dirty="0"/>
+              <a:t>) </a:t>
             </a:r>
             <a:r>
               <a:rPr lang="de-CH" dirty="0" err="1"/>
@@ -3890,90 +5086,6 @@
               </a:lnSpc>
             </a:pPr>
             <a:endParaRPr lang="de-CH" dirty="0"/>
-          </a:p>
-          <a:p>
-            <a:pPr>
-              <a:lnSpc>
-                <a:spcPct val="90000"/>
-              </a:lnSpc>
-            </a:pPr>
-            <a:r>
-              <a:rPr lang="de-CH" dirty="0"/>
-              <a:t>protein-</a:t>
-            </a:r>
-            <a:r>
-              <a:rPr lang="de-CH" dirty="0" err="1"/>
-              <a:t>coding</a:t>
-            </a:r>
-            <a:r>
-              <a:rPr lang="de-CH" dirty="0"/>
-              <a:t> 30142041 </a:t>
-            </a:r>
-            <a:r>
-              <a:rPr lang="de-CH" dirty="0" err="1"/>
-              <a:t>ncRNA</a:t>
-            </a:r>
-            <a:r>
-              <a:rPr lang="de-CH" dirty="0"/>
-              <a:t> 2314143 pseudo 1780387 tRNA 1333433 rRNA 297066 </a:t>
-            </a:r>
-            <a:r>
-              <a:rPr lang="de-CH" dirty="0" err="1"/>
-              <a:t>snoRNA</a:t>
-            </a:r>
-            <a:r>
-              <a:rPr lang="de-CH" dirty="0"/>
-              <a:t> 288629 </a:t>
-            </a:r>
-            <a:r>
-              <a:rPr lang="de-CH" dirty="0" err="1"/>
-              <a:t>snRNA</a:t>
-            </a:r>
-            <a:r>
-              <a:rPr lang="de-CH" dirty="0"/>
-              <a:t> 241286 </a:t>
-            </a:r>
-            <a:r>
-              <a:rPr lang="de-CH" dirty="0" err="1"/>
-              <a:t>other</a:t>
-            </a:r>
-            <a:r>
-              <a:rPr lang="de-CH" dirty="0"/>
-              <a:t> 78773 </a:t>
-            </a:r>
-            <a:r>
-              <a:rPr lang="de-CH" dirty="0" err="1"/>
-              <a:t>unknown</a:t>
-            </a:r>
-            <a:r>
-              <a:rPr lang="de-CH" dirty="0"/>
-              <a:t> 60416 </a:t>
-            </a:r>
-            <a:r>
-              <a:rPr lang="de-CH" dirty="0" err="1"/>
-              <a:t>biological</a:t>
-            </a:r>
-            <a:r>
-              <a:rPr lang="de-CH" dirty="0"/>
-              <a:t>-region 9463 </a:t>
-            </a:r>
-            <a:r>
-              <a:rPr lang="de-CH" dirty="0" err="1"/>
-              <a:t>miscRNA</a:t>
-            </a:r>
-            <a:r>
-              <a:rPr lang="de-CH" dirty="0"/>
-              <a:t> 5979 </a:t>
-            </a:r>
-            <a:r>
-              <a:rPr lang="de-CH" dirty="0" err="1"/>
-              <a:t>scRNA</a:t>
-            </a:r>
-            <a:r>
-              <a:rPr lang="de-CH" dirty="0"/>
-              <a:t> 21</a:t>
-            </a:r>
-            <a:endParaRPr lang="en-GB" dirty="0"/>
           </a:p>
         </p:txBody>
       </p:sp>
@@ -4134,6 +5246,107 @@
           </a:prstGeom>
         </p:spPr>
       </p:pic>
+      <p:pic>
+        <p:nvPicPr>
+          <p:cNvPr id="6" name="Grafik 5">
+            <a:extLst>
+              <a:ext uri="{FF2B5EF4-FFF2-40B4-BE49-F238E27FC236}">
+                <a16:creationId xmlns:a16="http://schemas.microsoft.com/office/drawing/2014/main" id="{88F09D84-D80B-B811-FF52-5E0BBAB8400A}"/>
+              </a:ext>
+            </a:extLst>
+          </p:cNvPr>
+          <p:cNvPicPr>
+            <a:picLocks noChangeAspect="1"/>
+          </p:cNvPicPr>
+          <p:nvPr/>
+        </p:nvPicPr>
+        <p:blipFill>
+          <a:blip r:embed="rId4"/>
+          <a:stretch>
+            <a:fillRect/>
+          </a:stretch>
+        </p:blipFill>
+        <p:spPr>
+          <a:xfrm>
+            <a:off x="974808" y="3891341"/>
+            <a:ext cx="4684356" cy="2756599"/>
+          </a:xfrm>
+          <a:prstGeom prst="rect">
+            <a:avLst/>
+          </a:prstGeom>
+        </p:spPr>
+      </p:pic>
+      <p:sp>
+        <p:nvSpPr>
+          <p:cNvPr id="7" name="Textfeld 6">
+            <a:extLst>
+              <a:ext uri="{FF2B5EF4-FFF2-40B4-BE49-F238E27FC236}">
+                <a16:creationId xmlns:a16="http://schemas.microsoft.com/office/drawing/2014/main" id="{1DA8BC56-67A1-24FD-36E7-721BDCA5DCB6}"/>
+              </a:ext>
+            </a:extLst>
+          </p:cNvPr>
+          <p:cNvSpPr txBox="1"/>
+          <p:nvPr/>
+        </p:nvSpPr>
+        <p:spPr>
+          <a:xfrm>
+            <a:off x="3038166" y="3659657"/>
+            <a:ext cx="1376517" cy="307777"/>
+          </a:xfrm>
+          <a:prstGeom prst="rect">
+            <a:avLst/>
+          </a:prstGeom>
+          <a:noFill/>
+        </p:spPr>
+        <p:txBody>
+          <a:bodyPr wrap="square" rtlCol="0">
+            <a:spAutoFit/>
+          </a:bodyPr>
+          <a:lstStyle/>
+          <a:p>
+            <a:r>
+              <a:rPr lang="en-GB" sz="1400" b="1" dirty="0"/>
+              <a:t>Gene types</a:t>
+            </a:r>
+          </a:p>
+        </p:txBody>
+      </p:sp>
+      <p:sp>
+        <p:nvSpPr>
+          <p:cNvPr id="11" name="Textfeld 10">
+            <a:extLst>
+              <a:ext uri="{FF2B5EF4-FFF2-40B4-BE49-F238E27FC236}">
+                <a16:creationId xmlns:a16="http://schemas.microsoft.com/office/drawing/2014/main" id="{5264F720-7897-80D8-EA2F-6D23FEA64D25}"/>
+              </a:ext>
+            </a:extLst>
+          </p:cNvPr>
+          <p:cNvSpPr txBox="1"/>
+          <p:nvPr/>
+        </p:nvSpPr>
+        <p:spPr>
+          <a:xfrm>
+            <a:off x="7553762" y="5893308"/>
+            <a:ext cx="2220366" cy="307777"/>
+          </a:xfrm>
+          <a:prstGeom prst="rect">
+            <a:avLst/>
+          </a:prstGeom>
+          <a:noFill/>
+        </p:spPr>
+        <p:txBody>
+          <a:bodyPr wrap="square" rtlCol="0">
+            <a:spAutoFit/>
+          </a:bodyPr>
+          <a:lstStyle/>
+          <a:p>
+            <a:pPr algn="ctr"/>
+            <a:r>
+              <a:rPr lang="en-GB" sz="1400" b="1" dirty="0"/>
+              <a:t>MySQL  -  ERD</a:t>
+            </a:r>
+          </a:p>
+        </p:txBody>
+      </p:sp>
     </p:spTree>
     <p:extLst>
       <p:ext uri="{BB962C8B-B14F-4D97-AF65-F5344CB8AC3E}">
@@ -4325,7 +5538,7 @@
           <a:p>
             <a:r>
               <a:rPr lang="en-GB" dirty="0"/>
-              <a:t>Implementation</a:t>
+              <a:t>Implementation – Basic Features</a:t>
             </a:r>
           </a:p>
         </p:txBody>
@@ -4348,74 +5561,39 @@
         </p:nvSpPr>
         <p:spPr/>
         <p:txBody>
-          <a:bodyPr/>
-          <a:lstStyle/>
-          <a:p>
-            <a:r>
-              <a:rPr lang="en-GB" dirty="0"/>
-              <a:t>Mention additional features in Gene Service und </a:t>
-            </a:r>
-            <a:r>
-              <a:rPr lang="en-GB" dirty="0" err="1"/>
-              <a:t>Genewegapp</a:t>
-            </a:r>
-            <a:r>
-              <a:rPr lang="en-GB" dirty="0"/>
-              <a:t> 1-3 slides</a:t>
-            </a:r>
-          </a:p>
-          <a:p>
-            <a:endParaRPr lang="en-GB" dirty="0"/>
-          </a:p>
-        </p:txBody>
-      </p:sp>
-      <p:pic>
-        <p:nvPicPr>
-          <p:cNvPr id="1026" name="Picture 2">
-            <a:extLst>
-              <a:ext uri="{FF2B5EF4-FFF2-40B4-BE49-F238E27FC236}">
-                <a16:creationId xmlns:a16="http://schemas.microsoft.com/office/drawing/2014/main" id="{B832747D-1E5F-4E1C-6D92-7281E8E7AB99}"/>
-              </a:ext>
-            </a:extLst>
-          </p:cNvPr>
-          <p:cNvPicPr>
-            <a:picLocks noChangeAspect="1" noChangeArrowheads="1"/>
-          </p:cNvPicPr>
-          <p:nvPr/>
-        </p:nvPicPr>
-        <p:blipFill>
-          <a:blip r:embed="rId2">
-            <a:extLst>
-              <a:ext uri="{28A0092B-C50C-407E-A947-70E740481C1C}">
-                <a14:useLocalDpi xmlns:a14="http://schemas.microsoft.com/office/drawing/2010/main" val="0"/>
-              </a:ext>
-            </a:extLst>
-          </a:blip>
-          <a:srcRect/>
-          <a:stretch>
-            <a:fillRect/>
-          </a:stretch>
-        </p:blipFill>
-        <p:spPr bwMode="auto">
-          <a:xfrm>
-            <a:off x="3190875" y="1252538"/>
-            <a:ext cx="5810250" cy="4352925"/>
-          </a:xfrm>
-          <a:prstGeom prst="rect">
-            <a:avLst/>
-          </a:prstGeom>
-          <a:noFill/>
-          <a:extLst>
-            <a:ext uri="{909E8E84-426E-40DD-AFC4-6F175D3DCCD1}">
-              <a14:hiddenFill xmlns:a14="http://schemas.microsoft.com/office/drawing/2010/main">
-                <a:solidFill>
-                  <a:srgbClr val="FFFFFF"/>
-                </a:solidFill>
-              </a14:hiddenFill>
-            </a:ext>
-          </a:extLst>
-        </p:spPr>
-      </p:pic>
+          <a:bodyPr>
+            <a:normAutofit/>
+          </a:bodyPr>
+          <a:lstStyle/>
+          <a:p>
+            <a:r>
+              <a:rPr lang="en-GB" sz="2800" dirty="0"/>
+              <a:t>Basic functionality working:</a:t>
+            </a:r>
+          </a:p>
+          <a:p>
+            <a:pPr lvl="1"/>
+            <a:r>
+              <a:rPr lang="en-GB" sz="2400" dirty="0"/>
+              <a:t>Searching by ID, symbol and description</a:t>
+            </a:r>
+          </a:p>
+          <a:p>
+            <a:pPr lvl="1"/>
+            <a:r>
+              <a:rPr lang="en-GB" sz="2400" dirty="0"/>
+              <a:t>Webapp calling API</a:t>
+            </a:r>
+          </a:p>
+          <a:p>
+            <a:pPr lvl="1"/>
+            <a:r>
+              <a:rPr lang="en-GB" sz="2400" dirty="0"/>
+              <a:t>Displaying Gene results in table</a:t>
+            </a:r>
+          </a:p>
+        </p:txBody>
+      </p:sp>
     </p:spTree>
     <p:extLst>
       <p:ext uri="{BB962C8B-B14F-4D97-AF65-F5344CB8AC3E}">
@@ -4432,6 +5610,16 @@
 <file path=ppt/slides/slide6.xml><?xml version="1.0" encoding="utf-8"?>
 <p:sld xmlns:a="http://schemas.openxmlformats.org/drawingml/2006/main" xmlns:r="http://schemas.openxmlformats.org/officeDocument/2006/relationships" xmlns:p="http://schemas.openxmlformats.org/presentationml/2006/main">
   <p:cSld>
+    <p:bg>
+      <p:bgPr>
+        <a:solidFill>
+          <a:schemeClr val="bg1">
+            <a:lumMod val="95000"/>
+          </a:schemeClr>
+        </a:solidFill>
+        <a:effectLst/>
+      </p:bgPr>
+    </p:bg>
     <p:spTree>
       <p:nvGrpSpPr>
         <p:cNvPr id="1" name=""/>
@@ -4462,14 +5650,21 @@
             <p:ph type="title"/>
           </p:nvPr>
         </p:nvSpPr>
-        <p:spPr/>
-        <p:txBody>
-          <a:bodyPr/>
-          <a:lstStyle/>
-          <a:p>
-            <a:r>
-              <a:rPr lang="en-GB" dirty="0"/>
-              <a:t>Implementation</a:t>
+        <p:spPr>
+          <a:xfrm>
+            <a:off x="804672" y="964692"/>
+            <a:ext cx="3523946" cy="1188720"/>
+          </a:xfrm>
+        </p:spPr>
+        <p:txBody>
+          <a:bodyPr>
+            <a:normAutofit/>
+          </a:bodyPr>
+          <a:lstStyle/>
+          <a:p>
+            <a:r>
+              <a:rPr lang="en-GB" sz="1800" dirty="0"/>
+              <a:t>Implementation – Additional Features</a:t>
             </a:r>
           </a:p>
         </p:txBody>
@@ -4490,25 +5685,247 @@
             <p:ph idx="1"/>
           </p:nvPr>
         </p:nvSpPr>
-        <p:spPr/>
-        <p:txBody>
-          <a:bodyPr/>
-          <a:lstStyle/>
-          <a:p>
-            <a:r>
-              <a:rPr lang="en-GB" dirty="0"/>
-              <a:t>Gene React app (mention features)</a:t>
-            </a:r>
-          </a:p>
-          <a:p>
-            <a:endParaRPr lang="en-GB" dirty="0"/>
-          </a:p>
-        </p:txBody>
-      </p:sp>
+        <p:spPr>
+          <a:xfrm>
+            <a:off x="803244" y="2638044"/>
+            <a:ext cx="3523946" cy="3263206"/>
+          </a:xfrm>
+        </p:spPr>
+        <p:txBody>
+          <a:bodyPr>
+            <a:normAutofit/>
+          </a:bodyPr>
+          <a:lstStyle/>
+          <a:p>
+            <a:r>
+              <a:rPr lang="en-GB" sz="2400" dirty="0"/>
+              <a:t>Added custom styling with Bootstrap 5</a:t>
+            </a:r>
+            <a:r>
+              <a:rPr lang="en-GB" sz="2000" dirty="0"/>
+              <a:t>: </a:t>
+            </a:r>
+          </a:p>
+          <a:p>
+            <a:pPr marL="228600" lvl="1" indent="0">
+              <a:buNone/>
+            </a:pPr>
+            <a:r>
+              <a:rPr lang="en-US" sz="2000" dirty="0"/>
+              <a:t>HTML, CSS, and JS             UI-framework for creating responsive, mobile-first websites</a:t>
+            </a:r>
+            <a:endParaRPr lang="en-GB" sz="2000" dirty="0"/>
+          </a:p>
+        </p:txBody>
+      </p:sp>
+      <p:sp>
+        <p:nvSpPr>
+          <p:cNvPr id="10" name="Rectangle 9">
+            <a:extLst>
+              <a:ext uri="{FF2B5EF4-FFF2-40B4-BE49-F238E27FC236}">
+                <a16:creationId xmlns:a16="http://schemas.microsoft.com/office/drawing/2014/main" id="{6515FC82-3453-4CBE-8895-4CCFF339529E}"/>
+              </a:ext>
+              <a:ext uri="{C183D7F6-B498-43B3-948B-1728B52AA6E4}">
+                <adec:decorative xmlns:adec="http://schemas.microsoft.com/office/drawing/2017/decorative" val="1"/>
+              </a:ext>
+            </a:extLst>
+          </p:cNvPr>
+          <p:cNvSpPr>
+            <a:spLocks noGrp="1" noRot="1" noChangeAspect="1" noMove="1" noResize="1" noEditPoints="1" noAdjustHandles="1" noChangeArrowheads="1" noChangeShapeType="1" noTextEdit="1"/>
+          </p:cNvSpPr>
+          <p:nvPr>
+            <p:extLst>
+              <p:ext uri="{386F3935-93C4-4BCD-93E2-E3B085C9AB24}">
+                <p16:designElem xmlns:p16="http://schemas.microsoft.com/office/powerpoint/2015/main" val="1"/>
+              </p:ext>
+            </p:extLst>
+          </p:nvPr>
+        </p:nvSpPr>
+        <p:spPr>
+          <a:xfrm>
+            <a:off x="4494182" y="964692"/>
+            <a:ext cx="6885432" cy="4936558"/>
+          </a:xfrm>
+          <a:prstGeom prst="rect">
+            <a:avLst/>
+          </a:prstGeom>
+          <a:noFill/>
+          <a:ln w="31750" cap="sq">
+            <a:solidFill>
+              <a:srgbClr val="FFFFFF"/>
+            </a:solidFill>
+            <a:miter lim="800000"/>
+          </a:ln>
+        </p:spPr>
+        <p:style>
+          <a:lnRef idx="2">
+            <a:schemeClr val="accent1">
+              <a:shade val="50000"/>
+            </a:schemeClr>
+          </a:lnRef>
+          <a:fillRef idx="1">
+            <a:schemeClr val="accent1"/>
+          </a:fillRef>
+          <a:effectRef idx="0">
+            <a:schemeClr val="accent1"/>
+          </a:effectRef>
+          <a:fontRef idx="minor">
+            <a:schemeClr val="lt1"/>
+          </a:fontRef>
+        </p:style>
+        <p:txBody>
+          <a:bodyPr rtlCol="0" anchor="ctr"/>
+          <a:lstStyle/>
+          <a:p>
+            <a:pPr algn="ctr"/>
+            <a:endParaRPr lang="en-US" dirty="0"/>
+          </a:p>
+        </p:txBody>
+      </p:sp>
+      <p:sp>
+        <p:nvSpPr>
+          <p:cNvPr id="12" name="Rectangle 11">
+            <a:extLst>
+              <a:ext uri="{FF2B5EF4-FFF2-40B4-BE49-F238E27FC236}">
+                <a16:creationId xmlns:a16="http://schemas.microsoft.com/office/drawing/2014/main" id="{C5FD847B-65C0-4027-8DFC-70CB424514F8}"/>
+              </a:ext>
+              <a:ext uri="{C183D7F6-B498-43B3-948B-1728B52AA6E4}">
+                <adec:decorative xmlns:adec="http://schemas.microsoft.com/office/drawing/2017/decorative" val="1"/>
+              </a:ext>
+            </a:extLst>
+          </p:cNvPr>
+          <p:cNvSpPr>
+            <a:spLocks noGrp="1" noRot="1" noChangeAspect="1" noMove="1" noResize="1" noEditPoints="1" noAdjustHandles="1" noChangeArrowheads="1" noChangeShapeType="1" noTextEdit="1"/>
+          </p:cNvSpPr>
+          <p:nvPr>
+            <p:extLst>
+              <p:ext uri="{386F3935-93C4-4BCD-93E2-E3B085C9AB24}">
+                <p16:designElem xmlns:p16="http://schemas.microsoft.com/office/powerpoint/2015/main" val="1"/>
+              </p:ext>
+            </p:extLst>
+          </p:nvPr>
+        </p:nvSpPr>
+        <p:spPr>
+          <a:xfrm>
+            <a:off x="4657802" y="1128683"/>
+            <a:ext cx="6558192" cy="4608576"/>
+          </a:xfrm>
+          <a:prstGeom prst="rect">
+            <a:avLst/>
+          </a:prstGeom>
+          <a:solidFill>
+            <a:srgbClr val="FFFFFF"/>
+          </a:solidFill>
+          <a:ln>
+            <a:noFill/>
+          </a:ln>
+        </p:spPr>
+        <p:style>
+          <a:lnRef idx="2">
+            <a:schemeClr val="accent1">
+              <a:shade val="50000"/>
+            </a:schemeClr>
+          </a:lnRef>
+          <a:fillRef idx="1">
+            <a:schemeClr val="accent1"/>
+          </a:fillRef>
+          <a:effectRef idx="0">
+            <a:schemeClr val="accent1"/>
+          </a:effectRef>
+          <a:fontRef idx="minor">
+            <a:schemeClr val="lt1"/>
+          </a:fontRef>
+        </p:style>
+        <p:txBody>
+          <a:bodyPr rtlCol="0" anchor="ctr"/>
+          <a:lstStyle/>
+          <a:p>
+            <a:pPr algn="ctr"/>
+            <a:endParaRPr lang="en-US"/>
+          </a:p>
+        </p:txBody>
+      </p:sp>
+      <p:pic>
+        <p:nvPicPr>
+          <p:cNvPr id="5" name="Grafik 4">
+            <a:extLst>
+              <a:ext uri="{FF2B5EF4-FFF2-40B4-BE49-F238E27FC236}">
+                <a16:creationId xmlns:a16="http://schemas.microsoft.com/office/drawing/2014/main" id="{6F3E50FB-9094-3739-5A03-51FBFC6F1B00}"/>
+              </a:ext>
+            </a:extLst>
+          </p:cNvPr>
+          <p:cNvPicPr>
+            <a:picLocks noChangeAspect="1"/>
+          </p:cNvPicPr>
+          <p:nvPr/>
+        </p:nvPicPr>
+        <p:blipFill>
+          <a:blip r:embed="rId2"/>
+          <a:stretch>
+            <a:fillRect/>
+          </a:stretch>
+        </p:blipFill>
+        <p:spPr>
+          <a:xfrm>
+            <a:off x="4823366" y="1518149"/>
+            <a:ext cx="6227064" cy="3829643"/>
+          </a:xfrm>
+          <a:prstGeom prst="rect">
+            <a:avLst/>
+          </a:prstGeom>
+        </p:spPr>
+      </p:pic>
+      <p:pic>
+        <p:nvPicPr>
+          <p:cNvPr id="1029" name="Picture 5" descr="Bootstrap 5 is Here! | Data Crayon">
+            <a:extLst>
+              <a:ext uri="{FF2B5EF4-FFF2-40B4-BE49-F238E27FC236}">
+                <a16:creationId xmlns:a16="http://schemas.microsoft.com/office/drawing/2014/main" id="{0CF22EBA-0A7B-3AC4-7C4A-C92FED7E6DB7}"/>
+              </a:ext>
+            </a:extLst>
+          </p:cNvPr>
+          <p:cNvPicPr>
+            <a:picLocks noChangeAspect="1" noChangeArrowheads="1"/>
+          </p:cNvPicPr>
+          <p:nvPr/>
+        </p:nvPicPr>
+        <p:blipFill>
+          <a:blip r:embed="rId3">
+            <a:extLst>
+              <a:ext uri="{28A0092B-C50C-407E-A947-70E740481C1C}">
+                <a14:useLocalDpi xmlns:a14="http://schemas.microsoft.com/office/drawing/2010/main" val="0"/>
+              </a:ext>
+            </a:extLst>
+          </a:blip>
+          <a:srcRect/>
+          <a:stretch>
+            <a:fillRect/>
+          </a:stretch>
+        </p:blipFill>
+        <p:spPr bwMode="auto">
+          <a:xfrm>
+            <a:off x="1482985" y="5368414"/>
+            <a:ext cx="2164464" cy="1217510"/>
+          </a:xfrm>
+          <a:prstGeom prst="rect">
+            <a:avLst/>
+          </a:prstGeom>
+          <a:noFill/>
+          <a:extLst>
+            <a:ext uri="{909E8E84-426E-40DD-AFC4-6F175D3DCCD1}">
+              <a14:hiddenFill xmlns:a14="http://schemas.microsoft.com/office/drawing/2010/main">
+                <a:solidFill>
+                  <a:srgbClr val="FFFFFF"/>
+                </a:solidFill>
+              </a14:hiddenFill>
+            </a:ext>
+          </a:extLst>
+        </p:spPr>
+      </p:pic>
     </p:spTree>
     <p:extLst>
       <p:ext uri="{BB962C8B-B14F-4D97-AF65-F5344CB8AC3E}">
-        <p14:creationId xmlns:p14="http://schemas.microsoft.com/office/powerpoint/2010/main" val="3890521628"/>
+        <p14:creationId xmlns:p14="http://schemas.microsoft.com/office/powerpoint/2010/main" val="310370189"/>
       </p:ext>
     </p:extLst>
   </p:cSld>
@@ -4540,7 +5957,7 @@
           <p:cNvPr id="2" name="Titel 1">
             <a:extLst>
               <a:ext uri="{FF2B5EF4-FFF2-40B4-BE49-F238E27FC236}">
-                <a16:creationId xmlns:a16="http://schemas.microsoft.com/office/drawing/2014/main" id="{F135171F-53AA-F3BB-AF7C-7AD01221C2BF}"/>
+                <a16:creationId xmlns:a16="http://schemas.microsoft.com/office/drawing/2014/main" id="{1218EECC-D69B-3BBB-CD69-F2FC31CEEB3F}"/>
               </a:ext>
             </a:extLst>
           </p:cNvPr>
@@ -4551,14 +5968,21 @@
             <p:ph type="title"/>
           </p:nvPr>
         </p:nvSpPr>
-        <p:spPr/>
-        <p:txBody>
-          <a:bodyPr/>
-          <a:lstStyle/>
-          <a:p>
-            <a:r>
-              <a:rPr lang="en-GB" dirty="0"/>
-              <a:t>Demo</a:t>
+        <p:spPr>
+          <a:xfrm>
+            <a:off x="804672" y="964692"/>
+            <a:ext cx="3523946" cy="1188720"/>
+          </a:xfrm>
+        </p:spPr>
+        <p:txBody>
+          <a:bodyPr>
+            <a:normAutofit/>
+          </a:bodyPr>
+          <a:lstStyle/>
+          <a:p>
+            <a:r>
+              <a:rPr lang="en-GB" sz="1800" dirty="0"/>
+              <a:t>Implementation – Additional Features</a:t>
             </a:r>
           </a:p>
         </p:txBody>
@@ -4568,7 +5992,7 @@
           <p:cNvPr id="3" name="Inhaltsplatzhalter 2">
             <a:extLst>
               <a:ext uri="{FF2B5EF4-FFF2-40B4-BE49-F238E27FC236}">
-                <a16:creationId xmlns:a16="http://schemas.microsoft.com/office/drawing/2014/main" id="{16C6F528-7CD7-CF89-C20F-31EBEC532823}"/>
+                <a16:creationId xmlns:a16="http://schemas.microsoft.com/office/drawing/2014/main" id="{8F6FA557-7EF8-9398-50C6-5CB2F5D4E4BE}"/>
               </a:ext>
             </a:extLst>
           </p:cNvPr>
@@ -4579,11 +6003,173 @@
             <p:ph idx="1"/>
           </p:nvPr>
         </p:nvSpPr>
-        <p:spPr/>
-        <p:txBody>
-          <a:bodyPr/>
-          <a:lstStyle/>
-          <a:p>
+        <p:spPr>
+          <a:xfrm>
+            <a:off x="803244" y="2638044"/>
+            <a:ext cx="3523946" cy="3263206"/>
+          </a:xfrm>
+        </p:spPr>
+        <p:txBody>
+          <a:bodyPr>
+            <a:normAutofit/>
+          </a:bodyPr>
+          <a:lstStyle/>
+          <a:p>
+            <a:r>
+              <a:rPr lang="de-CH" sz="2400" dirty="0" err="1"/>
+              <a:t>Added</a:t>
+            </a:r>
+            <a:r>
+              <a:rPr lang="de-CH" sz="2400" dirty="0"/>
+              <a:t> </a:t>
+            </a:r>
+            <a:r>
+              <a:rPr lang="de-CH" sz="2400" dirty="0" err="1"/>
+              <a:t>new</a:t>
+            </a:r>
+            <a:r>
+              <a:rPr lang="de-CH" sz="2400" dirty="0"/>
+              <a:t> </a:t>
+            </a:r>
+            <a:r>
+              <a:rPr lang="de-CH" sz="2400" dirty="0" err="1"/>
+              <a:t>column</a:t>
+            </a:r>
+            <a:r>
+              <a:rPr lang="de-CH" sz="2400" dirty="0"/>
+              <a:t> «</a:t>
+            </a:r>
+            <a:r>
+              <a:rPr lang="de-CH" sz="2400" dirty="0" err="1"/>
+              <a:t>TaxId</a:t>
+            </a:r>
+            <a:r>
+              <a:rPr lang="de-CH" sz="2400" dirty="0"/>
+              <a:t>»</a:t>
+            </a:r>
+          </a:p>
+          <a:p>
+            <a:r>
+              <a:rPr lang="de-CH" sz="2400" dirty="0"/>
+              <a:t>Extended Model </a:t>
+            </a:r>
+            <a:r>
+              <a:rPr lang="de-CH" sz="2400" dirty="0" err="1"/>
+              <a:t>class</a:t>
+            </a:r>
+            <a:r>
+              <a:rPr lang="de-CH" sz="2400" dirty="0"/>
+              <a:t> in API and in </a:t>
+            </a:r>
+            <a:r>
+              <a:rPr lang="de-CH" sz="2400" dirty="0" err="1"/>
+              <a:t>the</a:t>
+            </a:r>
+            <a:r>
+              <a:rPr lang="de-CH" sz="2400" dirty="0"/>
+              <a:t> Webapp </a:t>
+            </a:r>
+            <a:r>
+              <a:rPr lang="de-CH" sz="2400" dirty="0" err="1"/>
+              <a:t>with</a:t>
+            </a:r>
+            <a:r>
+              <a:rPr lang="de-CH" sz="2400" dirty="0"/>
+              <a:t> additional </a:t>
+            </a:r>
+            <a:r>
+              <a:rPr lang="de-CH" sz="2400" i="1" dirty="0" err="1"/>
+              <a:t>taxId</a:t>
+            </a:r>
+            <a:r>
+              <a:rPr lang="de-CH" sz="2400" dirty="0"/>
+              <a:t> </a:t>
+            </a:r>
+            <a:r>
+              <a:rPr lang="de-CH" sz="2400" dirty="0" err="1"/>
+              <a:t>field</a:t>
+            </a:r>
+            <a:endParaRPr lang="en-GB" sz="2000" dirty="0"/>
+          </a:p>
+        </p:txBody>
+      </p:sp>
+      <p:pic>
+        <p:nvPicPr>
+          <p:cNvPr id="5" name="Grafik 4">
+            <a:extLst>
+              <a:ext uri="{FF2B5EF4-FFF2-40B4-BE49-F238E27FC236}">
+                <a16:creationId xmlns:a16="http://schemas.microsoft.com/office/drawing/2014/main" id="{6F3E50FB-9094-3739-5A03-51FBFC6F1B00}"/>
+              </a:ext>
+            </a:extLst>
+          </p:cNvPr>
+          <p:cNvPicPr>
+            <a:picLocks noChangeAspect="1"/>
+          </p:cNvPicPr>
+          <p:nvPr/>
+        </p:nvPicPr>
+        <p:blipFill rotWithShape="1">
+          <a:blip r:embed="rId2"/>
+          <a:srcRect l="25332" t="23002" r="55247" b="4339"/>
+          <a:stretch/>
+        </p:blipFill>
+        <p:spPr>
+          <a:xfrm>
+            <a:off x="6381135" y="798334"/>
+            <a:ext cx="2477729" cy="5700790"/>
+          </a:xfrm>
+          <a:prstGeom prst="rect">
+            <a:avLst/>
+          </a:prstGeom>
+        </p:spPr>
+      </p:pic>
+      <p:sp>
+        <p:nvSpPr>
+          <p:cNvPr id="8" name="Rechteck 7">
+            <a:extLst>
+              <a:ext uri="{FF2B5EF4-FFF2-40B4-BE49-F238E27FC236}">
+                <a16:creationId xmlns:a16="http://schemas.microsoft.com/office/drawing/2014/main" id="{C3FCD070-415D-2A8D-83B6-FC683F0DADA2}"/>
+              </a:ext>
+            </a:extLst>
+          </p:cNvPr>
+          <p:cNvSpPr/>
+          <p:nvPr/>
+        </p:nvSpPr>
+        <p:spPr>
+          <a:xfrm>
+            <a:off x="6892412" y="1896736"/>
+            <a:ext cx="1455174" cy="353961"/>
+          </a:xfrm>
+          <a:prstGeom prst="rect">
+            <a:avLst/>
+          </a:prstGeom>
+          <a:noFill/>
+          <a:ln w="57150">
+            <a:solidFill>
+              <a:srgbClr val="FF0000"/>
+            </a:solidFill>
+          </a:ln>
+        </p:spPr>
+        <p:style>
+          <a:lnRef idx="2">
+            <a:schemeClr val="accent1">
+              <a:shade val="50000"/>
+            </a:schemeClr>
+          </a:lnRef>
+          <a:fillRef idx="1">
+            <a:schemeClr val="accent1"/>
+          </a:fillRef>
+          <a:effectRef idx="0">
+            <a:schemeClr val="accent1"/>
+          </a:effectRef>
+          <a:fontRef idx="minor">
+            <a:schemeClr val="lt1"/>
+          </a:fontRef>
+        </p:style>
+        <p:txBody>
+          <a:bodyPr rtlCol="0" anchor="ctr"/>
+          <a:lstStyle/>
+          <a:p>
+            <a:pPr algn="ctr"/>
             <a:endParaRPr lang="en-GB"/>
           </a:p>
         </p:txBody>
@@ -4591,13 +6177,25 @@
     </p:spTree>
     <p:extLst>
       <p:ext uri="{BB962C8B-B14F-4D97-AF65-F5344CB8AC3E}">
-        <p14:creationId xmlns:p14="http://schemas.microsoft.com/office/powerpoint/2010/main" val="3912055922"/>
+        <p14:creationId xmlns:p14="http://schemas.microsoft.com/office/powerpoint/2010/main" val="2907589101"/>
       </p:ext>
     </p:extLst>
   </p:cSld>
   <p:clrMapOvr>
     <a:masterClrMapping/>
   </p:clrMapOvr>
+  <mc:AlternateContent xmlns:mc="http://schemas.openxmlformats.org/markup-compatibility/2006">
+    <mc:Choice xmlns:p159="http://schemas.microsoft.com/office/powerpoint/2015/09/main" Requires="p159">
+      <p:transition xmlns:p14="http://schemas.microsoft.com/office/powerpoint/2010/main" spd="slow" p14:dur="2000">
+        <p159:morph option="byObject"/>
+      </p:transition>
+    </mc:Choice>
+    <mc:Fallback>
+      <p:transition spd="slow">
+        <p:fade/>
+      </p:transition>
+    </mc:Fallback>
+  </mc:AlternateContent>
 </p:sld>
 </file>
 
@@ -4623,7 +6221,7 @@
           <p:cNvPr id="2" name="Titel 1">
             <a:extLst>
               <a:ext uri="{FF2B5EF4-FFF2-40B4-BE49-F238E27FC236}">
-                <a16:creationId xmlns:a16="http://schemas.microsoft.com/office/drawing/2014/main" id="{E6586A7A-2B44-B8FC-42B7-78F160351763}"/>
+                <a16:creationId xmlns:a16="http://schemas.microsoft.com/office/drawing/2014/main" id="{1218EECC-D69B-3BBB-CD69-F2FC31CEEB3F}"/>
               </a:ext>
             </a:extLst>
           </p:cNvPr>
@@ -4634,20 +6232,23 @@
             <p:ph type="title"/>
           </p:nvPr>
         </p:nvSpPr>
-        <p:spPr/>
-        <p:txBody>
-          <a:bodyPr/>
-          <a:lstStyle/>
-          <a:p>
-            <a:r>
-              <a:rPr lang="en-GB" dirty="0"/>
-              <a:t>Why you should choose </a:t>
-            </a:r>
-            <a:r>
-              <a:rPr lang="en-GB" dirty="0" err="1"/>
-              <a:t>GENEius</a:t>
-            </a:r>
-            <a:endParaRPr lang="en-GB" dirty="0"/>
+        <p:spPr>
+          <a:xfrm>
+            <a:off x="804672" y="964692"/>
+            <a:ext cx="3523946" cy="1188720"/>
+          </a:xfrm>
+        </p:spPr>
+        <p:txBody>
+          <a:bodyPr>
+            <a:noAutofit/>
+          </a:bodyPr>
+          <a:lstStyle/>
+          <a:p>
+            <a:r>
+              <a:rPr lang="en-GB" sz="1800" dirty="0"/>
+              <a:t>Implementation – Additional Features</a:t>
+            </a:r>
+            <a:endParaRPr lang="en-GB" sz="1600" dirty="0"/>
           </a:p>
         </p:txBody>
       </p:sp>
@@ -4656,7 +6257,7 @@
           <p:cNvPr id="3" name="Inhaltsplatzhalter 2">
             <a:extLst>
               <a:ext uri="{FF2B5EF4-FFF2-40B4-BE49-F238E27FC236}">
-                <a16:creationId xmlns:a16="http://schemas.microsoft.com/office/drawing/2014/main" id="{A74EE8E4-153F-AECE-1F7A-36FA7F5D3B41}"/>
+                <a16:creationId xmlns:a16="http://schemas.microsoft.com/office/drawing/2014/main" id="{8F6FA557-7EF8-9398-50C6-5CB2F5D4E4BE}"/>
               </a:ext>
             </a:extLst>
           </p:cNvPr>
@@ -4667,28 +6268,267 @@
             <p:ph idx="1"/>
           </p:nvPr>
         </p:nvSpPr>
-        <p:spPr/>
-        <p:txBody>
-          <a:bodyPr/>
-          <a:lstStyle/>
-          <a:p>
-            <a:r>
-              <a:rPr lang="en-GB" dirty="0"/>
-              <a:t>Because we are genius - seriously ;)  </a:t>
-            </a:r>
+        <p:spPr>
+          <a:xfrm>
+            <a:off x="803244" y="2638044"/>
+            <a:ext cx="3523946" cy="3263206"/>
+          </a:xfrm>
+        </p:spPr>
+        <p:txBody>
+          <a:bodyPr>
+            <a:normAutofit/>
+          </a:bodyPr>
+          <a:lstStyle/>
+          <a:p>
+            <a:r>
+              <a:rPr lang="en-GB" sz="2400" dirty="0"/>
+              <a:t>Added Pagination</a:t>
+            </a:r>
+          </a:p>
+          <a:p>
+            <a:pPr lvl="1"/>
+            <a:r>
+              <a:rPr lang="en-GB" sz="2000" i="1" dirty="0"/>
+              <a:t>server- and </a:t>
+            </a:r>
+            <a:r>
+              <a:rPr lang="en-GB" sz="2000" i="1" dirty="0" err="1"/>
+              <a:t>clientside</a:t>
+            </a:r>
+            <a:r>
+              <a:rPr lang="en-GB" sz="2000" dirty="0"/>
+              <a:t> to improve performance and readability</a:t>
+            </a:r>
+          </a:p>
+        </p:txBody>
+      </p:sp>
+      <p:pic>
+        <p:nvPicPr>
+          <p:cNvPr id="5" name="Grafik 4">
+            <a:extLst>
+              <a:ext uri="{FF2B5EF4-FFF2-40B4-BE49-F238E27FC236}">
+                <a16:creationId xmlns:a16="http://schemas.microsoft.com/office/drawing/2014/main" id="{6F3E50FB-9094-3739-5A03-51FBFC6F1B00}"/>
+              </a:ext>
+            </a:extLst>
+          </p:cNvPr>
+          <p:cNvPicPr>
+            <a:picLocks noChangeAspect="1"/>
+          </p:cNvPicPr>
+          <p:nvPr/>
+        </p:nvPicPr>
+        <p:blipFill rotWithShape="1">
+          <a:blip r:embed="rId2"/>
+          <a:srcRect l="12543" t="69175" r="15000" b="1068"/>
+          <a:stretch/>
+        </p:blipFill>
+        <p:spPr>
+          <a:xfrm>
+            <a:off x="4495551" y="2469604"/>
+            <a:ext cx="7597099" cy="1918792"/>
+          </a:xfrm>
+          <a:prstGeom prst="rect">
+            <a:avLst/>
+          </a:prstGeom>
+        </p:spPr>
+      </p:pic>
+      <p:sp>
+        <p:nvSpPr>
+          <p:cNvPr id="9" name="Rectangle 3">
+            <a:extLst>
+              <a:ext uri="{FF2B5EF4-FFF2-40B4-BE49-F238E27FC236}">
+                <a16:creationId xmlns:a16="http://schemas.microsoft.com/office/drawing/2014/main" id="{6113613E-4B86-C856-5F54-9B0DCB034746}"/>
+              </a:ext>
+            </a:extLst>
+          </p:cNvPr>
+          <p:cNvSpPr>
+            <a:spLocks noChangeArrowheads="1"/>
+          </p:cNvSpPr>
+          <p:nvPr/>
+        </p:nvSpPr>
+        <p:spPr bwMode="auto">
+          <a:xfrm>
+            <a:off x="985267" y="5059277"/>
+            <a:ext cx="10403489" cy="276999"/>
+          </a:xfrm>
+          <a:prstGeom prst="rect">
+            <a:avLst/>
+          </a:prstGeom>
+          <a:noFill/>
+          <a:ln>
+            <a:noFill/>
+          </a:ln>
+          <a:effectLst/>
+        </p:spPr>
+        <p:txBody>
+          <a:bodyPr vert="horz" wrap="none" lIns="0" tIns="0" rIns="0" bIns="0" numCol="1" anchor="ctr" anchorCtr="0" compatLnSpc="1">
+            <a:prstTxWarp prst="textNoShape">
+              <a:avLst/>
+            </a:prstTxWarp>
+            <a:spAutoFit/>
+          </a:bodyPr>
+          <a:lstStyle/>
+          <a:p>
+            <a:pPr marL="0" marR="0" lvl="0" indent="0" algn="l" defTabSz="914400" rtl="0" eaLnBrk="0" fontAlgn="base" latinLnBrk="0" hangingPunct="0">
+              <a:lnSpc>
+                <a:spcPct val="100000"/>
+              </a:lnSpc>
+              <a:spcBef>
+                <a:spcPct val="0"/>
+              </a:spcBef>
+              <a:spcAft>
+                <a:spcPct val="0"/>
+              </a:spcAft>
+              <a:buClrTx/>
+              <a:buSzTx/>
+              <a:buFontTx/>
+              <a:buNone/>
+              <a:tabLst/>
+            </a:pPr>
+            <a:r>
+              <a:rPr kumimoji="0" lang="de-DE" altLang="de-DE" b="1" i="0" u="none" strike="noStrike" cap="none" normalizeH="0" baseline="0" dirty="0">
+                <a:ln>
+                  <a:noFill/>
+                </a:ln>
+                <a:effectLst/>
+                <a:latin typeface="Courier New" panose="02070309020205020404" pitchFamily="49" charset="0"/>
+              </a:rPr>
+              <a:t>http://localhost:9090/geneservice/bysymbol?symbol=dnab&amp;</a:t>
+            </a:r>
+            <a:r>
+              <a:rPr kumimoji="0" lang="de-DE" altLang="de-DE" b="1" i="0" u="none" strike="noStrike" cap="none" normalizeH="0" baseline="0" dirty="0">
+                <a:ln>
+                  <a:noFill/>
+                </a:ln>
+                <a:effectLst/>
+                <a:highlight>
+                  <a:srgbClr val="FFFF00"/>
+                </a:highlight>
+                <a:latin typeface="Courier New" panose="02070309020205020404" pitchFamily="49" charset="0"/>
+              </a:rPr>
+              <a:t>offset=0</a:t>
+            </a:r>
+            <a:r>
+              <a:rPr kumimoji="0" lang="de-DE" altLang="de-DE" b="1" i="0" u="none" strike="noStrike" cap="none" normalizeH="0" baseline="0" dirty="0">
+                <a:ln>
+                  <a:noFill/>
+                </a:ln>
+                <a:effectLst/>
+                <a:latin typeface="Courier New" panose="02070309020205020404" pitchFamily="49" charset="0"/>
+              </a:rPr>
+              <a:t>&amp;</a:t>
+            </a:r>
+            <a:r>
+              <a:rPr kumimoji="0" lang="de-DE" altLang="de-DE" b="1" i="0" u="none" strike="noStrike" cap="none" normalizeH="0" baseline="0" dirty="0">
+                <a:ln>
+                  <a:noFill/>
+                </a:ln>
+                <a:effectLst/>
+                <a:highlight>
+                  <a:srgbClr val="FFFF00"/>
+                </a:highlight>
+                <a:latin typeface="Courier New" panose="02070309020205020404" pitchFamily="49" charset="0"/>
+              </a:rPr>
+              <a:t>pageSize=10</a:t>
+            </a:r>
+            <a:r>
+              <a:rPr kumimoji="0" lang="de-DE" altLang="de-DE" b="0" i="0" u="none" strike="noStrike" cap="none" normalizeH="0" baseline="0" dirty="0">
+                <a:ln>
+                  <a:noFill/>
+                </a:ln>
+                <a:effectLst/>
+                <a:highlight>
+                  <a:srgbClr val="FFFF00"/>
+                </a:highlight>
+              </a:rPr>
+              <a:t> </a:t>
+            </a:r>
+            <a:endParaRPr kumimoji="0" lang="de-DE" altLang="de-DE" b="0" i="0" u="none" strike="noStrike" cap="none" normalizeH="0" baseline="0" dirty="0">
+              <a:ln>
+                <a:noFill/>
+              </a:ln>
+              <a:effectLst/>
+              <a:highlight>
+                <a:srgbClr val="FFFF00"/>
+              </a:highlight>
+              <a:latin typeface="Arial" panose="020B0604020202020204" pitchFamily="34" charset="0"/>
+            </a:endParaRPr>
+          </a:p>
+        </p:txBody>
+      </p:sp>
+      <p:sp>
+        <p:nvSpPr>
+          <p:cNvPr id="11" name="Rechteck 10">
+            <a:extLst>
+              <a:ext uri="{FF2B5EF4-FFF2-40B4-BE49-F238E27FC236}">
+                <a16:creationId xmlns:a16="http://schemas.microsoft.com/office/drawing/2014/main" id="{F6B2549A-72AC-D28B-53C5-9C20D62491A6}"/>
+              </a:ext>
+            </a:extLst>
+          </p:cNvPr>
+          <p:cNvSpPr/>
+          <p:nvPr/>
+        </p:nvSpPr>
+        <p:spPr>
+          <a:xfrm>
+            <a:off x="7698659" y="3656710"/>
+            <a:ext cx="1455174" cy="353961"/>
+          </a:xfrm>
+          <a:prstGeom prst="rect">
+            <a:avLst/>
+          </a:prstGeom>
+          <a:noFill/>
+          <a:ln w="57150">
+            <a:solidFill>
+              <a:srgbClr val="FF0000"/>
+            </a:solidFill>
+          </a:ln>
+        </p:spPr>
+        <p:style>
+          <a:lnRef idx="2">
+            <a:schemeClr val="accent1">
+              <a:shade val="50000"/>
+            </a:schemeClr>
+          </a:lnRef>
+          <a:fillRef idx="1">
+            <a:schemeClr val="accent1"/>
+          </a:fillRef>
+          <a:effectRef idx="0">
+            <a:schemeClr val="accent1"/>
+          </a:effectRef>
+          <a:fontRef idx="minor">
+            <a:schemeClr val="lt1"/>
+          </a:fontRef>
+        </p:style>
+        <p:txBody>
+          <a:bodyPr rtlCol="0" anchor="ctr"/>
+          <a:lstStyle/>
+          <a:p>
+            <a:pPr algn="ctr"/>
+            <a:endParaRPr lang="en-GB"/>
           </a:p>
         </p:txBody>
       </p:sp>
     </p:spTree>
     <p:extLst>
       <p:ext uri="{BB962C8B-B14F-4D97-AF65-F5344CB8AC3E}">
-        <p14:creationId xmlns:p14="http://schemas.microsoft.com/office/powerpoint/2010/main" val="2759083719"/>
+        <p14:creationId xmlns:p14="http://schemas.microsoft.com/office/powerpoint/2010/main" val="3621965622"/>
       </p:ext>
     </p:extLst>
   </p:cSld>
   <p:clrMapOvr>
     <a:masterClrMapping/>
   </p:clrMapOvr>
+  <mc:AlternateContent xmlns:mc="http://schemas.openxmlformats.org/markup-compatibility/2006">
+    <mc:Choice xmlns:p159="http://schemas.microsoft.com/office/powerpoint/2015/09/main" Requires="p159">
+      <p:transition xmlns:p14="http://schemas.microsoft.com/office/powerpoint/2010/main" spd="slow" p14:dur="2000">
+        <p159:morph option="byObject"/>
+      </p:transition>
+    </mc:Choice>
+    <mc:Fallback>
+      <p:transition spd="slow">
+        <p:fade/>
+      </p:transition>
+    </mc:Fallback>
+  </mc:AlternateContent>
 </p:sld>
 </file>
 
@@ -4714,7 +6554,7 @@
           <p:cNvPr id="2" name="Titel 1">
             <a:extLst>
               <a:ext uri="{FF2B5EF4-FFF2-40B4-BE49-F238E27FC236}">
-                <a16:creationId xmlns:a16="http://schemas.microsoft.com/office/drawing/2014/main" id="{E6586A7A-2B44-B8FC-42B7-78F160351763}"/>
+                <a16:creationId xmlns:a16="http://schemas.microsoft.com/office/drawing/2014/main" id="{1218EECC-D69B-3BBB-CD69-F2FC31CEEB3F}"/>
               </a:ext>
             </a:extLst>
           </p:cNvPr>
@@ -4725,15 +6565,23 @@
             <p:ph type="title"/>
           </p:nvPr>
         </p:nvSpPr>
-        <p:spPr/>
-        <p:txBody>
-          <a:bodyPr/>
-          <a:lstStyle/>
-          <a:p>
-            <a:r>
-              <a:rPr lang="en-GB" dirty="0"/>
-              <a:t>Outlook</a:t>
-            </a:r>
+        <p:spPr>
+          <a:xfrm>
+            <a:off x="804672" y="964692"/>
+            <a:ext cx="3523946" cy="1188720"/>
+          </a:xfrm>
+        </p:spPr>
+        <p:txBody>
+          <a:bodyPr>
+            <a:noAutofit/>
+          </a:bodyPr>
+          <a:lstStyle/>
+          <a:p>
+            <a:r>
+              <a:rPr lang="en-GB" sz="1800" dirty="0"/>
+              <a:t>Implementation – Additional Features</a:t>
+            </a:r>
+            <a:endParaRPr lang="en-GB" sz="1600" dirty="0"/>
           </a:p>
         </p:txBody>
       </p:sp>
@@ -4742,7 +6590,7 @@
           <p:cNvPr id="3" name="Inhaltsplatzhalter 2">
             <a:extLst>
               <a:ext uri="{FF2B5EF4-FFF2-40B4-BE49-F238E27FC236}">
-                <a16:creationId xmlns:a16="http://schemas.microsoft.com/office/drawing/2014/main" id="{A74EE8E4-153F-AECE-1F7A-36FA7F5D3B41}"/>
+                <a16:creationId xmlns:a16="http://schemas.microsoft.com/office/drawing/2014/main" id="{8F6FA557-7EF8-9398-50C6-5CB2F5D4E4BE}"/>
               </a:ext>
             </a:extLst>
           </p:cNvPr>
@@ -4753,28 +6601,194 @@
             <p:ph idx="1"/>
           </p:nvPr>
         </p:nvSpPr>
-        <p:spPr/>
-        <p:txBody>
-          <a:bodyPr/>
-          <a:lstStyle/>
-          <a:p>
-            <a:r>
-              <a:rPr lang="en-GB" dirty="0"/>
-              <a:t>Because we are genius - seriously ;)  </a:t>
-            </a:r>
+        <p:spPr>
+          <a:xfrm>
+            <a:off x="803244" y="2638044"/>
+            <a:ext cx="3523946" cy="3263206"/>
+          </a:xfrm>
+        </p:spPr>
+        <p:txBody>
+          <a:bodyPr>
+            <a:normAutofit/>
+          </a:bodyPr>
+          <a:lstStyle/>
+          <a:p>
+            <a:r>
+              <a:rPr lang="en-GB" sz="2400" dirty="0"/>
+              <a:t>Added Error Handling</a:t>
+            </a:r>
+          </a:p>
+          <a:p>
+            <a:pPr lvl="1"/>
+            <a:r>
+              <a:rPr lang="en-GB" sz="2200" dirty="0"/>
+              <a:t>Health Check Endpoint in the API</a:t>
+            </a:r>
+          </a:p>
+          <a:p>
+            <a:pPr lvl="1"/>
+            <a:endParaRPr lang="en-GB" sz="2200" dirty="0"/>
+          </a:p>
+        </p:txBody>
+      </p:sp>
+      <p:pic>
+        <p:nvPicPr>
+          <p:cNvPr id="6" name="Grafik 5">
+            <a:extLst>
+              <a:ext uri="{FF2B5EF4-FFF2-40B4-BE49-F238E27FC236}">
+                <a16:creationId xmlns:a16="http://schemas.microsoft.com/office/drawing/2014/main" id="{F49B55A1-250E-A22E-A82D-7BD47E9FD590}"/>
+              </a:ext>
+            </a:extLst>
+          </p:cNvPr>
+          <p:cNvPicPr>
+            <a:picLocks noChangeAspect="1"/>
+          </p:cNvPicPr>
+          <p:nvPr/>
+        </p:nvPicPr>
+        <p:blipFill>
+          <a:blip r:embed="rId2"/>
+          <a:stretch>
+            <a:fillRect/>
+          </a:stretch>
+        </p:blipFill>
+        <p:spPr>
+          <a:xfrm>
+            <a:off x="4496809" y="2603940"/>
+            <a:ext cx="7403225" cy="3289368"/>
+          </a:xfrm>
+          <a:prstGeom prst="rect">
+            <a:avLst/>
+          </a:prstGeom>
+        </p:spPr>
+      </p:pic>
+      <p:sp>
+        <p:nvSpPr>
+          <p:cNvPr id="10" name="Rectangle 3">
+            <a:extLst>
+              <a:ext uri="{FF2B5EF4-FFF2-40B4-BE49-F238E27FC236}">
+                <a16:creationId xmlns:a16="http://schemas.microsoft.com/office/drawing/2014/main" id="{DA8B18E2-338F-F766-994C-0909FD78B610}"/>
+              </a:ext>
+            </a:extLst>
+          </p:cNvPr>
+          <p:cNvSpPr>
+            <a:spLocks noChangeArrowheads="1"/>
+          </p:cNvSpPr>
+          <p:nvPr/>
+        </p:nvSpPr>
+        <p:spPr bwMode="auto">
+          <a:xfrm>
+            <a:off x="1004931" y="6100941"/>
+            <a:ext cx="10010754" cy="276999"/>
+          </a:xfrm>
+          <a:prstGeom prst="rect">
+            <a:avLst/>
+          </a:prstGeom>
+          <a:noFill/>
+          <a:ln>
+            <a:noFill/>
+          </a:ln>
+          <a:effectLst/>
+        </p:spPr>
+        <p:txBody>
+          <a:bodyPr vert="horz" wrap="none" lIns="0" tIns="0" rIns="0" bIns="0" numCol="1" anchor="ctr" anchorCtr="0" compatLnSpc="1">
+            <a:prstTxWarp prst="textNoShape">
+              <a:avLst/>
+            </a:prstTxWarp>
+            <a:spAutoFit/>
+          </a:bodyPr>
+          <a:lstStyle/>
+          <a:p>
+            <a:pPr marL="0" marR="0" lvl="0" indent="0" algn="l" defTabSz="914400" rtl="0" eaLnBrk="0" fontAlgn="base" latinLnBrk="0" hangingPunct="0">
+              <a:lnSpc>
+                <a:spcPct val="100000"/>
+              </a:lnSpc>
+              <a:spcBef>
+                <a:spcPct val="0"/>
+              </a:spcBef>
+              <a:spcAft>
+                <a:spcPct val="0"/>
+              </a:spcAft>
+              <a:buClrTx/>
+              <a:buSzTx/>
+              <a:buFontTx/>
+              <a:buNone/>
+              <a:tabLst/>
+            </a:pPr>
+            <a:r>
+              <a:rPr kumimoji="0" lang="de-DE" altLang="de-DE" b="1" i="0" u="none" strike="noStrike" cap="none" normalizeH="0" baseline="0" dirty="0">
+                <a:ln>
+                  <a:noFill/>
+                </a:ln>
+                <a:effectLst/>
+                <a:latin typeface="Courier New" panose="02070309020205020404" pitchFamily="49" charset="0"/>
+              </a:rPr>
+              <a:t>http://localhost:9090/geneservice/health-check     --&gt;   </a:t>
+            </a:r>
+            <a:r>
+              <a:rPr kumimoji="0" lang="de-DE" altLang="de-DE" b="1" i="0" u="none" strike="noStrike" cap="none" normalizeH="0" baseline="0" dirty="0">
+                <a:ln>
+                  <a:noFill/>
+                </a:ln>
+                <a:effectLst/>
+                <a:latin typeface="Consolas" panose="020B0609020204030204" pitchFamily="49" charset="0"/>
+              </a:rPr>
+              <a:t>„OK“   </a:t>
+            </a:r>
+            <a:r>
+              <a:rPr kumimoji="0" lang="de-DE" altLang="de-DE" b="1" i="0" u="none" strike="noStrike" cap="none" normalizeH="0" baseline="0" dirty="0" err="1">
+                <a:ln>
+                  <a:noFill/>
+                </a:ln>
+                <a:effectLst/>
+                <a:latin typeface="Consolas" panose="020B0609020204030204" pitchFamily="49" charset="0"/>
+              </a:rPr>
+              <a:t>or</a:t>
+            </a:r>
+            <a:r>
+              <a:rPr kumimoji="0" lang="de-DE" altLang="de-DE" b="1" i="0" u="none" strike="noStrike" cap="none" normalizeH="0" baseline="0" dirty="0">
+                <a:ln>
+                  <a:noFill/>
+                </a:ln>
+                <a:effectLst/>
+                <a:latin typeface="Consolas" panose="020B0609020204030204" pitchFamily="49" charset="0"/>
+              </a:rPr>
+              <a:t>   ERROR</a:t>
+            </a:r>
+            <a:endParaRPr kumimoji="0" lang="de-DE" altLang="de-DE" b="0" i="0" u="none" strike="noStrike" cap="none" normalizeH="0" baseline="0" dirty="0">
+              <a:ln>
+                <a:noFill/>
+              </a:ln>
+              <a:effectLst/>
+              <a:highlight>
+                <a:srgbClr val="FFFF00"/>
+              </a:highlight>
+              <a:latin typeface="Consolas" panose="020B0609020204030204" pitchFamily="49" charset="0"/>
+            </a:endParaRPr>
           </a:p>
         </p:txBody>
       </p:sp>
     </p:spTree>
     <p:extLst>
       <p:ext uri="{BB962C8B-B14F-4D97-AF65-F5344CB8AC3E}">
-        <p14:creationId xmlns:p14="http://schemas.microsoft.com/office/powerpoint/2010/main" val="2149279328"/>
+        <p14:creationId xmlns:p14="http://schemas.microsoft.com/office/powerpoint/2010/main" val="1825954799"/>
       </p:ext>
     </p:extLst>
   </p:cSld>
   <p:clrMapOvr>
     <a:masterClrMapping/>
   </p:clrMapOvr>
+  <mc:AlternateContent xmlns:mc="http://schemas.openxmlformats.org/markup-compatibility/2006">
+    <mc:Choice xmlns:p159="http://schemas.microsoft.com/office/powerpoint/2015/09/main" Requires="p159">
+      <p:transition xmlns:p14="http://schemas.microsoft.com/office/powerpoint/2010/main" spd="slow" p14:dur="2000">
+        <p159:morph option="byObject"/>
+      </p:transition>
+    </mc:Choice>
+    <mc:Fallback>
+      <p:transition spd="slow">
+        <p:fade/>
+      </p:transition>
+    </mc:Fallback>
+  </mc:AlternateContent>
 </p:sld>
 </file>
 

</xml_diff>

<commit_message>
System Landscape created and added to presentation
</commit_message>
<xml_diff>
--- a/docs/Presentation.pptx
+++ b/docs/Presentation.pptx
@@ -4,6 +4,9 @@
   <p:sldMasterIdLst>
     <p:sldMasterId id="2147483696" r:id="rId1"/>
   </p:sldMasterIdLst>
+  <p:notesMasterIdLst>
+    <p:notesMasterId r:id="rId16"/>
+  </p:notesMasterIdLst>
   <p:sldIdLst>
     <p:sldId id="256" r:id="rId2"/>
     <p:sldId id="257" r:id="rId3"/>
@@ -125,6 +128,498 @@
 </p:presentation>
 </file>
 
+<file path=ppt/notesMasters/notesMaster1.xml><?xml version="1.0" encoding="utf-8"?>
+<p:notesMaster xmlns:a="http://schemas.openxmlformats.org/drawingml/2006/main" xmlns:r="http://schemas.openxmlformats.org/officeDocument/2006/relationships" xmlns:p="http://schemas.openxmlformats.org/presentationml/2006/main">
+  <p:cSld>
+    <p:bg>
+      <p:bgRef idx="1001">
+        <a:schemeClr val="bg1"/>
+      </p:bgRef>
+    </p:bg>
+    <p:spTree>
+      <p:nvGrpSpPr>
+        <p:cNvPr id="1" name=""/>
+        <p:cNvGrpSpPr/>
+        <p:nvPr/>
+      </p:nvGrpSpPr>
+      <p:grpSpPr>
+        <a:xfrm>
+          <a:off x="0" y="0"/>
+          <a:ext cx="0" cy="0"/>
+          <a:chOff x="0" y="0"/>
+          <a:chExt cx="0" cy="0"/>
+        </a:xfrm>
+      </p:grpSpPr>
+      <p:sp>
+        <p:nvSpPr>
+          <p:cNvPr id="2" name="Header Placeholder 1"/>
+          <p:cNvSpPr>
+            <a:spLocks noGrp="1"/>
+          </p:cNvSpPr>
+          <p:nvPr>
+            <p:ph type="hdr" sz="quarter"/>
+          </p:nvPr>
+        </p:nvSpPr>
+        <p:spPr>
+          <a:xfrm>
+            <a:off x="0" y="0"/>
+            <a:ext cx="2971800" cy="458788"/>
+          </a:xfrm>
+          <a:prstGeom prst="rect">
+            <a:avLst/>
+          </a:prstGeom>
+        </p:spPr>
+        <p:txBody>
+          <a:bodyPr vert="horz" lIns="91440" tIns="45720" rIns="91440" bIns="45720" rtlCol="0"/>
+          <a:lstStyle>
+            <a:lvl1pPr algn="l">
+              <a:defRPr sz="1200"/>
+            </a:lvl1pPr>
+          </a:lstStyle>
+          <a:p>
+            <a:endParaRPr lang="en-GB"/>
+          </a:p>
+        </p:txBody>
+      </p:sp>
+      <p:sp>
+        <p:nvSpPr>
+          <p:cNvPr id="3" name="Date Placeholder 2"/>
+          <p:cNvSpPr>
+            <a:spLocks noGrp="1"/>
+          </p:cNvSpPr>
+          <p:nvPr>
+            <p:ph type="dt" idx="1"/>
+          </p:nvPr>
+        </p:nvSpPr>
+        <p:spPr>
+          <a:xfrm>
+            <a:off x="3884613" y="0"/>
+            <a:ext cx="2971800" cy="458788"/>
+          </a:xfrm>
+          <a:prstGeom prst="rect">
+            <a:avLst/>
+          </a:prstGeom>
+        </p:spPr>
+        <p:txBody>
+          <a:bodyPr vert="horz" lIns="91440" tIns="45720" rIns="91440" bIns="45720" rtlCol="0"/>
+          <a:lstStyle>
+            <a:lvl1pPr algn="r">
+              <a:defRPr sz="1200"/>
+            </a:lvl1pPr>
+          </a:lstStyle>
+          <a:p>
+            <a:fld id="{25CFC3AE-0E78-4304-A112-2B3C20ABC9A0}" type="datetimeFigureOut">
+              <a:rPr lang="en-GB" smtClean="0"/>
+              <a:t>21/06/2022</a:t>
+            </a:fld>
+            <a:endParaRPr lang="en-GB"/>
+          </a:p>
+        </p:txBody>
+      </p:sp>
+      <p:sp>
+        <p:nvSpPr>
+          <p:cNvPr id="4" name="Slide Image Placeholder 3"/>
+          <p:cNvSpPr>
+            <a:spLocks noGrp="1" noRot="1" noChangeAspect="1"/>
+          </p:cNvSpPr>
+          <p:nvPr>
+            <p:ph type="sldImg" idx="2"/>
+          </p:nvPr>
+        </p:nvSpPr>
+        <p:spPr>
+          <a:xfrm>
+            <a:off x="685800" y="1143000"/>
+            <a:ext cx="5486400" cy="3086100"/>
+          </a:xfrm>
+          <a:prstGeom prst="rect">
+            <a:avLst/>
+          </a:prstGeom>
+          <a:noFill/>
+          <a:ln w="12700">
+            <a:solidFill>
+              <a:prstClr val="black"/>
+            </a:solidFill>
+          </a:ln>
+        </p:spPr>
+        <p:txBody>
+          <a:bodyPr vert="horz" lIns="91440" tIns="45720" rIns="91440" bIns="45720" rtlCol="0" anchor="ctr"/>
+          <a:lstStyle/>
+          <a:p>
+            <a:endParaRPr lang="en-GB"/>
+          </a:p>
+        </p:txBody>
+      </p:sp>
+      <p:sp>
+        <p:nvSpPr>
+          <p:cNvPr id="5" name="Notes Placeholder 4"/>
+          <p:cNvSpPr>
+            <a:spLocks noGrp="1"/>
+          </p:cNvSpPr>
+          <p:nvPr>
+            <p:ph type="body" sz="quarter" idx="3"/>
+          </p:nvPr>
+        </p:nvSpPr>
+        <p:spPr>
+          <a:xfrm>
+            <a:off x="685800" y="4400550"/>
+            <a:ext cx="5486400" cy="3600450"/>
+          </a:xfrm>
+          <a:prstGeom prst="rect">
+            <a:avLst/>
+          </a:prstGeom>
+        </p:spPr>
+        <p:txBody>
+          <a:bodyPr vert="horz" lIns="91440" tIns="45720" rIns="91440" bIns="45720" rtlCol="0"/>
+          <a:lstStyle/>
+          <a:p>
+            <a:pPr lvl="0"/>
+            <a:r>
+              <a:rPr lang="en-US"/>
+              <a:t>Click to edit Master text styles</a:t>
+            </a:r>
+          </a:p>
+          <a:p>
+            <a:pPr lvl="1"/>
+            <a:r>
+              <a:rPr lang="en-US"/>
+              <a:t>Second level</a:t>
+            </a:r>
+          </a:p>
+          <a:p>
+            <a:pPr lvl="2"/>
+            <a:r>
+              <a:rPr lang="en-US"/>
+              <a:t>Third level</a:t>
+            </a:r>
+          </a:p>
+          <a:p>
+            <a:pPr lvl="3"/>
+            <a:r>
+              <a:rPr lang="en-US"/>
+              <a:t>Fourth level</a:t>
+            </a:r>
+          </a:p>
+          <a:p>
+            <a:pPr lvl="4"/>
+            <a:r>
+              <a:rPr lang="en-US"/>
+              <a:t>Fifth level</a:t>
+            </a:r>
+            <a:endParaRPr lang="en-GB"/>
+          </a:p>
+        </p:txBody>
+      </p:sp>
+      <p:sp>
+        <p:nvSpPr>
+          <p:cNvPr id="6" name="Footer Placeholder 5"/>
+          <p:cNvSpPr>
+            <a:spLocks noGrp="1"/>
+          </p:cNvSpPr>
+          <p:nvPr>
+            <p:ph type="ftr" sz="quarter" idx="4"/>
+          </p:nvPr>
+        </p:nvSpPr>
+        <p:spPr>
+          <a:xfrm>
+            <a:off x="0" y="8685213"/>
+            <a:ext cx="2971800" cy="458787"/>
+          </a:xfrm>
+          <a:prstGeom prst="rect">
+            <a:avLst/>
+          </a:prstGeom>
+        </p:spPr>
+        <p:txBody>
+          <a:bodyPr vert="horz" lIns="91440" tIns="45720" rIns="91440" bIns="45720" rtlCol="0" anchor="b"/>
+          <a:lstStyle>
+            <a:lvl1pPr algn="l">
+              <a:defRPr sz="1200"/>
+            </a:lvl1pPr>
+          </a:lstStyle>
+          <a:p>
+            <a:endParaRPr lang="en-GB"/>
+          </a:p>
+        </p:txBody>
+      </p:sp>
+      <p:sp>
+        <p:nvSpPr>
+          <p:cNvPr id="7" name="Slide Number Placeholder 6"/>
+          <p:cNvSpPr>
+            <a:spLocks noGrp="1"/>
+          </p:cNvSpPr>
+          <p:nvPr>
+            <p:ph type="sldNum" sz="quarter" idx="5"/>
+          </p:nvPr>
+        </p:nvSpPr>
+        <p:spPr>
+          <a:xfrm>
+            <a:off x="3884613" y="8685213"/>
+            <a:ext cx="2971800" cy="458787"/>
+          </a:xfrm>
+          <a:prstGeom prst="rect">
+            <a:avLst/>
+          </a:prstGeom>
+        </p:spPr>
+        <p:txBody>
+          <a:bodyPr vert="horz" lIns="91440" tIns="45720" rIns="91440" bIns="45720" rtlCol="0" anchor="b"/>
+          <a:lstStyle>
+            <a:lvl1pPr algn="r">
+              <a:defRPr sz="1200"/>
+            </a:lvl1pPr>
+          </a:lstStyle>
+          <a:p>
+            <a:fld id="{D68AC1D6-260A-4710-B14D-B961D3F7EBF8}" type="slidenum">
+              <a:rPr lang="en-GB" smtClean="0"/>
+              <a:t>‹#›</a:t>
+            </a:fld>
+            <a:endParaRPr lang="en-GB"/>
+          </a:p>
+        </p:txBody>
+      </p:sp>
+    </p:spTree>
+    <p:extLst>
+      <p:ext uri="{BB962C8B-B14F-4D97-AF65-F5344CB8AC3E}">
+        <p14:creationId xmlns:p14="http://schemas.microsoft.com/office/powerpoint/2010/main" val="435903172"/>
+      </p:ext>
+    </p:extLst>
+  </p:cSld>
+  <p:clrMap bg1="lt1" tx1="dk1" bg2="lt2" tx2="dk2" accent1="accent1" accent2="accent2" accent3="accent3" accent4="accent4" accent5="accent5" accent6="accent6" hlink="hlink" folHlink="folHlink"/>
+  <p:notesStyle>
+    <a:lvl1pPr marL="0" algn="l" defTabSz="914400" rtl="0" eaLnBrk="1" latinLnBrk="0" hangingPunct="1">
+      <a:defRPr sz="1200" kern="1200">
+        <a:solidFill>
+          <a:schemeClr val="tx1"/>
+        </a:solidFill>
+        <a:latin typeface="+mn-lt"/>
+        <a:ea typeface="+mn-ea"/>
+        <a:cs typeface="+mn-cs"/>
+      </a:defRPr>
+    </a:lvl1pPr>
+    <a:lvl2pPr marL="457200" algn="l" defTabSz="914400" rtl="0" eaLnBrk="1" latinLnBrk="0" hangingPunct="1">
+      <a:defRPr sz="1200" kern="1200">
+        <a:solidFill>
+          <a:schemeClr val="tx1"/>
+        </a:solidFill>
+        <a:latin typeface="+mn-lt"/>
+        <a:ea typeface="+mn-ea"/>
+        <a:cs typeface="+mn-cs"/>
+      </a:defRPr>
+    </a:lvl2pPr>
+    <a:lvl3pPr marL="914400" algn="l" defTabSz="914400" rtl="0" eaLnBrk="1" latinLnBrk="0" hangingPunct="1">
+      <a:defRPr sz="1200" kern="1200">
+        <a:solidFill>
+          <a:schemeClr val="tx1"/>
+        </a:solidFill>
+        <a:latin typeface="+mn-lt"/>
+        <a:ea typeface="+mn-ea"/>
+        <a:cs typeface="+mn-cs"/>
+      </a:defRPr>
+    </a:lvl3pPr>
+    <a:lvl4pPr marL="1371600" algn="l" defTabSz="914400" rtl="0" eaLnBrk="1" latinLnBrk="0" hangingPunct="1">
+      <a:defRPr sz="1200" kern="1200">
+        <a:solidFill>
+          <a:schemeClr val="tx1"/>
+        </a:solidFill>
+        <a:latin typeface="+mn-lt"/>
+        <a:ea typeface="+mn-ea"/>
+        <a:cs typeface="+mn-cs"/>
+      </a:defRPr>
+    </a:lvl4pPr>
+    <a:lvl5pPr marL="1828800" algn="l" defTabSz="914400" rtl="0" eaLnBrk="1" latinLnBrk="0" hangingPunct="1">
+      <a:defRPr sz="1200" kern="1200">
+        <a:solidFill>
+          <a:schemeClr val="tx1"/>
+        </a:solidFill>
+        <a:latin typeface="+mn-lt"/>
+        <a:ea typeface="+mn-ea"/>
+        <a:cs typeface="+mn-cs"/>
+      </a:defRPr>
+    </a:lvl5pPr>
+    <a:lvl6pPr marL="2286000" algn="l" defTabSz="914400" rtl="0" eaLnBrk="1" latinLnBrk="0" hangingPunct="1">
+      <a:defRPr sz="1200" kern="1200">
+        <a:solidFill>
+          <a:schemeClr val="tx1"/>
+        </a:solidFill>
+        <a:latin typeface="+mn-lt"/>
+        <a:ea typeface="+mn-ea"/>
+        <a:cs typeface="+mn-cs"/>
+      </a:defRPr>
+    </a:lvl6pPr>
+    <a:lvl7pPr marL="2743200" algn="l" defTabSz="914400" rtl="0" eaLnBrk="1" latinLnBrk="0" hangingPunct="1">
+      <a:defRPr sz="1200" kern="1200">
+        <a:solidFill>
+          <a:schemeClr val="tx1"/>
+        </a:solidFill>
+        <a:latin typeface="+mn-lt"/>
+        <a:ea typeface="+mn-ea"/>
+        <a:cs typeface="+mn-cs"/>
+      </a:defRPr>
+    </a:lvl7pPr>
+    <a:lvl8pPr marL="3200400" algn="l" defTabSz="914400" rtl="0" eaLnBrk="1" latinLnBrk="0" hangingPunct="1">
+      <a:defRPr sz="1200" kern="1200">
+        <a:solidFill>
+          <a:schemeClr val="tx1"/>
+        </a:solidFill>
+        <a:latin typeface="+mn-lt"/>
+        <a:ea typeface="+mn-ea"/>
+        <a:cs typeface="+mn-cs"/>
+      </a:defRPr>
+    </a:lvl8pPr>
+    <a:lvl9pPr marL="3657600" algn="l" defTabSz="914400" rtl="0" eaLnBrk="1" latinLnBrk="0" hangingPunct="1">
+      <a:defRPr sz="1200" kern="1200">
+        <a:solidFill>
+          <a:schemeClr val="tx1"/>
+        </a:solidFill>
+        <a:latin typeface="+mn-lt"/>
+        <a:ea typeface="+mn-ea"/>
+        <a:cs typeface="+mn-cs"/>
+      </a:defRPr>
+    </a:lvl9pPr>
+  </p:notesStyle>
+</p:notesMaster>
+</file>
+
+<file path=ppt/notesSlides/notesSlide1.xml><?xml version="1.0" encoding="utf-8"?>
+<p:notes xmlns:a="http://schemas.openxmlformats.org/drawingml/2006/main" xmlns:r="http://schemas.openxmlformats.org/officeDocument/2006/relationships" xmlns:p="http://schemas.openxmlformats.org/presentationml/2006/main">
+  <p:cSld>
+    <p:spTree>
+      <p:nvGrpSpPr>
+        <p:cNvPr id="1" name=""/>
+        <p:cNvGrpSpPr/>
+        <p:nvPr/>
+      </p:nvGrpSpPr>
+      <p:grpSpPr>
+        <a:xfrm>
+          <a:off x="0" y="0"/>
+          <a:ext cx="0" cy="0"/>
+          <a:chOff x="0" y="0"/>
+          <a:chExt cx="0" cy="0"/>
+        </a:xfrm>
+      </p:grpSpPr>
+      <p:sp>
+        <p:nvSpPr>
+          <p:cNvPr id="2" name="Slide Image Placeholder 1"/>
+          <p:cNvSpPr>
+            <a:spLocks noGrp="1" noRot="1" noChangeAspect="1"/>
+          </p:cNvSpPr>
+          <p:nvPr>
+            <p:ph type="sldImg"/>
+          </p:nvPr>
+        </p:nvSpPr>
+        <p:spPr/>
+      </p:sp>
+      <p:sp>
+        <p:nvSpPr>
+          <p:cNvPr id="3" name="Notes Placeholder 2"/>
+          <p:cNvSpPr>
+            <a:spLocks noGrp="1"/>
+          </p:cNvSpPr>
+          <p:nvPr>
+            <p:ph type="body" idx="1"/>
+          </p:nvPr>
+        </p:nvSpPr>
+        <p:spPr/>
+        <p:txBody>
+          <a:bodyPr/>
+          <a:lstStyle/>
+          <a:p>
+            <a:r>
+              <a:rPr lang="en-GB" dirty="0"/>
+              <a:t>Service: port 9090</a:t>
+            </a:r>
+          </a:p>
+          <a:p>
+            <a:r>
+              <a:rPr lang="en-GB" dirty="0"/>
+              <a:t>Webapp: tomcat 8080 /</a:t>
+            </a:r>
+            <a:r>
+              <a:rPr lang="en-GB" dirty="0" err="1"/>
+              <a:t>mscmi_geneinfo_webapp</a:t>
+            </a:r>
+            <a:r>
+              <a:rPr lang="en-GB" dirty="0"/>
+              <a:t>/</a:t>
+            </a:r>
+          </a:p>
+          <a:p>
+            <a:r>
+              <a:rPr lang="en-GB" dirty="0" err="1"/>
+              <a:t>Reactapp</a:t>
+            </a:r>
+            <a:r>
+              <a:rPr lang="en-GB" dirty="0"/>
+              <a:t>: 3000</a:t>
+            </a:r>
+          </a:p>
+          <a:p>
+            <a:r>
+              <a:rPr lang="en-GB" dirty="0" err="1"/>
+              <a:t>MySql</a:t>
+            </a:r>
+            <a:r>
+              <a:rPr lang="en-GB" dirty="0"/>
+              <a:t> database 3306 (DB </a:t>
+            </a:r>
+            <a:r>
+              <a:rPr lang="en-GB" dirty="0" err="1"/>
+              <a:t>geninfo</a:t>
+            </a:r>
+            <a:r>
+              <a:rPr lang="en-GB" dirty="0"/>
+              <a:t>)</a:t>
+            </a:r>
+          </a:p>
+          <a:p>
+            <a:r>
+              <a:rPr lang="en-GB" dirty="0" err="1"/>
+              <a:t>Dataloader</a:t>
+            </a:r>
+            <a:r>
+              <a:rPr lang="en-GB" dirty="0"/>
+              <a:t> -&gt; to input data</a:t>
+            </a:r>
+          </a:p>
+          <a:p>
+            <a:endParaRPr lang="en-GB" dirty="0"/>
+          </a:p>
+        </p:txBody>
+      </p:sp>
+      <p:sp>
+        <p:nvSpPr>
+          <p:cNvPr id="4" name="Slide Number Placeholder 3"/>
+          <p:cNvSpPr>
+            <a:spLocks noGrp="1"/>
+          </p:cNvSpPr>
+          <p:nvPr>
+            <p:ph type="sldNum" sz="quarter" idx="5"/>
+          </p:nvPr>
+        </p:nvSpPr>
+        <p:spPr/>
+        <p:txBody>
+          <a:bodyPr/>
+          <a:lstStyle/>
+          <a:p>
+            <a:fld id="{D68AC1D6-260A-4710-B14D-B961D3F7EBF8}" type="slidenum">
+              <a:rPr lang="en-GB" smtClean="0"/>
+              <a:t>4</a:t>
+            </a:fld>
+            <a:endParaRPr lang="en-GB"/>
+          </a:p>
+        </p:txBody>
+      </p:sp>
+    </p:spTree>
+    <p:extLst>
+      <p:ext uri="{BB962C8B-B14F-4D97-AF65-F5344CB8AC3E}">
+        <p14:creationId xmlns:p14="http://schemas.microsoft.com/office/powerpoint/2010/main" val="3159777865"/>
+      </p:ext>
+    </p:extLst>
+  </p:cSld>
+  <p:clrMapOvr>
+    <a:masterClrMapping/>
+  </p:clrMapOvr>
+</p:notes>
+</file>
+
 <file path=ppt/slideLayouts/slideLayout1.xml><?xml version="1.0" encoding="utf-8"?>
 <p:sldLayout xmlns:a="http://schemas.openxmlformats.org/drawingml/2006/main" xmlns:r="http://schemas.openxmlformats.org/officeDocument/2006/relationships" xmlns:p="http://schemas.openxmlformats.org/presentationml/2006/main" type="title" preserve="1">
   <p:cSld name="Titelfolie">
@@ -330,7 +825,7 @@
           <a:p>
             <a:fld id="{9AE53365-47C3-4DE0-BAC2-1E909515BE6A}" type="slidenum">
               <a:rPr lang="de-CH" smtClean="0"/>
-              <a:t>‹Nr.›</a:t>
+              <a:t>‹#›</a:t>
             </a:fld>
             <a:endParaRPr lang="de-CH"/>
           </a:p>
@@ -500,7 +995,7 @@
           <a:p>
             <a:fld id="{9AE53365-47C3-4DE0-BAC2-1E909515BE6A}" type="slidenum">
               <a:rPr lang="de-CH" smtClean="0"/>
-              <a:t>‹Nr.›</a:t>
+              <a:t>‹#›</a:t>
             </a:fld>
             <a:endParaRPr lang="de-CH"/>
           </a:p>
@@ -680,7 +1175,7 @@
           <a:p>
             <a:fld id="{9AE53365-47C3-4DE0-BAC2-1E909515BE6A}" type="slidenum">
               <a:rPr lang="de-CH" smtClean="0"/>
-              <a:t>‹Nr.›</a:t>
+              <a:t>‹#›</a:t>
             </a:fld>
             <a:endParaRPr lang="de-CH"/>
           </a:p>
@@ -850,7 +1345,7 @@
           <a:p>
             <a:fld id="{9AE53365-47C3-4DE0-BAC2-1E909515BE6A}" type="slidenum">
               <a:rPr lang="de-CH" smtClean="0"/>
-              <a:t>‹Nr.›</a:t>
+              <a:t>‹#›</a:t>
             </a:fld>
             <a:endParaRPr lang="de-CH"/>
           </a:p>
@@ -1118,7 +1613,7 @@
           <a:p>
             <a:fld id="{9AE53365-47C3-4DE0-BAC2-1E909515BE6A}" type="slidenum">
               <a:rPr lang="de-CH" smtClean="0"/>
-              <a:t>‹Nr.›</a:t>
+              <a:t>‹#›</a:t>
             </a:fld>
             <a:endParaRPr lang="de-CH"/>
           </a:p>
@@ -1350,7 +1845,7 @@
           <a:p>
             <a:fld id="{9AE53365-47C3-4DE0-BAC2-1E909515BE6A}" type="slidenum">
               <a:rPr lang="de-CH" smtClean="0"/>
-              <a:t>‹Nr.›</a:t>
+              <a:t>‹#›</a:t>
             </a:fld>
             <a:endParaRPr lang="de-CH"/>
           </a:p>
@@ -1709,7 +2204,7 @@
           <a:p>
             <a:fld id="{9AE53365-47C3-4DE0-BAC2-1E909515BE6A}" type="slidenum">
               <a:rPr lang="de-CH" smtClean="0"/>
-              <a:t>‹Nr.›</a:t>
+              <a:t>‹#›</a:t>
             </a:fld>
             <a:endParaRPr lang="de-CH"/>
           </a:p>
@@ -1850,7 +2345,7 @@
           <a:p>
             <a:fld id="{9AE53365-47C3-4DE0-BAC2-1E909515BE6A}" type="slidenum">
               <a:rPr lang="de-CH" smtClean="0"/>
-              <a:t>‹Nr.›</a:t>
+              <a:t>‹#›</a:t>
             </a:fld>
             <a:endParaRPr lang="de-CH"/>
           </a:p>
@@ -1945,7 +2440,7 @@
           <a:p>
             <a:fld id="{9AE53365-47C3-4DE0-BAC2-1E909515BE6A}" type="slidenum">
               <a:rPr lang="de-CH" smtClean="0"/>
-              <a:t>‹Nr.›</a:t>
+              <a:t>‹#›</a:t>
             </a:fld>
             <a:endParaRPr lang="de-CH"/>
           </a:p>
@@ -2317,7 +2812,7 @@
           <a:p>
             <a:fld id="{9AE53365-47C3-4DE0-BAC2-1E909515BE6A}" type="slidenum">
               <a:rPr lang="de-CH" smtClean="0"/>
-              <a:t>‹Nr.›</a:t>
+              <a:t>‹#›</a:t>
             </a:fld>
             <a:endParaRPr lang="de-CH"/>
           </a:p>
@@ -2674,7 +3169,7 @@
           <a:p>
             <a:fld id="{9AE53365-47C3-4DE0-BAC2-1E909515BE6A}" type="slidenum">
               <a:rPr lang="de-CH" smtClean="0"/>
-              <a:t>‹Nr.›</a:t>
+              <a:t>‹#›</a:t>
             </a:fld>
             <a:endParaRPr lang="de-CH"/>
           </a:p>
@@ -2942,7 +3437,7 @@
           <a:p>
             <a:fld id="{9AE53365-47C3-4DE0-BAC2-1E909515BE6A}" type="slidenum">
               <a:rPr lang="de-CH" smtClean="0"/>
-              <a:t>‹Nr.›</a:t>
+              <a:t>‹#›</a:t>
             </a:fld>
             <a:endParaRPr lang="de-CH"/>
           </a:p>
@@ -3715,13 +4210,13 @@
   <p:clrMapOvr>
     <a:masterClrMapping/>
   </p:clrMapOvr>
-  <mc:AlternateContent xmlns:mc="http://schemas.openxmlformats.org/markup-compatibility/2006">
-    <mc:Choice xmlns:p159="http://schemas.microsoft.com/office/powerpoint/2015/09/main" Requires="p159">
+  <mc:AlternateContent xmlns:mc="http://schemas.openxmlformats.org/markup-compatibility/2006" xmlns:p159="http://schemas.microsoft.com/office/powerpoint/2015/09/main">
+    <mc:Choice Requires="p159">
       <p:transition xmlns:p14="http://schemas.microsoft.com/office/powerpoint/2010/main" spd="slow" p14:dur="2000">
         <p159:morph option="byObject"/>
       </p:transition>
     </mc:Choice>
-    <mc:Fallback>
+    <mc:Fallback xmlns="">
       <p:transition spd="slow">
         <p:fade/>
       </p:transition>
@@ -4161,13 +4656,13 @@
   <p:clrMapOvr>
     <a:masterClrMapping/>
   </p:clrMapOvr>
-  <mc:AlternateContent xmlns:mc="http://schemas.openxmlformats.org/markup-compatibility/2006">
-    <mc:Choice xmlns:p159="http://schemas.microsoft.com/office/powerpoint/2015/09/main" Requires="p159">
+  <mc:AlternateContent xmlns:mc="http://schemas.openxmlformats.org/markup-compatibility/2006" xmlns:p159="http://schemas.microsoft.com/office/powerpoint/2015/09/main">
+    <mc:Choice Requires="p159">
       <p:transition xmlns:p14="http://schemas.microsoft.com/office/powerpoint/2010/main" spd="slow" p14:dur="2000">
         <p159:morph option="byObject"/>
       </p:transition>
     </mc:Choice>
-    <mc:Fallback>
+    <mc:Fallback xmlns="">
       <p:transition spd="slow">
         <p:fade/>
       </p:transition>
@@ -5405,86 +5900,41 @@
           </a:p>
         </p:txBody>
       </p:sp>
-      <p:sp>
-        <p:nvSpPr>
-          <p:cNvPr id="3" name="Inhaltsplatzhalter 2">
+      <p:pic>
+        <p:nvPicPr>
+          <p:cNvPr id="7" name="Content Placeholder 6" descr="Text&#10;&#10;Description automatically generated">
             <a:extLst>
               <a:ext uri="{FF2B5EF4-FFF2-40B4-BE49-F238E27FC236}">
-                <a16:creationId xmlns:a16="http://schemas.microsoft.com/office/drawing/2014/main" id="{C50F3B6F-4980-57E7-DD2D-B003300031F5}"/>
+                <a16:creationId xmlns:a16="http://schemas.microsoft.com/office/drawing/2014/main" id="{C304A7A1-A416-D1C2-9890-8338A37B6348}"/>
               </a:ext>
             </a:extLst>
           </p:cNvPr>
-          <p:cNvSpPr>
-            <a:spLocks noGrp="1"/>
-          </p:cNvSpPr>
+          <p:cNvPicPr>
+            <a:picLocks noGrp="1" noChangeAspect="1"/>
+          </p:cNvPicPr>
           <p:nvPr>
             <p:ph idx="1"/>
           </p:nvPr>
-        </p:nvSpPr>
-        <p:spPr/>
-        <p:txBody>
-          <a:bodyPr/>
-          <a:lstStyle/>
-          <a:p>
-            <a:r>
-              <a:rPr lang="en-GB" dirty="0"/>
-              <a:t>Service: port 9090</a:t>
-            </a:r>
-          </a:p>
-          <a:p>
-            <a:r>
-              <a:rPr lang="en-GB" dirty="0"/>
-              <a:t>Webapp: tomcat 8080 /</a:t>
-            </a:r>
-            <a:r>
-              <a:rPr lang="en-GB" dirty="0" err="1"/>
-              <a:t>mscmi_geneinfo_webapp</a:t>
-            </a:r>
-            <a:r>
-              <a:rPr lang="en-GB" dirty="0"/>
-              <a:t>/</a:t>
-            </a:r>
-          </a:p>
-          <a:p>
-            <a:r>
-              <a:rPr lang="en-GB" dirty="0" err="1"/>
-              <a:t>Reactapp</a:t>
-            </a:r>
-            <a:r>
-              <a:rPr lang="en-GB" dirty="0"/>
-              <a:t>: 3000</a:t>
-            </a:r>
-          </a:p>
-          <a:p>
-            <a:r>
-              <a:rPr lang="en-GB" dirty="0" err="1"/>
-              <a:t>MySql</a:t>
-            </a:r>
-            <a:r>
-              <a:rPr lang="en-GB" dirty="0"/>
-              <a:t> database 3306 (DB </a:t>
-            </a:r>
-            <a:r>
-              <a:rPr lang="en-GB" dirty="0" err="1"/>
-              <a:t>geninfo</a:t>
-            </a:r>
-            <a:r>
-              <a:rPr lang="en-GB" dirty="0"/>
-              <a:t>)</a:t>
-            </a:r>
-          </a:p>
-          <a:p>
-            <a:r>
-              <a:rPr lang="en-GB" dirty="0" err="1"/>
-              <a:t>Dataloader</a:t>
-            </a:r>
-            <a:r>
-              <a:rPr lang="en-GB" dirty="0"/>
-              <a:t> -&gt; to input data</a:t>
-            </a:r>
-          </a:p>
-        </p:txBody>
-      </p:sp>
+        </p:nvPicPr>
+        <p:blipFill>
+          <a:blip r:embed="rId3">
+            <a:extLst>
+              <a:ext uri="{28A0092B-C50C-407E-A947-70E740481C1C}">
+                <a14:useLocalDpi xmlns:a14="http://schemas.microsoft.com/office/drawing/2010/main" val="0"/>
+              </a:ext>
+            </a:extLst>
+          </a:blip>
+          <a:stretch>
+            <a:fillRect/>
+          </a:stretch>
+        </p:blipFill>
+        <p:spPr>
+          <a:xfrm>
+            <a:off x="2230438" y="2779892"/>
+            <a:ext cx="7731125" cy="2819041"/>
+          </a:xfrm>
+        </p:spPr>
+      </p:pic>
     </p:spTree>
     <p:extLst>
       <p:ext uri="{BB962C8B-B14F-4D97-AF65-F5344CB8AC3E}">
@@ -6184,13 +6634,13 @@
   <p:clrMapOvr>
     <a:masterClrMapping/>
   </p:clrMapOvr>
-  <mc:AlternateContent xmlns:mc="http://schemas.openxmlformats.org/markup-compatibility/2006">
-    <mc:Choice xmlns:p159="http://schemas.microsoft.com/office/powerpoint/2015/09/main" Requires="p159">
+  <mc:AlternateContent xmlns:mc="http://schemas.openxmlformats.org/markup-compatibility/2006" xmlns:p159="http://schemas.microsoft.com/office/powerpoint/2015/09/main">
+    <mc:Choice Requires="p159">
       <p:transition xmlns:p14="http://schemas.microsoft.com/office/powerpoint/2010/main" spd="slow" p14:dur="2000">
         <p159:morph option="byObject"/>
       </p:transition>
     </mc:Choice>
-    <mc:Fallback>
+    <mc:Fallback xmlns="">
       <p:transition spd="slow">
         <p:fade/>
       </p:transition>
@@ -6517,13 +6967,13 @@
   <p:clrMapOvr>
     <a:masterClrMapping/>
   </p:clrMapOvr>
-  <mc:AlternateContent xmlns:mc="http://schemas.openxmlformats.org/markup-compatibility/2006">
-    <mc:Choice xmlns:p159="http://schemas.microsoft.com/office/powerpoint/2015/09/main" Requires="p159">
+  <mc:AlternateContent xmlns:mc="http://schemas.openxmlformats.org/markup-compatibility/2006" xmlns:p159="http://schemas.microsoft.com/office/powerpoint/2015/09/main">
+    <mc:Choice Requires="p159">
       <p:transition xmlns:p14="http://schemas.microsoft.com/office/powerpoint/2010/main" spd="slow" p14:dur="2000">
         <p159:morph option="byObject"/>
       </p:transition>
     </mc:Choice>
-    <mc:Fallback>
+    <mc:Fallback xmlns="">
       <p:transition spd="slow">
         <p:fade/>
       </p:transition>
@@ -6777,13 +7227,13 @@
   <p:clrMapOvr>
     <a:masterClrMapping/>
   </p:clrMapOvr>
-  <mc:AlternateContent xmlns:mc="http://schemas.openxmlformats.org/markup-compatibility/2006">
-    <mc:Choice xmlns:p159="http://schemas.microsoft.com/office/powerpoint/2015/09/main" Requires="p159">
+  <mc:AlternateContent xmlns:mc="http://schemas.openxmlformats.org/markup-compatibility/2006" xmlns:p159="http://schemas.microsoft.com/office/powerpoint/2015/09/main">
+    <mc:Choice Requires="p159">
       <p:transition xmlns:p14="http://schemas.microsoft.com/office/powerpoint/2010/main" spd="slow" p14:dur="2000">
         <p159:morph option="byObject"/>
       </p:transition>
     </mc:Choice>
-    <mc:Fallback>
+    <mc:Fallback xmlns="">
       <p:transition spd="slow">
         <p:fade/>
       </p:transition>
@@ -7050,4 +7500,299 @@
     </a:ext>
   </a:extLst>
 </a:theme>
+</file>
+
+<file path=ppt/theme/theme2.xml><?xml version="1.0" encoding="utf-8"?>
+<a:theme xmlns:a="http://schemas.openxmlformats.org/drawingml/2006/main" name="Office Theme">
+  <a:themeElements>
+    <a:clrScheme name="Office">
+      <a:dk1>
+        <a:sysClr val="windowText" lastClr="000000"/>
+      </a:dk1>
+      <a:lt1>
+        <a:sysClr val="window" lastClr="FFFFFF"/>
+      </a:lt1>
+      <a:dk2>
+        <a:srgbClr val="44546A"/>
+      </a:dk2>
+      <a:lt2>
+        <a:srgbClr val="E7E6E6"/>
+      </a:lt2>
+      <a:accent1>
+        <a:srgbClr val="4472C4"/>
+      </a:accent1>
+      <a:accent2>
+        <a:srgbClr val="ED7D31"/>
+      </a:accent2>
+      <a:accent3>
+        <a:srgbClr val="A5A5A5"/>
+      </a:accent3>
+      <a:accent4>
+        <a:srgbClr val="FFC000"/>
+      </a:accent4>
+      <a:accent5>
+        <a:srgbClr val="5B9BD5"/>
+      </a:accent5>
+      <a:accent6>
+        <a:srgbClr val="70AD47"/>
+      </a:accent6>
+      <a:hlink>
+        <a:srgbClr val="0563C1"/>
+      </a:hlink>
+      <a:folHlink>
+        <a:srgbClr val="954F72"/>
+      </a:folHlink>
+    </a:clrScheme>
+    <a:fontScheme name="Office">
+      <a:majorFont>
+        <a:latin typeface="Calibri Light" panose="020F0302020204030204"/>
+        <a:ea typeface=""/>
+        <a:cs typeface=""/>
+        <a:font script="Jpan" typeface="游ゴシック Light"/>
+        <a:font script="Hang" typeface="맑은 고딕"/>
+        <a:font script="Hans" typeface="等线 Light"/>
+        <a:font script="Hant" typeface="新細明體"/>
+        <a:font script="Arab" typeface="Times New Roman"/>
+        <a:font script="Hebr" typeface="Times New Roman"/>
+        <a:font script="Thai" typeface="Angsana New"/>
+        <a:font script="Ethi" typeface="Nyala"/>
+        <a:font script="Beng" typeface="Vrinda"/>
+        <a:font script="Gujr" typeface="Shruti"/>
+        <a:font script="Khmr" typeface="MoolBoran"/>
+        <a:font script="Knda" typeface="Tunga"/>
+        <a:font script="Guru" typeface="Raavi"/>
+        <a:font script="Cans" typeface="Euphemia"/>
+        <a:font script="Cher" typeface="Plantagenet Cherokee"/>
+        <a:font script="Yiii" typeface="Microsoft Yi Baiti"/>
+        <a:font script="Tibt" typeface="Microsoft Himalaya"/>
+        <a:font script="Thaa" typeface="MV Boli"/>
+        <a:font script="Deva" typeface="Mangal"/>
+        <a:font script="Telu" typeface="Gautami"/>
+        <a:font script="Taml" typeface="Latha"/>
+        <a:font script="Syrc" typeface="Estrangelo Edessa"/>
+        <a:font script="Orya" typeface="Kalinga"/>
+        <a:font script="Mlym" typeface="Kartika"/>
+        <a:font script="Laoo" typeface="DokChampa"/>
+        <a:font script="Sinh" typeface="Iskoola Pota"/>
+        <a:font script="Mong" typeface="Mongolian Baiti"/>
+        <a:font script="Viet" typeface="Times New Roman"/>
+        <a:font script="Uigh" typeface="Microsoft Uighur"/>
+        <a:font script="Geor" typeface="Sylfaen"/>
+        <a:font script="Armn" typeface="Arial"/>
+        <a:font script="Bugi" typeface="Leelawadee UI"/>
+        <a:font script="Bopo" typeface="Microsoft JhengHei"/>
+        <a:font script="Java" typeface="Javanese Text"/>
+        <a:font script="Lisu" typeface="Segoe UI"/>
+        <a:font script="Mymr" typeface="Myanmar Text"/>
+        <a:font script="Nkoo" typeface="Ebrima"/>
+        <a:font script="Olck" typeface="Nirmala UI"/>
+        <a:font script="Osma" typeface="Ebrima"/>
+        <a:font script="Phag" typeface="Phagspa"/>
+        <a:font script="Syrn" typeface="Estrangelo Edessa"/>
+        <a:font script="Syrj" typeface="Estrangelo Edessa"/>
+        <a:font script="Syre" typeface="Estrangelo Edessa"/>
+        <a:font script="Sora" typeface="Nirmala UI"/>
+        <a:font script="Tale" typeface="Microsoft Tai Le"/>
+        <a:font script="Talu" typeface="Microsoft New Tai Lue"/>
+        <a:font script="Tfng" typeface="Ebrima"/>
+      </a:majorFont>
+      <a:minorFont>
+        <a:latin typeface="Calibri" panose="020F0502020204030204"/>
+        <a:ea typeface=""/>
+        <a:cs typeface=""/>
+        <a:font script="Jpan" typeface="游ゴシック"/>
+        <a:font script="Hang" typeface="맑은 고딕"/>
+        <a:font script="Hans" typeface="等线"/>
+        <a:font script="Hant" typeface="新細明體"/>
+        <a:font script="Arab" typeface="Arial"/>
+        <a:font script="Hebr" typeface="Arial"/>
+        <a:font script="Thai" typeface="Cordia New"/>
+        <a:font script="Ethi" typeface="Nyala"/>
+        <a:font script="Beng" typeface="Vrinda"/>
+        <a:font script="Gujr" typeface="Shruti"/>
+        <a:font script="Khmr" typeface="DaunPenh"/>
+        <a:font script="Knda" typeface="Tunga"/>
+        <a:font script="Guru" typeface="Raavi"/>
+        <a:font script="Cans" typeface="Euphemia"/>
+        <a:font script="Cher" typeface="Plantagenet Cherokee"/>
+        <a:font script="Yiii" typeface="Microsoft Yi Baiti"/>
+        <a:font script="Tibt" typeface="Microsoft Himalaya"/>
+        <a:font script="Thaa" typeface="MV Boli"/>
+        <a:font script="Deva" typeface="Mangal"/>
+        <a:font script="Telu" typeface="Gautami"/>
+        <a:font script="Taml" typeface="Latha"/>
+        <a:font script="Syrc" typeface="Estrangelo Edessa"/>
+        <a:font script="Orya" typeface="Kalinga"/>
+        <a:font script="Mlym" typeface="Kartika"/>
+        <a:font script="Laoo" typeface="DokChampa"/>
+        <a:font script="Sinh" typeface="Iskoola Pota"/>
+        <a:font script="Mong" typeface="Mongolian Baiti"/>
+        <a:font script="Viet" typeface="Arial"/>
+        <a:font script="Uigh" typeface="Microsoft Uighur"/>
+        <a:font script="Geor" typeface="Sylfaen"/>
+        <a:font script="Armn" typeface="Arial"/>
+        <a:font script="Bugi" typeface="Leelawadee UI"/>
+        <a:font script="Bopo" typeface="Microsoft JhengHei"/>
+        <a:font script="Java" typeface="Javanese Text"/>
+        <a:font script="Lisu" typeface="Segoe UI"/>
+        <a:font script="Mymr" typeface="Myanmar Text"/>
+        <a:font script="Nkoo" typeface="Ebrima"/>
+        <a:font script="Olck" typeface="Nirmala UI"/>
+        <a:font script="Osma" typeface="Ebrima"/>
+        <a:font script="Phag" typeface="Phagspa"/>
+        <a:font script="Syrn" typeface="Estrangelo Edessa"/>
+        <a:font script="Syrj" typeface="Estrangelo Edessa"/>
+        <a:font script="Syre" typeface="Estrangelo Edessa"/>
+        <a:font script="Sora" typeface="Nirmala UI"/>
+        <a:font script="Tale" typeface="Microsoft Tai Le"/>
+        <a:font script="Talu" typeface="Microsoft New Tai Lue"/>
+        <a:font script="Tfng" typeface="Ebrima"/>
+      </a:minorFont>
+    </a:fontScheme>
+    <a:fmtScheme name="Office">
+      <a:fillStyleLst>
+        <a:solidFill>
+          <a:schemeClr val="phClr"/>
+        </a:solidFill>
+        <a:gradFill rotWithShape="1">
+          <a:gsLst>
+            <a:gs pos="0">
+              <a:schemeClr val="phClr">
+                <a:lumMod val="110000"/>
+                <a:satMod val="105000"/>
+                <a:tint val="67000"/>
+              </a:schemeClr>
+            </a:gs>
+            <a:gs pos="50000">
+              <a:schemeClr val="phClr">
+                <a:lumMod val="105000"/>
+                <a:satMod val="103000"/>
+                <a:tint val="73000"/>
+              </a:schemeClr>
+            </a:gs>
+            <a:gs pos="100000">
+              <a:schemeClr val="phClr">
+                <a:lumMod val="105000"/>
+                <a:satMod val="109000"/>
+                <a:tint val="81000"/>
+              </a:schemeClr>
+            </a:gs>
+          </a:gsLst>
+          <a:lin ang="5400000" scaled="0"/>
+        </a:gradFill>
+        <a:gradFill rotWithShape="1">
+          <a:gsLst>
+            <a:gs pos="0">
+              <a:schemeClr val="phClr">
+                <a:satMod val="103000"/>
+                <a:lumMod val="102000"/>
+                <a:tint val="94000"/>
+              </a:schemeClr>
+            </a:gs>
+            <a:gs pos="50000">
+              <a:schemeClr val="phClr">
+                <a:satMod val="110000"/>
+                <a:lumMod val="100000"/>
+                <a:shade val="100000"/>
+              </a:schemeClr>
+            </a:gs>
+            <a:gs pos="100000">
+              <a:schemeClr val="phClr">
+                <a:lumMod val="99000"/>
+                <a:satMod val="120000"/>
+                <a:shade val="78000"/>
+              </a:schemeClr>
+            </a:gs>
+          </a:gsLst>
+          <a:lin ang="5400000" scaled="0"/>
+        </a:gradFill>
+      </a:fillStyleLst>
+      <a:lnStyleLst>
+        <a:ln w="6350" cap="flat" cmpd="sng" algn="ctr">
+          <a:solidFill>
+            <a:schemeClr val="phClr"/>
+          </a:solidFill>
+          <a:prstDash val="solid"/>
+          <a:miter lim="800000"/>
+        </a:ln>
+        <a:ln w="12700" cap="flat" cmpd="sng" algn="ctr">
+          <a:solidFill>
+            <a:schemeClr val="phClr"/>
+          </a:solidFill>
+          <a:prstDash val="solid"/>
+          <a:miter lim="800000"/>
+        </a:ln>
+        <a:ln w="19050" cap="flat" cmpd="sng" algn="ctr">
+          <a:solidFill>
+            <a:schemeClr val="phClr"/>
+          </a:solidFill>
+          <a:prstDash val="solid"/>
+          <a:miter lim="800000"/>
+        </a:ln>
+      </a:lnStyleLst>
+      <a:effectStyleLst>
+        <a:effectStyle>
+          <a:effectLst/>
+        </a:effectStyle>
+        <a:effectStyle>
+          <a:effectLst/>
+        </a:effectStyle>
+        <a:effectStyle>
+          <a:effectLst>
+            <a:outerShdw blurRad="57150" dist="19050" dir="5400000" algn="ctr" rotWithShape="0">
+              <a:srgbClr val="000000">
+                <a:alpha val="63000"/>
+              </a:srgbClr>
+            </a:outerShdw>
+          </a:effectLst>
+        </a:effectStyle>
+      </a:effectStyleLst>
+      <a:bgFillStyleLst>
+        <a:solidFill>
+          <a:schemeClr val="phClr"/>
+        </a:solidFill>
+        <a:solidFill>
+          <a:schemeClr val="phClr">
+            <a:tint val="95000"/>
+            <a:satMod val="170000"/>
+          </a:schemeClr>
+        </a:solidFill>
+        <a:gradFill rotWithShape="1">
+          <a:gsLst>
+            <a:gs pos="0">
+              <a:schemeClr val="phClr">
+                <a:tint val="93000"/>
+                <a:satMod val="150000"/>
+                <a:shade val="98000"/>
+                <a:lumMod val="102000"/>
+              </a:schemeClr>
+            </a:gs>
+            <a:gs pos="50000">
+              <a:schemeClr val="phClr">
+                <a:tint val="98000"/>
+                <a:satMod val="130000"/>
+                <a:shade val="90000"/>
+                <a:lumMod val="103000"/>
+              </a:schemeClr>
+            </a:gs>
+            <a:gs pos="100000">
+              <a:schemeClr val="phClr">
+                <a:shade val="63000"/>
+                <a:satMod val="120000"/>
+              </a:schemeClr>
+            </a:gs>
+          </a:gsLst>
+          <a:lin ang="5400000" scaled="0"/>
+        </a:gradFill>
+      </a:bgFillStyleLst>
+    </a:fmtScheme>
+  </a:themeElements>
+  <a:objectDefaults/>
+  <a:extraClrSchemeLst/>
+  <a:extLst>
+    <a:ext uri="{05A4C25C-085E-4340-85A3-A5531E510DB2}">
+      <thm15:themeFamily xmlns:thm15="http://schemas.microsoft.com/office/thememl/2012/main" name="Office Theme" id="{62F939B6-93AF-4DB8-9C6B-D6C7DFDC589F}" vid="{4A3C46E8-61CC-4603-A589-7422A47A8E4A}"/>
+    </a:ext>
+  </a:extLst>
+</a:theme>
 </file>
</xml_diff>

<commit_message>
added documentation in Readme
</commit_message>
<xml_diff>
--- a/docs/Presentation.pptx
+++ b/docs/Presentation.pptx
@@ -5196,7 +5196,7 @@
         <p:spPr/>
         <p:txBody>
           <a:bodyPr>
-            <a:normAutofit fontScale="92500" lnSpcReduction="10000"/>
+            <a:normAutofit/>
           </a:bodyPr>
           <a:lstStyle/>
           <a:p>
@@ -5252,16 +5252,6 @@
               <a:rPr lang="en-GB" dirty="0"/>
               <a:t>Integrate more genes from other data sources</a:t>
             </a:r>
-          </a:p>
-          <a:p>
-            <a:pPr lvl="1"/>
-            <a:r>
-              <a:rPr lang="en-GB" dirty="0"/>
-              <a:t>Improve the documentation</a:t>
-            </a:r>
-          </a:p>
-          <a:p>
-            <a:endParaRPr lang="en-GB" dirty="0"/>
           </a:p>
         </p:txBody>
       </p:sp>

</xml_diff>

<commit_message>
One minor spelling mistakes corrected
</commit_message>
<xml_diff>
--- a/docs/Presentation.pptx
+++ b/docs/Presentation.pptx
@@ -369,7 +369,7 @@
           <a:p>
             <a:fld id="{D68AC1D6-260A-4710-B14D-B961D3F7EBF8}" type="slidenum">
               <a:rPr lang="en-GB" smtClean="0"/>
-              <a:t>‹Nr.›</a:t>
+              <a:t>‹#›</a:t>
             </a:fld>
             <a:endParaRPr lang="en-GB"/>
           </a:p>
@@ -825,7 +825,7 @@
           <a:p>
             <a:fld id="{9AE53365-47C3-4DE0-BAC2-1E909515BE6A}" type="slidenum">
               <a:rPr lang="de-CH" smtClean="0"/>
-              <a:t>‹Nr.›</a:t>
+              <a:t>‹#›</a:t>
             </a:fld>
             <a:endParaRPr lang="de-CH"/>
           </a:p>
@@ -995,7 +995,7 @@
           <a:p>
             <a:fld id="{9AE53365-47C3-4DE0-BAC2-1E909515BE6A}" type="slidenum">
               <a:rPr lang="de-CH" smtClean="0"/>
-              <a:t>‹Nr.›</a:t>
+              <a:t>‹#›</a:t>
             </a:fld>
             <a:endParaRPr lang="de-CH"/>
           </a:p>
@@ -1175,7 +1175,7 @@
           <a:p>
             <a:fld id="{9AE53365-47C3-4DE0-BAC2-1E909515BE6A}" type="slidenum">
               <a:rPr lang="de-CH" smtClean="0"/>
-              <a:t>‹Nr.›</a:t>
+              <a:t>‹#›</a:t>
             </a:fld>
             <a:endParaRPr lang="de-CH"/>
           </a:p>
@@ -1345,7 +1345,7 @@
           <a:p>
             <a:fld id="{9AE53365-47C3-4DE0-BAC2-1E909515BE6A}" type="slidenum">
               <a:rPr lang="de-CH" smtClean="0"/>
-              <a:t>‹Nr.›</a:t>
+              <a:t>‹#›</a:t>
             </a:fld>
             <a:endParaRPr lang="de-CH"/>
           </a:p>
@@ -1613,7 +1613,7 @@
           <a:p>
             <a:fld id="{9AE53365-47C3-4DE0-BAC2-1E909515BE6A}" type="slidenum">
               <a:rPr lang="de-CH" smtClean="0"/>
-              <a:t>‹Nr.›</a:t>
+              <a:t>‹#›</a:t>
             </a:fld>
             <a:endParaRPr lang="de-CH"/>
           </a:p>
@@ -1845,7 +1845,7 @@
           <a:p>
             <a:fld id="{9AE53365-47C3-4DE0-BAC2-1E909515BE6A}" type="slidenum">
               <a:rPr lang="de-CH" smtClean="0"/>
-              <a:t>‹Nr.›</a:t>
+              <a:t>‹#›</a:t>
             </a:fld>
             <a:endParaRPr lang="de-CH"/>
           </a:p>
@@ -2204,7 +2204,7 @@
           <a:p>
             <a:fld id="{9AE53365-47C3-4DE0-BAC2-1E909515BE6A}" type="slidenum">
               <a:rPr lang="de-CH" smtClean="0"/>
-              <a:t>‹Nr.›</a:t>
+              <a:t>‹#›</a:t>
             </a:fld>
             <a:endParaRPr lang="de-CH"/>
           </a:p>
@@ -2345,7 +2345,7 @@
           <a:p>
             <a:fld id="{9AE53365-47C3-4DE0-BAC2-1E909515BE6A}" type="slidenum">
               <a:rPr lang="de-CH" smtClean="0"/>
-              <a:t>‹Nr.›</a:t>
+              <a:t>‹#›</a:t>
             </a:fld>
             <a:endParaRPr lang="de-CH"/>
           </a:p>
@@ -2440,7 +2440,7 @@
           <a:p>
             <a:fld id="{9AE53365-47C3-4DE0-BAC2-1E909515BE6A}" type="slidenum">
               <a:rPr lang="de-CH" smtClean="0"/>
-              <a:t>‹Nr.›</a:t>
+              <a:t>‹#›</a:t>
             </a:fld>
             <a:endParaRPr lang="de-CH"/>
           </a:p>
@@ -2812,7 +2812,7 @@
           <a:p>
             <a:fld id="{9AE53365-47C3-4DE0-BAC2-1E909515BE6A}" type="slidenum">
               <a:rPr lang="de-CH" smtClean="0"/>
-              <a:t>‹Nr.›</a:t>
+              <a:t>‹#›</a:t>
             </a:fld>
             <a:endParaRPr lang="de-CH"/>
           </a:p>
@@ -3169,7 +3169,7 @@
           <a:p>
             <a:fld id="{9AE53365-47C3-4DE0-BAC2-1E909515BE6A}" type="slidenum">
               <a:rPr lang="de-CH" smtClean="0"/>
-              <a:t>‹Nr.›</a:t>
+              <a:t>‹#›</a:t>
             </a:fld>
             <a:endParaRPr lang="de-CH"/>
           </a:p>
@@ -3437,7 +3437,7 @@
           <a:p>
             <a:fld id="{9AE53365-47C3-4DE0-BAC2-1E909515BE6A}" type="slidenum">
               <a:rPr lang="de-CH" smtClean="0"/>
-              <a:t>‹Nr.›</a:t>
+              <a:t>‹#›</a:t>
             </a:fld>
             <a:endParaRPr lang="de-CH"/>
           </a:p>
@@ -5916,13 +5916,8 @@
           <a:p>
             <a:r>
               <a:rPr lang="en-GB" dirty="0"/>
-              <a:t>System </a:t>
-            </a:r>
-            <a:r>
-              <a:rPr lang="en-GB" dirty="0" err="1"/>
-              <a:t>landscapE</a:t>
-            </a:r>
-            <a:endParaRPr lang="en-GB" dirty="0"/>
+              <a:t>System landscape</a:t>
+            </a:r>
           </a:p>
         </p:txBody>
       </p:sp>
@@ -6823,11 +6818,7 @@
             <a:pPr lvl="1"/>
             <a:r>
               <a:rPr lang="en-GB" sz="2000" i="1" dirty="0"/>
-              <a:t>server- and </a:t>
-            </a:r>
-            <a:r>
-              <a:rPr lang="en-GB" sz="2000" i="1" dirty="0" err="1"/>
-              <a:t>clientside</a:t>
+              <a:t>server- and client-side</a:t>
             </a:r>
             <a:r>
               <a:rPr lang="en-GB" sz="2000" dirty="0"/>

</xml_diff>

<commit_message>
refactoring presentation and demo
</commit_message>
<xml_diff>
--- a/docs/Presentation.pptx
+++ b/docs/Presentation.pptx
@@ -17,8 +17,8 @@
     <p:sldId id="268" r:id="rId8"/>
     <p:sldId id="267" r:id="rId9"/>
     <p:sldId id="269" r:id="rId10"/>
-    <p:sldId id="270" r:id="rId11"/>
-    <p:sldId id="271" r:id="rId12"/>
+    <p:sldId id="271" r:id="rId11"/>
+    <p:sldId id="270" r:id="rId12"/>
     <p:sldId id="262" r:id="rId13"/>
     <p:sldId id="263" r:id="rId14"/>
     <p:sldId id="264" r:id="rId15"/>
@@ -210,7 +210,7 @@
           <a:p>
             <a:fld id="{25CFC3AE-0E78-4304-A112-2B3C20ABC9A0}" type="datetimeFigureOut">
               <a:rPr lang="en-GB" smtClean="0"/>
-              <a:t>23/06/2022</a:t>
+              <a:t>24/06/2022</a:t>
             </a:fld>
             <a:endParaRPr lang="en-GB"/>
           </a:p>
@@ -783,7 +783,7 @@
           <a:p>
             <a:fld id="{30B5EF8B-A242-40CB-8BE3-4227DBB3ED79}" type="datetimeFigureOut">
               <a:rPr lang="de-CH" smtClean="0"/>
-              <a:t>23.06.2022</a:t>
+              <a:t>24.06.2022</a:t>
             </a:fld>
             <a:endParaRPr lang="de-CH"/>
           </a:p>
@@ -953,7 +953,7 @@
           <a:p>
             <a:fld id="{30B5EF8B-A242-40CB-8BE3-4227DBB3ED79}" type="datetimeFigureOut">
               <a:rPr lang="de-CH" smtClean="0"/>
-              <a:t>23.06.2022</a:t>
+              <a:t>24.06.2022</a:t>
             </a:fld>
             <a:endParaRPr lang="de-CH"/>
           </a:p>
@@ -1133,7 +1133,7 @@
           <a:p>
             <a:fld id="{30B5EF8B-A242-40CB-8BE3-4227DBB3ED79}" type="datetimeFigureOut">
               <a:rPr lang="de-CH" smtClean="0"/>
-              <a:t>23.06.2022</a:t>
+              <a:t>24.06.2022</a:t>
             </a:fld>
             <a:endParaRPr lang="de-CH"/>
           </a:p>
@@ -1303,7 +1303,7 @@
           <a:p>
             <a:fld id="{30B5EF8B-A242-40CB-8BE3-4227DBB3ED79}" type="datetimeFigureOut">
               <a:rPr lang="de-CH" smtClean="0"/>
-              <a:t>23.06.2022</a:t>
+              <a:t>24.06.2022</a:t>
             </a:fld>
             <a:endParaRPr lang="de-CH"/>
           </a:p>
@@ -1571,7 +1571,7 @@
           <a:p>
             <a:fld id="{30B5EF8B-A242-40CB-8BE3-4227DBB3ED79}" type="datetimeFigureOut">
               <a:rPr lang="de-CH" smtClean="0"/>
-              <a:t>23.06.2022</a:t>
+              <a:t>24.06.2022</a:t>
             </a:fld>
             <a:endParaRPr lang="de-CH"/>
           </a:p>
@@ -1803,7 +1803,7 @@
           <a:p>
             <a:fld id="{30B5EF8B-A242-40CB-8BE3-4227DBB3ED79}" type="datetimeFigureOut">
               <a:rPr lang="de-CH" smtClean="0"/>
-              <a:t>23.06.2022</a:t>
+              <a:t>24.06.2022</a:t>
             </a:fld>
             <a:endParaRPr lang="de-CH"/>
           </a:p>
@@ -2162,7 +2162,7 @@
           <a:p>
             <a:fld id="{30B5EF8B-A242-40CB-8BE3-4227DBB3ED79}" type="datetimeFigureOut">
               <a:rPr lang="de-CH" smtClean="0"/>
-              <a:t>23.06.2022</a:t>
+              <a:t>24.06.2022</a:t>
             </a:fld>
             <a:endParaRPr lang="de-CH"/>
           </a:p>
@@ -2303,7 +2303,7 @@
           <a:p>
             <a:fld id="{30B5EF8B-A242-40CB-8BE3-4227DBB3ED79}" type="datetimeFigureOut">
               <a:rPr lang="de-CH" smtClean="0"/>
-              <a:t>23.06.2022</a:t>
+              <a:t>24.06.2022</a:t>
             </a:fld>
             <a:endParaRPr lang="de-CH"/>
           </a:p>
@@ -2398,7 +2398,7 @@
           <a:p>
             <a:fld id="{30B5EF8B-A242-40CB-8BE3-4227DBB3ED79}" type="datetimeFigureOut">
               <a:rPr lang="de-CH" smtClean="0"/>
-              <a:t>23.06.2022</a:t>
+              <a:t>24.06.2022</a:t>
             </a:fld>
             <a:endParaRPr lang="de-CH"/>
           </a:p>
@@ -2755,7 +2755,7 @@
           <a:p>
             <a:fld id="{30B5EF8B-A242-40CB-8BE3-4227DBB3ED79}" type="datetimeFigureOut">
               <a:rPr lang="de-CH" smtClean="0"/>
-              <a:t>23.06.2022</a:t>
+              <a:t>24.06.2022</a:t>
             </a:fld>
             <a:endParaRPr lang="de-CH"/>
           </a:p>
@@ -3112,7 +3112,7 @@
           <a:p>
             <a:fld id="{30B5EF8B-A242-40CB-8BE3-4227DBB3ED79}" type="datetimeFigureOut">
               <a:rPr lang="de-CH" smtClean="0"/>
-              <a:t>23.06.2022</a:t>
+              <a:t>24.06.2022</a:t>
             </a:fld>
             <a:endParaRPr lang="de-CH"/>
           </a:p>
@@ -3354,7 +3354,7 @@
           <a:p>
             <a:fld id="{30B5EF8B-A242-40CB-8BE3-4227DBB3ED79}" type="datetimeFigureOut">
               <a:rPr lang="de-CH" smtClean="0"/>
-              <a:t>23.06.2022</a:t>
+              <a:t>24.06.2022</a:t>
             </a:fld>
             <a:endParaRPr lang="de-CH"/>
           </a:p>
@@ -4004,7 +4004,7 @@
         </p:blipFill>
         <p:spPr bwMode="auto">
           <a:xfrm>
-            <a:off x="3050537" y="490777"/>
+            <a:off x="3050536" y="482702"/>
             <a:ext cx="6090927" cy="2710462"/>
           </a:xfrm>
           <a:prstGeom prst="rect">
@@ -4148,20 +4148,337 @@
         </p:nvSpPr>
         <p:spPr>
           <a:xfrm>
-            <a:off x="803244" y="2638044"/>
-            <a:ext cx="3523946" cy="3263206"/>
+            <a:off x="803243" y="2638043"/>
+            <a:ext cx="10297375" cy="4158542"/>
           </a:xfrm>
         </p:spPr>
         <p:txBody>
           <a:bodyPr>
-            <a:normAutofit/>
+            <a:normAutofit fontScale="92500" lnSpcReduction="10000"/>
           </a:bodyPr>
           <a:lstStyle/>
           <a:p>
             <a:r>
               <a:rPr lang="en-GB" sz="2400" dirty="0"/>
-              <a:t>Swagger</a:t>
-            </a:r>
+              <a:t>Google-like search API Endpoint “/</a:t>
+            </a:r>
+            <a:r>
+              <a:rPr lang="en-GB" sz="2400" i="1" dirty="0"/>
+              <a:t>search</a:t>
+            </a:r>
+            <a:r>
+              <a:rPr lang="en-GB" sz="2400" dirty="0"/>
+              <a:t>”</a:t>
+            </a:r>
+          </a:p>
+          <a:p>
+            <a:pPr marL="0" indent="0">
+              <a:buNone/>
+            </a:pPr>
+            <a:endParaRPr lang="en-GB" sz="2400" dirty="0"/>
+          </a:p>
+          <a:p>
+            <a:pPr marL="0" indent="0">
+              <a:buNone/>
+            </a:pPr>
+            <a:r>
+              <a:rPr lang="en-GB" dirty="0">
+                <a:solidFill>
+                  <a:srgbClr val="A31515"/>
+                </a:solidFill>
+                <a:latin typeface="Consolas" panose="020B0609020204030204" pitchFamily="49" charset="0"/>
+              </a:rPr>
+              <a:t>ALTER TABLE </a:t>
+            </a:r>
+            <a:r>
+              <a:rPr lang="en-GB" dirty="0" err="1">
+                <a:solidFill>
+                  <a:srgbClr val="A31515"/>
+                </a:solidFill>
+                <a:latin typeface="Consolas" panose="020B0609020204030204" pitchFamily="49" charset="0"/>
+              </a:rPr>
+              <a:t>allgenes</a:t>
+            </a:r>
+            <a:r>
+              <a:rPr lang="en-GB" dirty="0">
+                <a:solidFill>
+                  <a:srgbClr val="A31515"/>
+                </a:solidFill>
+                <a:latin typeface="Consolas" panose="020B0609020204030204" pitchFamily="49" charset="0"/>
+              </a:rPr>
+              <a:t> ADD FULLTEXT(`description`);</a:t>
+            </a:r>
+          </a:p>
+          <a:p>
+            <a:pPr marL="0" indent="0">
+              <a:buNone/>
+            </a:pPr>
+            <a:endParaRPr lang="en-GB" sz="2400" dirty="0"/>
+          </a:p>
+          <a:p>
+            <a:pPr marL="0" indent="0">
+              <a:buNone/>
+            </a:pPr>
+            <a:r>
+              <a:rPr lang="en-US" b="0" dirty="0">
+                <a:solidFill>
+                  <a:srgbClr val="A31515"/>
+                </a:solidFill>
+                <a:effectLst/>
+                <a:latin typeface="Consolas" panose="020B0609020204030204" pitchFamily="49" charset="0"/>
+              </a:rPr>
+              <a:t>SELECT * FROM </a:t>
+            </a:r>
+            <a:r>
+              <a:rPr lang="en-US" b="0" dirty="0" err="1">
+                <a:solidFill>
+                  <a:srgbClr val="A31515"/>
+                </a:solidFill>
+                <a:effectLst/>
+                <a:latin typeface="Consolas" panose="020B0609020204030204" pitchFamily="49" charset="0"/>
+              </a:rPr>
+              <a:t>allgenes</a:t>
+            </a:r>
+            <a:r>
+              <a:rPr lang="en-US" b="0" dirty="0">
+                <a:solidFill>
+                  <a:srgbClr val="A31515"/>
+                </a:solidFill>
+                <a:effectLst/>
+                <a:latin typeface="Consolas" panose="020B0609020204030204" pitchFamily="49" charset="0"/>
+              </a:rPr>
+              <a:t> </a:t>
+            </a:r>
+          </a:p>
+          <a:p>
+            <a:pPr marL="0" indent="0">
+              <a:buNone/>
+            </a:pPr>
+            <a:r>
+              <a:rPr lang="en-US" b="0" dirty="0">
+                <a:solidFill>
+                  <a:srgbClr val="A31515"/>
+                </a:solidFill>
+                <a:effectLst/>
+                <a:latin typeface="Consolas" panose="020B0609020204030204" pitchFamily="49" charset="0"/>
+              </a:rPr>
+              <a:t>	WHERE </a:t>
+            </a:r>
+            <a:r>
+              <a:rPr lang="en-US" b="0" dirty="0" err="1">
+                <a:solidFill>
+                  <a:srgbClr val="A31515"/>
+                </a:solidFill>
+                <a:effectLst/>
+                <a:latin typeface="Consolas" panose="020B0609020204030204" pitchFamily="49" charset="0"/>
+              </a:rPr>
+              <a:t>allgenes.gene_id</a:t>
+            </a:r>
+            <a:r>
+              <a:rPr lang="en-US" b="0" dirty="0">
+                <a:solidFill>
+                  <a:srgbClr val="A31515"/>
+                </a:solidFill>
+                <a:effectLst/>
+                <a:latin typeface="Consolas" panose="020B0609020204030204" pitchFamily="49" charset="0"/>
+              </a:rPr>
+              <a:t> = </a:t>
+            </a:r>
+            <a:r>
+              <a:rPr lang="en-US" b="0" dirty="0">
+                <a:solidFill>
+                  <a:srgbClr val="A31515"/>
+                </a:solidFill>
+                <a:effectLst/>
+                <a:highlight>
+                  <a:srgbClr val="FFFF00"/>
+                </a:highlight>
+                <a:latin typeface="Consolas" panose="020B0609020204030204" pitchFamily="49" charset="0"/>
+              </a:rPr>
+              <a:t>:</a:t>
+            </a:r>
+            <a:r>
+              <a:rPr lang="en-US" b="0" dirty="0" err="1">
+                <a:solidFill>
+                  <a:srgbClr val="A31515"/>
+                </a:solidFill>
+                <a:effectLst/>
+                <a:highlight>
+                  <a:srgbClr val="FFFF00"/>
+                </a:highlight>
+                <a:latin typeface="Consolas" panose="020B0609020204030204" pitchFamily="49" charset="0"/>
+              </a:rPr>
+              <a:t>intSearchQuery</a:t>
+            </a:r>
+            <a:r>
+              <a:rPr lang="en-US" b="0" dirty="0">
+                <a:solidFill>
+                  <a:srgbClr val="A31515"/>
+                </a:solidFill>
+                <a:effectLst/>
+                <a:highlight>
+                  <a:srgbClr val="FFFF00"/>
+                </a:highlight>
+                <a:latin typeface="Consolas" panose="020B0609020204030204" pitchFamily="49" charset="0"/>
+              </a:rPr>
+              <a:t> </a:t>
+            </a:r>
+            <a:endParaRPr lang="en-US" dirty="0">
+              <a:solidFill>
+                <a:srgbClr val="A31515"/>
+              </a:solidFill>
+              <a:highlight>
+                <a:srgbClr val="FFFF00"/>
+              </a:highlight>
+              <a:latin typeface="Consolas" panose="020B0609020204030204" pitchFamily="49" charset="0"/>
+            </a:endParaRPr>
+          </a:p>
+          <a:p>
+            <a:pPr marL="0" indent="0">
+              <a:buNone/>
+            </a:pPr>
+            <a:r>
+              <a:rPr lang="en-US" b="0" dirty="0">
+                <a:solidFill>
+                  <a:srgbClr val="A31515"/>
+                </a:solidFill>
+                <a:effectLst/>
+                <a:latin typeface="Consolas" panose="020B0609020204030204" pitchFamily="49" charset="0"/>
+              </a:rPr>
+              <a:t>	OR </a:t>
+            </a:r>
+            <a:r>
+              <a:rPr lang="en-US" b="0" dirty="0" err="1">
+                <a:solidFill>
+                  <a:srgbClr val="A31515"/>
+                </a:solidFill>
+                <a:effectLst/>
+                <a:latin typeface="Consolas" panose="020B0609020204030204" pitchFamily="49" charset="0"/>
+              </a:rPr>
+              <a:t>allgenes.symbol</a:t>
+            </a:r>
+            <a:r>
+              <a:rPr lang="en-US" b="0" dirty="0">
+                <a:solidFill>
+                  <a:srgbClr val="A31515"/>
+                </a:solidFill>
+                <a:effectLst/>
+                <a:latin typeface="Consolas" panose="020B0609020204030204" pitchFamily="49" charset="0"/>
+              </a:rPr>
+              <a:t> = :</a:t>
+            </a:r>
+            <a:r>
+              <a:rPr lang="en-US" b="0" dirty="0" err="1">
+                <a:solidFill>
+                  <a:srgbClr val="A31515"/>
+                </a:solidFill>
+                <a:effectLst/>
+                <a:latin typeface="Consolas" panose="020B0609020204030204" pitchFamily="49" charset="0"/>
+              </a:rPr>
+              <a:t>searchQuery</a:t>
+            </a:r>
+            <a:r>
+              <a:rPr lang="en-US" b="0" dirty="0">
+                <a:solidFill>
+                  <a:srgbClr val="A31515"/>
+                </a:solidFill>
+                <a:effectLst/>
+                <a:latin typeface="Consolas" panose="020B0609020204030204" pitchFamily="49" charset="0"/>
+              </a:rPr>
+              <a:t> </a:t>
+            </a:r>
+            <a:endParaRPr lang="en-US" dirty="0">
+              <a:solidFill>
+                <a:srgbClr val="A31515"/>
+              </a:solidFill>
+              <a:latin typeface="Consolas" panose="020B0609020204030204" pitchFamily="49" charset="0"/>
+            </a:endParaRPr>
+          </a:p>
+          <a:p>
+            <a:pPr marL="0" indent="0">
+              <a:buNone/>
+            </a:pPr>
+            <a:r>
+              <a:rPr lang="en-US" b="0" dirty="0">
+                <a:solidFill>
+                  <a:srgbClr val="A31515"/>
+                </a:solidFill>
+                <a:effectLst/>
+                <a:latin typeface="Consolas" panose="020B0609020204030204" pitchFamily="49" charset="0"/>
+              </a:rPr>
+              <a:t>	OR </a:t>
+            </a:r>
+            <a:r>
+              <a:rPr lang="en-US" b="0" dirty="0">
+                <a:solidFill>
+                  <a:srgbClr val="A31515"/>
+                </a:solidFill>
+                <a:effectLst/>
+                <a:highlight>
+                  <a:srgbClr val="FFFF00"/>
+                </a:highlight>
+                <a:latin typeface="Consolas" panose="020B0609020204030204" pitchFamily="49" charset="0"/>
+              </a:rPr>
+              <a:t>MATCH(`description`) AGAINST(:</a:t>
+            </a:r>
+            <a:r>
+              <a:rPr lang="en-US" b="0" dirty="0" err="1">
+                <a:solidFill>
+                  <a:srgbClr val="A31515"/>
+                </a:solidFill>
+                <a:effectLst/>
+                <a:highlight>
+                  <a:srgbClr val="FFFF00"/>
+                </a:highlight>
+                <a:latin typeface="Consolas" panose="020B0609020204030204" pitchFamily="49" charset="0"/>
+              </a:rPr>
+              <a:t>searchQuery</a:t>
+            </a:r>
+            <a:r>
+              <a:rPr lang="en-US" b="0" dirty="0">
+                <a:solidFill>
+                  <a:srgbClr val="A31515"/>
+                </a:solidFill>
+                <a:effectLst/>
+                <a:highlight>
+                  <a:srgbClr val="FFFF00"/>
+                </a:highlight>
+                <a:latin typeface="Consolas" panose="020B0609020204030204" pitchFamily="49" charset="0"/>
+              </a:rPr>
+              <a:t> IN BOOLEAN MODE)</a:t>
+            </a:r>
+            <a:r>
+              <a:rPr lang="en-US" b="0" dirty="0">
+                <a:solidFill>
+                  <a:srgbClr val="A31515"/>
+                </a:solidFill>
+                <a:effectLst/>
+                <a:latin typeface="Consolas" panose="020B0609020204030204" pitchFamily="49" charset="0"/>
+              </a:rPr>
+              <a:t>;</a:t>
+            </a:r>
+          </a:p>
+          <a:p>
+            <a:pPr marL="0" indent="0">
+              <a:buNone/>
+            </a:pPr>
+            <a:endParaRPr lang="en-US" dirty="0">
+              <a:solidFill>
+                <a:srgbClr val="A31515"/>
+              </a:solidFill>
+              <a:highlight>
+                <a:srgbClr val="FFFF00"/>
+              </a:highlight>
+              <a:latin typeface="Consolas" panose="020B0609020204030204" pitchFamily="49" charset="0"/>
+            </a:endParaRPr>
+          </a:p>
+          <a:p>
+            <a:r>
+              <a:rPr lang="en-US" sz="2400" dirty="0"/>
+              <a:t>Problem: Performance still not optimal (~ 20-30sec per query) when used with count query (pagination)</a:t>
+            </a:r>
+          </a:p>
+          <a:p>
             <a:endParaRPr lang="en-GB" sz="2200" dirty="0"/>
           </a:p>
           <a:p>
@@ -4172,10 +4489,39 @@
       </p:sp>
       <p:pic>
         <p:nvPicPr>
-          <p:cNvPr id="5" name="Grafik 4">
+          <p:cNvPr id="6" name="Grafik 5">
             <a:extLst>
               <a:ext uri="{FF2B5EF4-FFF2-40B4-BE49-F238E27FC236}">
-                <a16:creationId xmlns:a16="http://schemas.microsoft.com/office/drawing/2014/main" id="{313087F5-1618-DB4B-1B3E-BBF44B179A43}"/>
+                <a16:creationId xmlns:a16="http://schemas.microsoft.com/office/drawing/2014/main" id="{64687685-1861-CB49-97C4-A6D0B79A04D6}"/>
+              </a:ext>
+            </a:extLst>
+          </p:cNvPr>
+          <p:cNvPicPr>
+            <a:picLocks noChangeAspect="1"/>
+          </p:cNvPicPr>
+          <p:nvPr/>
+        </p:nvPicPr>
+        <p:blipFill rotWithShape="1">
+          <a:blip r:embed="rId2"/>
+          <a:srcRect t="43253" r="76201" b="46759"/>
+          <a:stretch/>
+        </p:blipFill>
+        <p:spPr>
+          <a:xfrm>
+            <a:off x="7000566" y="170639"/>
+            <a:ext cx="4017237" cy="635722"/>
+          </a:xfrm>
+          <a:prstGeom prst="rect">
+            <a:avLst/>
+          </a:prstGeom>
+        </p:spPr>
+      </p:pic>
+      <p:pic>
+        <p:nvPicPr>
+          <p:cNvPr id="8" name="Grafik 7">
+            <a:extLst>
+              <a:ext uri="{FF2B5EF4-FFF2-40B4-BE49-F238E27FC236}">
+                <a16:creationId xmlns:a16="http://schemas.microsoft.com/office/drawing/2014/main" id="{1820E6ED-8FBE-C9F0-0E5B-89F2771AABBC}"/>
               </a:ext>
             </a:extLst>
           </p:cNvPr>
@@ -4185,15 +4531,15 @@
           <p:nvPr/>
         </p:nvPicPr>
         <p:blipFill>
-          <a:blip r:embed="rId2"/>
+          <a:blip r:embed="rId3"/>
           <a:stretch>
             <a:fillRect/>
           </a:stretch>
         </p:blipFill>
         <p:spPr>
           <a:xfrm>
-            <a:off x="2565217" y="2472504"/>
-            <a:ext cx="9071510" cy="3420804"/>
+            <a:off x="7000566" y="806361"/>
+            <a:ext cx="4718549" cy="2926395"/>
           </a:xfrm>
           <a:prstGeom prst="rect">
             <a:avLst/>
@@ -4203,7 +4549,7 @@
     </p:spTree>
     <p:extLst>
       <p:ext uri="{BB962C8B-B14F-4D97-AF65-F5344CB8AC3E}">
-        <p14:creationId xmlns:p14="http://schemas.microsoft.com/office/powerpoint/2010/main" val="2790685627"/>
+        <p14:creationId xmlns:p14="http://schemas.microsoft.com/office/powerpoint/2010/main" val="670759649"/>
       </p:ext>
     </p:extLst>
   </p:cSld>
@@ -4296,8 +4642,8 @@
         </p:nvSpPr>
         <p:spPr>
           <a:xfrm>
-            <a:off x="803243" y="2638043"/>
-            <a:ext cx="10297375" cy="3969233"/>
+            <a:off x="803244" y="2638044"/>
+            <a:ext cx="3523946" cy="3263206"/>
           </a:xfrm>
         </p:spPr>
         <p:txBody>
@@ -4308,277 +4654,8 @@
           <a:p>
             <a:r>
               <a:rPr lang="en-GB" sz="2400" dirty="0"/>
-              <a:t>Google-like search API Endpoint “/</a:t>
-            </a:r>
-            <a:r>
-              <a:rPr lang="en-GB" sz="2400" i="1" dirty="0"/>
-              <a:t>search</a:t>
-            </a:r>
-            <a:r>
-              <a:rPr lang="en-GB" sz="2400" dirty="0"/>
-              <a:t>”</a:t>
-            </a:r>
-          </a:p>
-          <a:p>
-            <a:pPr marL="0" indent="0">
-              <a:buNone/>
-            </a:pPr>
-            <a:endParaRPr lang="en-GB" sz="2400" dirty="0"/>
-          </a:p>
-          <a:p>
-            <a:pPr marL="0" indent="0">
-              <a:buNone/>
-            </a:pPr>
-            <a:r>
-              <a:rPr lang="en-US" b="0" dirty="0">
-                <a:solidFill>
-                  <a:srgbClr val="A31515"/>
-                </a:solidFill>
-                <a:effectLst/>
-                <a:latin typeface="Consolas" panose="020B0609020204030204" pitchFamily="49" charset="0"/>
-              </a:rPr>
-              <a:t>SELECT * FROM </a:t>
-            </a:r>
-            <a:r>
-              <a:rPr lang="en-US" b="0" dirty="0" err="1">
-                <a:solidFill>
-                  <a:srgbClr val="A31515"/>
-                </a:solidFill>
-                <a:effectLst/>
-                <a:latin typeface="Consolas" panose="020B0609020204030204" pitchFamily="49" charset="0"/>
-              </a:rPr>
-              <a:t>allgenes</a:t>
-            </a:r>
-            <a:r>
-              <a:rPr lang="en-US" b="0" dirty="0">
-                <a:solidFill>
-                  <a:srgbClr val="A31515"/>
-                </a:solidFill>
-                <a:effectLst/>
-                <a:latin typeface="Consolas" panose="020B0609020204030204" pitchFamily="49" charset="0"/>
-              </a:rPr>
-              <a:t> </a:t>
-            </a:r>
-          </a:p>
-          <a:p>
-            <a:pPr marL="0" indent="0">
-              <a:buNone/>
-            </a:pPr>
-            <a:r>
-              <a:rPr lang="en-US" b="0" dirty="0">
-                <a:solidFill>
-                  <a:srgbClr val="A31515"/>
-                </a:solidFill>
-                <a:effectLst/>
-                <a:latin typeface="Consolas" panose="020B0609020204030204" pitchFamily="49" charset="0"/>
-              </a:rPr>
-              <a:t>	WHERE </a:t>
-            </a:r>
-            <a:r>
-              <a:rPr lang="en-US" b="0" dirty="0" err="1">
-                <a:solidFill>
-                  <a:srgbClr val="A31515"/>
-                </a:solidFill>
-                <a:effectLst/>
-                <a:latin typeface="Consolas" panose="020B0609020204030204" pitchFamily="49" charset="0"/>
-              </a:rPr>
-              <a:t>allgenes.gene_id</a:t>
-            </a:r>
-            <a:r>
-              <a:rPr lang="en-US" b="0" dirty="0">
-                <a:solidFill>
-                  <a:srgbClr val="A31515"/>
-                </a:solidFill>
-                <a:effectLst/>
-                <a:latin typeface="Consolas" panose="020B0609020204030204" pitchFamily="49" charset="0"/>
-              </a:rPr>
-              <a:t> = </a:t>
-            </a:r>
-            <a:r>
-              <a:rPr lang="en-US" b="0" dirty="0">
-                <a:solidFill>
-                  <a:srgbClr val="A31515"/>
-                </a:solidFill>
-                <a:effectLst/>
-                <a:highlight>
-                  <a:srgbClr val="FFFF00"/>
-                </a:highlight>
-                <a:latin typeface="Consolas" panose="020B0609020204030204" pitchFamily="49" charset="0"/>
-              </a:rPr>
-              <a:t>:</a:t>
-            </a:r>
-            <a:r>
-              <a:rPr lang="en-US" b="0" dirty="0" err="1">
-                <a:solidFill>
-                  <a:srgbClr val="A31515"/>
-                </a:solidFill>
-                <a:effectLst/>
-                <a:highlight>
-                  <a:srgbClr val="FFFF00"/>
-                </a:highlight>
-                <a:latin typeface="Consolas" panose="020B0609020204030204" pitchFamily="49" charset="0"/>
-              </a:rPr>
-              <a:t>intSearchQuery</a:t>
-            </a:r>
-            <a:r>
-              <a:rPr lang="en-US" b="0" dirty="0">
-                <a:solidFill>
-                  <a:srgbClr val="A31515"/>
-                </a:solidFill>
-                <a:effectLst/>
-                <a:highlight>
-                  <a:srgbClr val="FFFF00"/>
-                </a:highlight>
-                <a:latin typeface="Consolas" panose="020B0609020204030204" pitchFamily="49" charset="0"/>
-              </a:rPr>
-              <a:t> </a:t>
-            </a:r>
-            <a:endParaRPr lang="en-US" dirty="0">
-              <a:solidFill>
-                <a:srgbClr val="A31515"/>
-              </a:solidFill>
-              <a:highlight>
-                <a:srgbClr val="FFFF00"/>
-              </a:highlight>
-              <a:latin typeface="Consolas" panose="020B0609020204030204" pitchFamily="49" charset="0"/>
-            </a:endParaRPr>
-          </a:p>
-          <a:p>
-            <a:pPr marL="0" indent="0">
-              <a:buNone/>
-            </a:pPr>
-            <a:r>
-              <a:rPr lang="en-US" b="0" dirty="0">
-                <a:solidFill>
-                  <a:srgbClr val="A31515"/>
-                </a:solidFill>
-                <a:effectLst/>
-                <a:latin typeface="Consolas" panose="020B0609020204030204" pitchFamily="49" charset="0"/>
-              </a:rPr>
-              <a:t>	OR </a:t>
-            </a:r>
-            <a:r>
-              <a:rPr lang="en-US" b="0" dirty="0" err="1">
-                <a:solidFill>
-                  <a:srgbClr val="A31515"/>
-                </a:solidFill>
-                <a:effectLst/>
-                <a:latin typeface="Consolas" panose="020B0609020204030204" pitchFamily="49" charset="0"/>
-              </a:rPr>
-              <a:t>allgenes.symbol</a:t>
-            </a:r>
-            <a:r>
-              <a:rPr lang="en-US" b="0" dirty="0">
-                <a:solidFill>
-                  <a:srgbClr val="A31515"/>
-                </a:solidFill>
-                <a:effectLst/>
-                <a:latin typeface="Consolas" panose="020B0609020204030204" pitchFamily="49" charset="0"/>
-              </a:rPr>
-              <a:t> = :</a:t>
-            </a:r>
-            <a:r>
-              <a:rPr lang="en-US" b="0" dirty="0" err="1">
-                <a:solidFill>
-                  <a:srgbClr val="A31515"/>
-                </a:solidFill>
-                <a:effectLst/>
-                <a:latin typeface="Consolas" panose="020B0609020204030204" pitchFamily="49" charset="0"/>
-              </a:rPr>
-              <a:t>searchQuery</a:t>
-            </a:r>
-            <a:r>
-              <a:rPr lang="en-US" b="0" dirty="0">
-                <a:solidFill>
-                  <a:srgbClr val="A31515"/>
-                </a:solidFill>
-                <a:effectLst/>
-                <a:latin typeface="Consolas" panose="020B0609020204030204" pitchFamily="49" charset="0"/>
-              </a:rPr>
-              <a:t> </a:t>
-            </a:r>
-            <a:endParaRPr lang="en-US" dirty="0">
-              <a:solidFill>
-                <a:srgbClr val="A31515"/>
-              </a:solidFill>
-              <a:latin typeface="Consolas" panose="020B0609020204030204" pitchFamily="49" charset="0"/>
-            </a:endParaRPr>
-          </a:p>
-          <a:p>
-            <a:pPr marL="0" indent="0">
-              <a:buNone/>
-            </a:pPr>
-            <a:r>
-              <a:rPr lang="en-US" b="0" dirty="0">
-                <a:solidFill>
-                  <a:srgbClr val="A31515"/>
-                </a:solidFill>
-                <a:effectLst/>
-                <a:latin typeface="Consolas" panose="020B0609020204030204" pitchFamily="49" charset="0"/>
-              </a:rPr>
-              <a:t>	OR </a:t>
-            </a:r>
-            <a:r>
-              <a:rPr lang="en-US" b="0" dirty="0">
-                <a:solidFill>
-                  <a:srgbClr val="A31515"/>
-                </a:solidFill>
-                <a:effectLst/>
-                <a:highlight>
-                  <a:srgbClr val="FFFF00"/>
-                </a:highlight>
-                <a:latin typeface="Consolas" panose="020B0609020204030204" pitchFamily="49" charset="0"/>
-              </a:rPr>
-              <a:t>MATCH(`description`) AGAINST(:</a:t>
-            </a:r>
-            <a:r>
-              <a:rPr lang="en-US" b="0" dirty="0" err="1">
-                <a:solidFill>
-                  <a:srgbClr val="A31515"/>
-                </a:solidFill>
-                <a:effectLst/>
-                <a:highlight>
-                  <a:srgbClr val="FFFF00"/>
-                </a:highlight>
-                <a:latin typeface="Consolas" panose="020B0609020204030204" pitchFamily="49" charset="0"/>
-              </a:rPr>
-              <a:t>searchQuery</a:t>
-            </a:r>
-            <a:r>
-              <a:rPr lang="en-US" b="0" dirty="0">
-                <a:solidFill>
-                  <a:srgbClr val="A31515"/>
-                </a:solidFill>
-                <a:effectLst/>
-                <a:highlight>
-                  <a:srgbClr val="FFFF00"/>
-                </a:highlight>
-                <a:latin typeface="Consolas" panose="020B0609020204030204" pitchFamily="49" charset="0"/>
-              </a:rPr>
-              <a:t> IN BOOLEAN MODE)</a:t>
-            </a:r>
-          </a:p>
-          <a:p>
-            <a:pPr marL="0" indent="0">
-              <a:buNone/>
-            </a:pPr>
-            <a:endParaRPr lang="en-US" dirty="0">
-              <a:solidFill>
-                <a:srgbClr val="A31515"/>
-              </a:solidFill>
-              <a:highlight>
-                <a:srgbClr val="FFFF00"/>
-              </a:highlight>
-              <a:latin typeface="Consolas" panose="020B0609020204030204" pitchFamily="49" charset="0"/>
-            </a:endParaRPr>
-          </a:p>
-          <a:p>
-            <a:r>
-              <a:rPr lang="en-US" sz="2400" dirty="0"/>
-              <a:t>Problem: Performance still not optimal (~ 10-20sec per query) when used with count query (pagination)</a:t>
-            </a:r>
-          </a:p>
-          <a:p>
+              <a:t>Swagger</a:t>
+            </a:r>
             <a:endParaRPr lang="en-GB" sz="2200" dirty="0"/>
           </a:p>
           <a:p>
@@ -4589,39 +4666,10 @@
       </p:sp>
       <p:pic>
         <p:nvPicPr>
-          <p:cNvPr id="6" name="Grafik 5">
+          <p:cNvPr id="5" name="Grafik 4">
             <a:extLst>
               <a:ext uri="{FF2B5EF4-FFF2-40B4-BE49-F238E27FC236}">
-                <a16:creationId xmlns:a16="http://schemas.microsoft.com/office/drawing/2014/main" id="{64687685-1861-CB49-97C4-A6D0B79A04D6}"/>
-              </a:ext>
-            </a:extLst>
-          </p:cNvPr>
-          <p:cNvPicPr>
-            <a:picLocks noChangeAspect="1"/>
-          </p:cNvPicPr>
-          <p:nvPr/>
-        </p:nvPicPr>
-        <p:blipFill rotWithShape="1">
-          <a:blip r:embed="rId2"/>
-          <a:srcRect t="43253" r="76201" b="46759"/>
-          <a:stretch/>
-        </p:blipFill>
-        <p:spPr>
-          <a:xfrm>
-            <a:off x="7000566" y="170639"/>
-            <a:ext cx="4017237" cy="635722"/>
-          </a:xfrm>
-          <a:prstGeom prst="rect">
-            <a:avLst/>
-          </a:prstGeom>
-        </p:spPr>
-      </p:pic>
-      <p:pic>
-        <p:nvPicPr>
-          <p:cNvPr id="8" name="Grafik 7">
-            <a:extLst>
-              <a:ext uri="{FF2B5EF4-FFF2-40B4-BE49-F238E27FC236}">
-                <a16:creationId xmlns:a16="http://schemas.microsoft.com/office/drawing/2014/main" id="{1820E6ED-8FBE-C9F0-0E5B-89F2771AABBC}"/>
+                <a16:creationId xmlns:a16="http://schemas.microsoft.com/office/drawing/2014/main" id="{313087F5-1618-DB4B-1B3E-BBF44B179A43}"/>
               </a:ext>
             </a:extLst>
           </p:cNvPr>
@@ -4631,15 +4679,15 @@
           <p:nvPr/>
         </p:nvPicPr>
         <p:blipFill>
-          <a:blip r:embed="rId3"/>
+          <a:blip r:embed="rId2"/>
           <a:stretch>
             <a:fillRect/>
           </a:stretch>
         </p:blipFill>
         <p:spPr>
           <a:xfrm>
-            <a:off x="7000566" y="806361"/>
-            <a:ext cx="4718549" cy="2926395"/>
+            <a:off x="2565217" y="2472504"/>
+            <a:ext cx="9071510" cy="3420804"/>
           </a:xfrm>
           <a:prstGeom prst="rect">
             <a:avLst/>
@@ -4649,7 +4697,7 @@
     </p:spTree>
     <p:extLst>
       <p:ext uri="{BB962C8B-B14F-4D97-AF65-F5344CB8AC3E}">
-        <p14:creationId xmlns:p14="http://schemas.microsoft.com/office/powerpoint/2010/main" val="670759649"/>
+        <p14:creationId xmlns:p14="http://schemas.microsoft.com/office/powerpoint/2010/main" val="2790685627"/>
       </p:ext>
     </p:extLst>
   </p:cSld>

</xml_diff>